<commit_message>
Improved formatting; added pi implementation
</commit_message>
<xml_diff>
--- a/Python/Mpi4py/mpi4py.pptx
+++ b/Python/Mpi4py/mpi4py.pptx
@@ -1,9 +1,12 @@
 
 <file path=ppt/presentation.xml><?xml version="1.0" encoding="utf-8"?>
-<p:presentation xmlns:a="http://schemas.openxmlformats.org/drawingml/2006/main" xmlns:r="http://schemas.openxmlformats.org/officeDocument/2006/relationships" xmlns:p="http://schemas.openxmlformats.org/presentationml/2006/main" saveSubsetFonts="1">
+<p:presentation xmlns:a="http://schemas.openxmlformats.org/drawingml/2006/main" xmlns:r="http://schemas.openxmlformats.org/officeDocument/2006/relationships" xmlns:p="http://schemas.openxmlformats.org/presentationml/2006/main" showSpecialPlsOnTitleSld="0" saveSubsetFonts="1">
   <p:sldMasterIdLst>
     <p:sldMasterId id="2147483648" r:id="rId1"/>
   </p:sldMasterIdLst>
+  <p:notesMasterIdLst>
+    <p:notesMasterId r:id="rId31"/>
+  </p:notesMasterIdLst>
   <p:sldIdLst>
     <p:sldId id="256" r:id="rId2"/>
     <p:sldId id="257" r:id="rId3"/>
@@ -26,13 +29,14 @@
     <p:sldId id="278" r:id="rId20"/>
     <p:sldId id="286" r:id="rId21"/>
     <p:sldId id="283" r:id="rId22"/>
-    <p:sldId id="269" r:id="rId23"/>
-    <p:sldId id="279" r:id="rId24"/>
-    <p:sldId id="280" r:id="rId25"/>
-    <p:sldId id="281" r:id="rId26"/>
-    <p:sldId id="285" r:id="rId27"/>
-    <p:sldId id="284" r:id="rId28"/>
-    <p:sldId id="271" r:id="rId29"/>
+    <p:sldId id="287" r:id="rId23"/>
+    <p:sldId id="269" r:id="rId24"/>
+    <p:sldId id="279" r:id="rId25"/>
+    <p:sldId id="280" r:id="rId26"/>
+    <p:sldId id="281" r:id="rId27"/>
+    <p:sldId id="285" r:id="rId28"/>
+    <p:sldId id="284" r:id="rId29"/>
+    <p:sldId id="271" r:id="rId30"/>
   </p:sldIdLst>
   <p:sldSz cx="9144000" cy="6858000" type="screen4x3"/>
   <p:notesSz cx="6858000" cy="9144000"/>
@@ -133,7 +137,7 @@
   </p:defaultTextStyle>
   <p:extLst>
     <p:ext uri="{EFAFB233-063F-42B5-8137-9DF3F51BA10A}">
-      <p15:sldGuideLst xmlns="" xmlns:p15="http://schemas.microsoft.com/office/powerpoint/2012/main">
+      <p15:sldGuideLst xmlns:p15="http://schemas.microsoft.com/office/powerpoint/2012/main" xmlns="">
         <p15:guide id="1" orient="horz" pos="2160">
           <p15:clr>
             <a:srgbClr val="A4A3A4"/>
@@ -148,6 +152,356 @@
     </p:ext>
   </p:extLst>
 </p:presentation>
+</file>
+
+<file path=ppt/notesMasters/notesMaster1.xml><?xml version="1.0" encoding="utf-8"?>
+<p:notesMaster xmlns:a="http://schemas.openxmlformats.org/drawingml/2006/main" xmlns:r="http://schemas.openxmlformats.org/officeDocument/2006/relationships" xmlns:p="http://schemas.openxmlformats.org/presentationml/2006/main">
+  <p:cSld>
+    <p:bg>
+      <p:bgRef idx="1001">
+        <a:schemeClr val="bg1"/>
+      </p:bgRef>
+    </p:bg>
+    <p:spTree>
+      <p:nvGrpSpPr>
+        <p:cNvPr id="1" name=""/>
+        <p:cNvGrpSpPr/>
+        <p:nvPr/>
+      </p:nvGrpSpPr>
+      <p:grpSpPr>
+        <a:xfrm>
+          <a:off x="0" y="0"/>
+          <a:ext cx="0" cy="0"/>
+          <a:chOff x="0" y="0"/>
+          <a:chExt cx="0" cy="0"/>
+        </a:xfrm>
+      </p:grpSpPr>
+      <p:sp>
+        <p:nvSpPr>
+          <p:cNvPr id="2" name="Header Placeholder 1"/>
+          <p:cNvSpPr>
+            <a:spLocks noGrp="1"/>
+          </p:cNvSpPr>
+          <p:nvPr>
+            <p:ph type="hdr" sz="quarter"/>
+          </p:nvPr>
+        </p:nvSpPr>
+        <p:spPr>
+          <a:xfrm>
+            <a:off x="0" y="0"/>
+            <a:ext cx="2971800" cy="457200"/>
+          </a:xfrm>
+          <a:prstGeom prst="rect">
+            <a:avLst/>
+          </a:prstGeom>
+        </p:spPr>
+        <p:txBody>
+          <a:bodyPr vert="horz" lIns="91440" tIns="45720" rIns="91440" bIns="45720" rtlCol="0"/>
+          <a:lstStyle>
+            <a:lvl1pPr algn="l">
+              <a:defRPr sz="1200"/>
+            </a:lvl1pPr>
+          </a:lstStyle>
+          <a:p>
+            <a:endParaRPr lang="nl-BE"/>
+          </a:p>
+        </p:txBody>
+      </p:sp>
+      <p:sp>
+        <p:nvSpPr>
+          <p:cNvPr id="3" name="Date Placeholder 2"/>
+          <p:cNvSpPr>
+            <a:spLocks noGrp="1"/>
+          </p:cNvSpPr>
+          <p:nvPr>
+            <p:ph type="dt" idx="1"/>
+          </p:nvPr>
+        </p:nvSpPr>
+        <p:spPr>
+          <a:xfrm>
+            <a:off x="3884613" y="0"/>
+            <a:ext cx="2971800" cy="457200"/>
+          </a:xfrm>
+          <a:prstGeom prst="rect">
+            <a:avLst/>
+          </a:prstGeom>
+        </p:spPr>
+        <p:txBody>
+          <a:bodyPr vert="horz" lIns="91440" tIns="45720" rIns="91440" bIns="45720" rtlCol="0"/>
+          <a:lstStyle>
+            <a:lvl1pPr algn="r">
+              <a:defRPr sz="1200"/>
+            </a:lvl1pPr>
+          </a:lstStyle>
+          <a:p>
+            <a:fld id="{962AD5E1-49E6-4F9C-A5A5-080C0327EF97}" type="datetimeFigureOut">
+              <a:rPr lang="nl-BE" smtClean="0"/>
+              <a:t>25/01/2016</a:t>
+            </a:fld>
+            <a:endParaRPr lang="nl-BE"/>
+          </a:p>
+        </p:txBody>
+      </p:sp>
+      <p:sp>
+        <p:nvSpPr>
+          <p:cNvPr id="4" name="Slide Image Placeholder 3"/>
+          <p:cNvSpPr>
+            <a:spLocks noGrp="1" noRot="1" noChangeAspect="1"/>
+          </p:cNvSpPr>
+          <p:nvPr>
+            <p:ph type="sldImg" idx="2"/>
+          </p:nvPr>
+        </p:nvSpPr>
+        <p:spPr>
+          <a:xfrm>
+            <a:off x="1143000" y="685800"/>
+            <a:ext cx="4572000" cy="3429000"/>
+          </a:xfrm>
+          <a:prstGeom prst="rect">
+            <a:avLst/>
+          </a:prstGeom>
+          <a:noFill/>
+          <a:ln w="12700">
+            <a:solidFill>
+              <a:prstClr val="black"/>
+            </a:solidFill>
+          </a:ln>
+        </p:spPr>
+        <p:txBody>
+          <a:bodyPr vert="horz" lIns="91440" tIns="45720" rIns="91440" bIns="45720" rtlCol="0" anchor="ctr"/>
+          <a:lstStyle/>
+          <a:p>
+            <a:endParaRPr lang="nl-BE"/>
+          </a:p>
+        </p:txBody>
+      </p:sp>
+      <p:sp>
+        <p:nvSpPr>
+          <p:cNvPr id="5" name="Notes Placeholder 4"/>
+          <p:cNvSpPr>
+            <a:spLocks noGrp="1"/>
+          </p:cNvSpPr>
+          <p:nvPr>
+            <p:ph type="body" sz="quarter" idx="3"/>
+          </p:nvPr>
+        </p:nvSpPr>
+        <p:spPr>
+          <a:xfrm>
+            <a:off x="685800" y="4343400"/>
+            <a:ext cx="5486400" cy="4114800"/>
+          </a:xfrm>
+          <a:prstGeom prst="rect">
+            <a:avLst/>
+          </a:prstGeom>
+        </p:spPr>
+        <p:txBody>
+          <a:bodyPr vert="horz" lIns="91440" tIns="45720" rIns="91440" bIns="45720" rtlCol="0"/>
+          <a:lstStyle/>
+          <a:p>
+            <a:pPr lvl="0"/>
+            <a:r>
+              <a:rPr lang="en-US" smtClean="0"/>
+              <a:t>Click to edit Master text styles</a:t>
+            </a:r>
+          </a:p>
+          <a:p>
+            <a:pPr lvl="1"/>
+            <a:r>
+              <a:rPr lang="en-US" smtClean="0"/>
+              <a:t>Second level</a:t>
+            </a:r>
+          </a:p>
+          <a:p>
+            <a:pPr lvl="2"/>
+            <a:r>
+              <a:rPr lang="en-US" smtClean="0"/>
+              <a:t>Third level</a:t>
+            </a:r>
+          </a:p>
+          <a:p>
+            <a:pPr lvl="3"/>
+            <a:r>
+              <a:rPr lang="en-US" smtClean="0"/>
+              <a:t>Fourth level</a:t>
+            </a:r>
+          </a:p>
+          <a:p>
+            <a:pPr lvl="4"/>
+            <a:r>
+              <a:rPr lang="en-US" smtClean="0"/>
+              <a:t>Fifth level</a:t>
+            </a:r>
+            <a:endParaRPr lang="nl-BE"/>
+          </a:p>
+        </p:txBody>
+      </p:sp>
+      <p:sp>
+        <p:nvSpPr>
+          <p:cNvPr id="6" name="Footer Placeholder 5"/>
+          <p:cNvSpPr>
+            <a:spLocks noGrp="1"/>
+          </p:cNvSpPr>
+          <p:nvPr>
+            <p:ph type="ftr" sz="quarter" idx="4"/>
+          </p:nvPr>
+        </p:nvSpPr>
+        <p:spPr>
+          <a:xfrm>
+            <a:off x="0" y="8685213"/>
+            <a:ext cx="2971800" cy="457200"/>
+          </a:xfrm>
+          <a:prstGeom prst="rect">
+            <a:avLst/>
+          </a:prstGeom>
+        </p:spPr>
+        <p:txBody>
+          <a:bodyPr vert="horz" lIns="91440" tIns="45720" rIns="91440" bIns="45720" rtlCol="0" anchor="b"/>
+          <a:lstStyle>
+            <a:lvl1pPr algn="l">
+              <a:defRPr sz="1200"/>
+            </a:lvl1pPr>
+          </a:lstStyle>
+          <a:p>
+            <a:endParaRPr lang="nl-BE"/>
+          </a:p>
+        </p:txBody>
+      </p:sp>
+      <p:sp>
+        <p:nvSpPr>
+          <p:cNvPr id="7" name="Slide Number Placeholder 6"/>
+          <p:cNvSpPr>
+            <a:spLocks noGrp="1"/>
+          </p:cNvSpPr>
+          <p:nvPr>
+            <p:ph type="sldNum" sz="quarter" idx="5"/>
+          </p:nvPr>
+        </p:nvSpPr>
+        <p:spPr>
+          <a:xfrm>
+            <a:off x="3884613" y="8685213"/>
+            <a:ext cx="2971800" cy="457200"/>
+          </a:xfrm>
+          <a:prstGeom prst="rect">
+            <a:avLst/>
+          </a:prstGeom>
+        </p:spPr>
+        <p:txBody>
+          <a:bodyPr vert="horz" lIns="91440" tIns="45720" rIns="91440" bIns="45720" rtlCol="0" anchor="b"/>
+          <a:lstStyle>
+            <a:lvl1pPr algn="r">
+              <a:defRPr sz="1200"/>
+            </a:lvl1pPr>
+          </a:lstStyle>
+          <a:p>
+            <a:fld id="{964F6640-6A8B-4E4C-860C-E724AA2A19BE}" type="slidenum">
+              <a:rPr lang="nl-BE" smtClean="0"/>
+              <a:t>‹#›</a:t>
+            </a:fld>
+            <a:endParaRPr lang="nl-BE"/>
+          </a:p>
+        </p:txBody>
+      </p:sp>
+    </p:spTree>
+    <p:extLst>
+      <p:ext uri="{BB962C8B-B14F-4D97-AF65-F5344CB8AC3E}">
+        <p14:creationId xmlns:p14="http://schemas.microsoft.com/office/powerpoint/2010/main" val="215774804"/>
+      </p:ext>
+    </p:extLst>
+  </p:cSld>
+  <p:clrMap bg1="lt1" tx1="dk1" bg2="lt2" tx2="dk2" accent1="accent1" accent2="accent2" accent3="accent3" accent4="accent4" accent5="accent5" accent6="accent6" hlink="hlink" folHlink="folHlink"/>
+  <p:notesStyle>
+    <a:lvl1pPr marL="0" algn="l" defTabSz="914400" rtl="0" eaLnBrk="1" latinLnBrk="0" hangingPunct="1">
+      <a:defRPr sz="1200" kern="1200">
+        <a:solidFill>
+          <a:schemeClr val="tx1"/>
+        </a:solidFill>
+        <a:latin typeface="+mn-lt"/>
+        <a:ea typeface="+mn-ea"/>
+        <a:cs typeface="+mn-cs"/>
+      </a:defRPr>
+    </a:lvl1pPr>
+    <a:lvl2pPr marL="457200" algn="l" defTabSz="914400" rtl="0" eaLnBrk="1" latinLnBrk="0" hangingPunct="1">
+      <a:defRPr sz="1200" kern="1200">
+        <a:solidFill>
+          <a:schemeClr val="tx1"/>
+        </a:solidFill>
+        <a:latin typeface="+mn-lt"/>
+        <a:ea typeface="+mn-ea"/>
+        <a:cs typeface="+mn-cs"/>
+      </a:defRPr>
+    </a:lvl2pPr>
+    <a:lvl3pPr marL="914400" algn="l" defTabSz="914400" rtl="0" eaLnBrk="1" latinLnBrk="0" hangingPunct="1">
+      <a:defRPr sz="1200" kern="1200">
+        <a:solidFill>
+          <a:schemeClr val="tx1"/>
+        </a:solidFill>
+        <a:latin typeface="+mn-lt"/>
+        <a:ea typeface="+mn-ea"/>
+        <a:cs typeface="+mn-cs"/>
+      </a:defRPr>
+    </a:lvl3pPr>
+    <a:lvl4pPr marL="1371600" algn="l" defTabSz="914400" rtl="0" eaLnBrk="1" latinLnBrk="0" hangingPunct="1">
+      <a:defRPr sz="1200" kern="1200">
+        <a:solidFill>
+          <a:schemeClr val="tx1"/>
+        </a:solidFill>
+        <a:latin typeface="+mn-lt"/>
+        <a:ea typeface="+mn-ea"/>
+        <a:cs typeface="+mn-cs"/>
+      </a:defRPr>
+    </a:lvl4pPr>
+    <a:lvl5pPr marL="1828800" algn="l" defTabSz="914400" rtl="0" eaLnBrk="1" latinLnBrk="0" hangingPunct="1">
+      <a:defRPr sz="1200" kern="1200">
+        <a:solidFill>
+          <a:schemeClr val="tx1"/>
+        </a:solidFill>
+        <a:latin typeface="+mn-lt"/>
+        <a:ea typeface="+mn-ea"/>
+        <a:cs typeface="+mn-cs"/>
+      </a:defRPr>
+    </a:lvl5pPr>
+    <a:lvl6pPr marL="2286000" algn="l" defTabSz="914400" rtl="0" eaLnBrk="1" latinLnBrk="0" hangingPunct="1">
+      <a:defRPr sz="1200" kern="1200">
+        <a:solidFill>
+          <a:schemeClr val="tx1"/>
+        </a:solidFill>
+        <a:latin typeface="+mn-lt"/>
+        <a:ea typeface="+mn-ea"/>
+        <a:cs typeface="+mn-cs"/>
+      </a:defRPr>
+    </a:lvl6pPr>
+    <a:lvl7pPr marL="2743200" algn="l" defTabSz="914400" rtl="0" eaLnBrk="1" latinLnBrk="0" hangingPunct="1">
+      <a:defRPr sz="1200" kern="1200">
+        <a:solidFill>
+          <a:schemeClr val="tx1"/>
+        </a:solidFill>
+        <a:latin typeface="+mn-lt"/>
+        <a:ea typeface="+mn-ea"/>
+        <a:cs typeface="+mn-cs"/>
+      </a:defRPr>
+    </a:lvl7pPr>
+    <a:lvl8pPr marL="3200400" algn="l" defTabSz="914400" rtl="0" eaLnBrk="1" latinLnBrk="0" hangingPunct="1">
+      <a:defRPr sz="1200" kern="1200">
+        <a:solidFill>
+          <a:schemeClr val="tx1"/>
+        </a:solidFill>
+        <a:latin typeface="+mn-lt"/>
+        <a:ea typeface="+mn-ea"/>
+        <a:cs typeface="+mn-cs"/>
+      </a:defRPr>
+    </a:lvl8pPr>
+    <a:lvl9pPr marL="3657600" algn="l" defTabSz="914400" rtl="0" eaLnBrk="1" latinLnBrk="0" hangingPunct="1">
+      <a:defRPr sz="1200" kern="1200">
+        <a:solidFill>
+          <a:schemeClr val="tx1"/>
+        </a:solidFill>
+        <a:latin typeface="+mn-lt"/>
+        <a:ea typeface="+mn-ea"/>
+        <a:cs typeface="+mn-cs"/>
+      </a:defRPr>
+    </a:lvl9pPr>
+  </p:notesStyle>
+</p:notesMaster>
 </file>
 
 <file path=ppt/slideLayouts/slideLayout1.xml><?xml version="1.0" encoding="utf-8"?>
@@ -329,7 +683,7 @@
           <a:bodyPr/>
           <a:lstStyle/>
           <a:p>
-            <a:fld id="{05D05C77-BEE1-4DA0-9A20-2DDFB0AE2DEB}" type="datetimeFigureOut">
+            <a:fld id="{60F94D12-B140-44AB-9BCF-686E9A36E7F9}" type="datetime1">
               <a:rPr lang="nl-BE" smtClean="0"/>
               <a:t>25/01/2016</a:t>
             </a:fld>
@@ -499,7 +853,7 @@
           <a:bodyPr/>
           <a:lstStyle/>
           <a:p>
-            <a:fld id="{05D05C77-BEE1-4DA0-9A20-2DDFB0AE2DEB}" type="datetimeFigureOut">
+            <a:fld id="{2FEFC3DB-1A6D-4461-88CE-FB0E7E817B15}" type="datetime1">
               <a:rPr lang="nl-BE" smtClean="0"/>
               <a:t>25/01/2016</a:t>
             </a:fld>
@@ -679,7 +1033,7 @@
           <a:bodyPr/>
           <a:lstStyle/>
           <a:p>
-            <a:fld id="{05D05C77-BEE1-4DA0-9A20-2DDFB0AE2DEB}" type="datetimeFigureOut">
+            <a:fld id="{69D26C2B-1238-4D64-BADA-0E62E31EEE18}" type="datetime1">
               <a:rPr lang="nl-BE" smtClean="0"/>
               <a:t>25/01/2016</a:t>
             </a:fld>
@@ -849,7 +1203,7 @@
           <a:bodyPr/>
           <a:lstStyle/>
           <a:p>
-            <a:fld id="{05D05C77-BEE1-4DA0-9A20-2DDFB0AE2DEB}" type="datetimeFigureOut">
+            <a:fld id="{0BD83778-8850-499F-8CAE-C6A61D7DCD25}" type="datetime1">
               <a:rPr lang="nl-BE" smtClean="0"/>
               <a:t>25/01/2016</a:t>
             </a:fld>
@@ -1095,7 +1449,7 @@
           <a:bodyPr/>
           <a:lstStyle/>
           <a:p>
-            <a:fld id="{05D05C77-BEE1-4DA0-9A20-2DDFB0AE2DEB}" type="datetimeFigureOut">
+            <a:fld id="{1F48149D-19D8-464B-8509-5F539F015159}" type="datetime1">
               <a:rPr lang="nl-BE" smtClean="0"/>
               <a:t>25/01/2016</a:t>
             </a:fld>
@@ -1383,7 +1737,7 @@
           <a:bodyPr/>
           <a:lstStyle/>
           <a:p>
-            <a:fld id="{05D05C77-BEE1-4DA0-9A20-2DDFB0AE2DEB}" type="datetimeFigureOut">
+            <a:fld id="{14AE17C4-C8F0-4324-895B-538911164891}" type="datetime1">
               <a:rPr lang="nl-BE" smtClean="0"/>
               <a:t>25/01/2016</a:t>
             </a:fld>
@@ -1805,7 +2159,7 @@
           <a:bodyPr/>
           <a:lstStyle/>
           <a:p>
-            <a:fld id="{05D05C77-BEE1-4DA0-9A20-2DDFB0AE2DEB}" type="datetimeFigureOut">
+            <a:fld id="{8AB859B6-31E6-4EC6-908F-79B85B46BD45}" type="datetime1">
               <a:rPr lang="nl-BE" smtClean="0"/>
               <a:t>25/01/2016</a:t>
             </a:fld>
@@ -1923,7 +2277,7 @@
           <a:bodyPr/>
           <a:lstStyle/>
           <a:p>
-            <a:fld id="{05D05C77-BEE1-4DA0-9A20-2DDFB0AE2DEB}" type="datetimeFigureOut">
+            <a:fld id="{E010671F-8E18-4A6A-AE74-9F000FA89897}" type="datetime1">
               <a:rPr lang="nl-BE" smtClean="0"/>
               <a:t>25/01/2016</a:t>
             </a:fld>
@@ -2018,7 +2372,7 @@
           <a:bodyPr/>
           <a:lstStyle/>
           <a:p>
-            <a:fld id="{05D05C77-BEE1-4DA0-9A20-2DDFB0AE2DEB}" type="datetimeFigureOut">
+            <a:fld id="{DC5D6E19-83F9-4651-995F-50C32BCDCDDE}" type="datetime1">
               <a:rPr lang="nl-BE" smtClean="0"/>
               <a:t>25/01/2016</a:t>
             </a:fld>
@@ -2295,7 +2649,7 @@
           <a:bodyPr/>
           <a:lstStyle/>
           <a:p>
-            <a:fld id="{05D05C77-BEE1-4DA0-9A20-2DDFB0AE2DEB}" type="datetimeFigureOut">
+            <a:fld id="{22B64514-C96D-40C9-88EF-E5781A6BBFD9}" type="datetime1">
               <a:rPr lang="nl-BE" smtClean="0"/>
               <a:t>25/01/2016</a:t>
             </a:fld>
@@ -2548,7 +2902,7 @@
           <a:bodyPr/>
           <a:lstStyle/>
           <a:p>
-            <a:fld id="{05D05C77-BEE1-4DA0-9A20-2DDFB0AE2DEB}" type="datetimeFigureOut">
+            <a:fld id="{6E4A3A7F-289F-433D-9B0D-8A66C236C826}" type="datetime1">
               <a:rPr lang="nl-BE" smtClean="0"/>
               <a:t>25/01/2016</a:t>
             </a:fld>
@@ -2761,7 +3115,7 @@
             </a:lvl1pPr>
           </a:lstStyle>
           <a:p>
-            <a:fld id="{05D05C77-BEE1-4DA0-9A20-2DDFB0AE2DEB}" type="datetimeFigureOut">
+            <a:fld id="{75B874DC-FBBE-45D7-90CB-BE603CB98C8B}" type="datetime1">
               <a:rPr lang="nl-BE" smtClean="0"/>
               <a:t>25/01/2016</a:t>
             </a:fld>
@@ -2868,6 +3222,7 @@
     <p:sldLayoutId id="2147483658" r:id="rId10"/>
     <p:sldLayoutId id="2147483659" r:id="rId11"/>
   </p:sldLayoutIdLst>
+  <p:hf hdr="0" ftr="0" dt="0"/>
   <p:txStyles>
     <p:titleStyle>
       <a:lvl1pPr algn="ctr" defTabSz="914400" rtl="0" eaLnBrk="1" latinLnBrk="0" hangingPunct="1">
@@ -3193,8 +3548,14 @@
               <a:rPr lang="en-US" dirty="0" smtClean="0"/>
             </a:br>
             <a:r>
-              <a:rPr lang="en-US" dirty="0" smtClean="0"/>
+              <a:rPr lang="en-US" dirty="0" smtClean="0">
+                <a:hlinkClick r:id="rId2"/>
+              </a:rPr>
               <a:t>geertjan.bex@uhasselt.be</a:t>
+            </a:r>
+            <a:r>
+              <a:rPr lang="en-US" dirty="0" smtClean="0"/>
+              <a:t> </a:t>
             </a:r>
             <a:endParaRPr lang="nl-BE" dirty="0"/>
           </a:p>
@@ -3334,6 +3695,29 @@
               <a:t>non-blocking</a:t>
             </a:r>
             <a:endParaRPr lang="nl-BE" dirty="0"/>
+          </a:p>
+        </p:txBody>
+      </p:sp>
+      <p:sp>
+        <p:nvSpPr>
+          <p:cNvPr id="4" name="Slide Number Placeholder 3"/>
+          <p:cNvSpPr>
+            <a:spLocks noGrp="1"/>
+          </p:cNvSpPr>
+          <p:nvPr>
+            <p:ph type="sldNum" sz="quarter" idx="12"/>
+          </p:nvPr>
+        </p:nvSpPr>
+        <p:spPr/>
+        <p:txBody>
+          <a:bodyPr/>
+          <a:lstStyle/>
+          <a:p>
+            <a:fld id="{D1918C2E-FE36-451E-B80E-1968976550A5}" type="slidenum">
+              <a:rPr lang="nl-BE" smtClean="0"/>
+              <a:t>10</a:t>
+            </a:fld>
+            <a:endParaRPr lang="nl-BE"/>
           </a:p>
         </p:txBody>
       </p:sp>
@@ -3722,11 +4106,7 @@
           <a:p>
             <a:r>
               <a:rPr lang="en-US" dirty="0" smtClean="0"/>
-              <a:t>Peer to </a:t>
-            </a:r>
-            <a:r>
-              <a:rPr lang="en-US" dirty="0" smtClean="0"/>
-              <a:t>peer: Python objects</a:t>
+              <a:t>Peer to peer: Python objects</a:t>
             </a:r>
             <a:endParaRPr lang="nl-BE" dirty="0"/>
           </a:p>
@@ -3817,7 +4197,6 @@
               <a:rPr lang="en-US" dirty="0" smtClean="0"/>
               <a:t>()</a:t>
             </a:r>
-            <a:endParaRPr lang="en-US" dirty="0" smtClean="0"/>
           </a:p>
           <a:p>
             <a:r>
@@ -4115,6 +4494,29 @@
           </p:style>
         </p:cxnSp>
       </p:grpSp>
+      <p:sp>
+        <p:nvSpPr>
+          <p:cNvPr id="11" name="Slide Number Placeholder 10"/>
+          <p:cNvSpPr>
+            <a:spLocks noGrp="1"/>
+          </p:cNvSpPr>
+          <p:nvPr>
+            <p:ph type="sldNum" sz="quarter" idx="12"/>
+          </p:nvPr>
+        </p:nvSpPr>
+        <p:spPr/>
+        <p:txBody>
+          <a:bodyPr/>
+          <a:lstStyle/>
+          <a:p>
+            <a:fld id="{D1918C2E-FE36-451E-B80E-1968976550A5}" type="slidenum">
+              <a:rPr lang="nl-BE" smtClean="0"/>
+              <a:t>11</a:t>
+            </a:fld>
+            <a:endParaRPr lang="nl-BE"/>
+          </a:p>
+        </p:txBody>
+      </p:sp>
     </p:spTree>
     <p:extLst>
       <p:ext uri="{BB962C8B-B14F-4D97-AF65-F5344CB8AC3E}">
@@ -4474,6 +4876,29 @@
               </a:rPr>
               <a:t>(source=1, tag=17)</a:t>
             </a:r>
+          </a:p>
+        </p:txBody>
+      </p:sp>
+      <p:sp>
+        <p:nvSpPr>
+          <p:cNvPr id="6" name="Slide Number Placeholder 5"/>
+          <p:cNvSpPr>
+            <a:spLocks noGrp="1"/>
+          </p:cNvSpPr>
+          <p:nvPr>
+            <p:ph type="sldNum" sz="quarter" idx="12"/>
+          </p:nvPr>
+        </p:nvSpPr>
+        <p:spPr/>
+        <p:txBody>
+          <a:bodyPr/>
+          <a:lstStyle/>
+          <a:p>
+            <a:fld id="{D1918C2E-FE36-451E-B80E-1968976550A5}" type="slidenum">
+              <a:rPr lang="nl-BE" smtClean="0"/>
+              <a:t>12</a:t>
+            </a:fld>
+            <a:endParaRPr lang="nl-BE"/>
           </a:p>
         </p:txBody>
       </p:sp>
@@ -4844,11 +5269,7 @@
             <a:pPr lvl="1"/>
             <a:r>
               <a:rPr lang="en-US" dirty="0" smtClean="0"/>
-              <a:t>can be wildcard for source in </a:t>
-            </a:r>
-            <a:r>
-              <a:rPr lang="en-US" dirty="0" smtClean="0"/>
-              <a:t>receiver (</a:t>
+              <a:t>can be wildcard for source in receiver (</a:t>
             </a:r>
             <a:r>
               <a:rPr lang="en-US" sz="2000" dirty="0" smtClean="0">
@@ -4861,7 +5282,6 @@
               <a:rPr lang="en-US" dirty="0" smtClean="0"/>
               <a:t>)</a:t>
             </a:r>
-            <a:endParaRPr lang="en-US" dirty="0" smtClean="0"/>
           </a:p>
           <a:p>
             <a:r>
@@ -4873,11 +5293,7 @@
             <a:pPr lvl="1"/>
             <a:r>
               <a:rPr lang="en-US" dirty="0" smtClean="0"/>
-              <a:t>can be wildcard for </a:t>
-            </a:r>
-            <a:r>
-              <a:rPr lang="en-US" dirty="0" smtClean="0"/>
-              <a:t>receiver (</a:t>
+              <a:t>can be wildcard for receiver (</a:t>
             </a:r>
             <a:r>
               <a:rPr lang="en-US" sz="2000" dirty="0" smtClean="0">
@@ -4890,7 +5306,6 @@
               <a:rPr lang="en-US" dirty="0" smtClean="0"/>
               <a:t>)</a:t>
             </a:r>
-            <a:endParaRPr lang="en-US" dirty="0" smtClean="0"/>
           </a:p>
         </p:txBody>
       </p:sp>
@@ -4902,7 +5317,7 @@
         </p:nvSpPr>
         <p:spPr>
           <a:xfrm>
-            <a:off x="611560" y="5940569"/>
+            <a:off x="611560" y="5805264"/>
             <a:ext cx="7958269" cy="584775"/>
           </a:xfrm>
           <a:prstGeom prst="rect">
@@ -4958,24 +5373,39 @@
           <a:p>
             <a:r>
               <a:rPr lang="en-US" sz="2400" dirty="0" smtClean="0"/>
-              <a:t>Note: </a:t>
-            </a:r>
-            <a:r>
-              <a:rPr lang="en-US" sz="2400" dirty="0" smtClean="0"/>
-              <a:t>potential for</a:t>
+              <a:t>Note: potential for</a:t>
             </a:r>
             <a:br>
               <a:rPr lang="en-US" sz="2400" dirty="0" smtClean="0"/>
             </a:br>
             <a:r>
               <a:rPr lang="en-US" sz="2400" dirty="0" smtClean="0"/>
-              <a:t>           </a:t>
-            </a:r>
-            <a:r>
-              <a:rPr lang="en-US" sz="2400" dirty="0" smtClean="0"/>
-              <a:t>deadlocks!</a:t>
+              <a:t>           deadlocks!</a:t>
             </a:r>
             <a:endParaRPr lang="nl-BE" sz="2400" dirty="0"/>
+          </a:p>
+        </p:txBody>
+      </p:sp>
+      <p:sp>
+        <p:nvSpPr>
+          <p:cNvPr id="6" name="Slide Number Placeholder 5"/>
+          <p:cNvSpPr>
+            <a:spLocks noGrp="1"/>
+          </p:cNvSpPr>
+          <p:nvPr>
+            <p:ph type="sldNum" sz="quarter" idx="12"/>
+          </p:nvPr>
+        </p:nvSpPr>
+        <p:spPr/>
+        <p:txBody>
+          <a:bodyPr/>
+          <a:lstStyle/>
+          <a:p>
+            <a:fld id="{D1918C2E-FE36-451E-B80E-1968976550A5}" type="slidenum">
+              <a:rPr lang="nl-BE" smtClean="0"/>
+              <a:t>13</a:t>
+            </a:fld>
+            <a:endParaRPr lang="nl-BE"/>
           </a:p>
         </p:txBody>
       </p:sp>
@@ -5371,18 +5801,25 @@
                 <a:latin typeface="Courier New" panose="02070309020205020404" pitchFamily="49" charset="0"/>
                 <a:cs typeface="Courier New" panose="02070309020205020404" pitchFamily="49" charset="0"/>
               </a:rPr>
-              <a:t>comm.b</a:t>
-            </a:r>
+              <a:t>comm.bcast</a:t>
+            </a:r>
+            <a:r>
+              <a:rPr lang="en-US" dirty="0" smtClean="0"/>
+              <a:t>: send message from root to all members</a:t>
+            </a:r>
+          </a:p>
+          <a:p>
+            <a:pPr lvl="1"/>
             <a:r>
               <a:rPr lang="en-US" dirty="0" err="1" smtClean="0">
                 <a:latin typeface="Courier New" panose="02070309020205020404" pitchFamily="49" charset="0"/>
                 <a:cs typeface="Courier New" panose="02070309020205020404" pitchFamily="49" charset="0"/>
               </a:rPr>
-              <a:t>cast</a:t>
-            </a:r>
-            <a:r>
-              <a:rPr lang="en-US" dirty="0" smtClean="0"/>
-              <a:t>: send message from root to all members</a:t>
+              <a:t>comm.scatter</a:t>
+            </a:r>
+            <a:r>
+              <a:rPr lang="en-US" dirty="0" smtClean="0"/>
+              <a:t>: send a possibly unique message from root to all members </a:t>
             </a:r>
           </a:p>
           <a:p>
@@ -5392,64 +5829,21 @@
                 <a:latin typeface="Courier New" panose="02070309020205020404" pitchFamily="49" charset="0"/>
                 <a:cs typeface="Courier New" panose="02070309020205020404" pitchFamily="49" charset="0"/>
               </a:rPr>
-              <a:t>comm.s</a:t>
-            </a:r>
+              <a:t>comm.gather</a:t>
+            </a:r>
+            <a:r>
+              <a:rPr lang="en-US" dirty="0" smtClean="0"/>
+              <a:t>: root retrieves unique messages from all members</a:t>
+            </a:r>
+          </a:p>
+          <a:p>
+            <a:pPr lvl="1"/>
             <a:r>
               <a:rPr lang="en-US" dirty="0" err="1" smtClean="0">
                 <a:latin typeface="Courier New" panose="02070309020205020404" pitchFamily="49" charset="0"/>
                 <a:cs typeface="Courier New" panose="02070309020205020404" pitchFamily="49" charset="0"/>
               </a:rPr>
-              <a:t>catter</a:t>
-            </a:r>
-            <a:r>
-              <a:rPr lang="en-US" dirty="0" smtClean="0"/>
-              <a:t>: send a possibly unique message from root to all members </a:t>
-            </a:r>
-          </a:p>
-          <a:p>
-            <a:pPr lvl="1"/>
-            <a:r>
-              <a:rPr lang="en-US" dirty="0" err="1" smtClean="0">
-                <a:latin typeface="Courier New" panose="02070309020205020404" pitchFamily="49" charset="0"/>
-                <a:cs typeface="Courier New" panose="02070309020205020404" pitchFamily="49" charset="0"/>
-              </a:rPr>
-              <a:t>comm.g</a:t>
-            </a:r>
-            <a:r>
-              <a:rPr lang="en-US" dirty="0" err="1" smtClean="0">
-                <a:latin typeface="Courier New" panose="02070309020205020404" pitchFamily="49" charset="0"/>
-                <a:cs typeface="Courier New" panose="02070309020205020404" pitchFamily="49" charset="0"/>
-              </a:rPr>
-              <a:t>ather</a:t>
-            </a:r>
-            <a:r>
-              <a:rPr lang="en-US" dirty="0" smtClean="0"/>
-              <a:t>: root </a:t>
-            </a:r>
-            <a:r>
-              <a:rPr lang="en-US" dirty="0" smtClean="0"/>
-              <a:t>retrieves </a:t>
-            </a:r>
-            <a:r>
-              <a:rPr lang="en-US" dirty="0" smtClean="0"/>
-              <a:t>unique messages from all members</a:t>
-            </a:r>
-          </a:p>
-          <a:p>
-            <a:pPr lvl="1"/>
-            <a:r>
-              <a:rPr lang="en-US" dirty="0" err="1" smtClean="0">
-                <a:latin typeface="Courier New" panose="02070309020205020404" pitchFamily="49" charset="0"/>
-                <a:cs typeface="Courier New" panose="02070309020205020404" pitchFamily="49" charset="0"/>
-              </a:rPr>
-              <a:t>comm.r</a:t>
-            </a:r>
-            <a:r>
-              <a:rPr lang="en-US" dirty="0" err="1" smtClean="0">
-                <a:latin typeface="Courier New" panose="02070309020205020404" pitchFamily="49" charset="0"/>
-                <a:cs typeface="Courier New" panose="02070309020205020404" pitchFamily="49" charset="0"/>
-              </a:rPr>
-              <a:t>educe</a:t>
+              <a:t>comm.reduce</a:t>
             </a:r>
             <a:r>
               <a:rPr lang="en-US" dirty="0" smtClean="0"/>
@@ -5476,7 +5870,6 @@
               <a:rPr lang="en-US" dirty="0" smtClean="0"/>
               <a:t>…</a:t>
             </a:r>
-            <a:endParaRPr lang="en-US" dirty="0" smtClean="0"/>
           </a:p>
           <a:p>
             <a:r>
@@ -5487,13 +5880,32 @@
           <a:p>
             <a:r>
               <a:rPr lang="en-US" dirty="0" smtClean="0"/>
-              <a:t>Optimization opportunities for library </a:t>
-            </a:r>
-            <a:r>
-              <a:rPr lang="en-US" dirty="0" smtClean="0"/>
-              <a:t>implementations</a:t>
+              <a:t>Optimization opportunities for library implementations</a:t>
             </a:r>
             <a:endParaRPr lang="nl-BE" dirty="0"/>
+          </a:p>
+        </p:txBody>
+      </p:sp>
+      <p:sp>
+        <p:nvSpPr>
+          <p:cNvPr id="4" name="Slide Number Placeholder 3"/>
+          <p:cNvSpPr>
+            <a:spLocks noGrp="1"/>
+          </p:cNvSpPr>
+          <p:nvPr>
+            <p:ph type="sldNum" sz="quarter" idx="12"/>
+          </p:nvPr>
+        </p:nvSpPr>
+        <p:spPr/>
+        <p:txBody>
+          <a:bodyPr/>
+          <a:lstStyle/>
+          <a:p>
+            <a:fld id="{D1918C2E-FE36-451E-B80E-1968976550A5}" type="slidenum">
+              <a:rPr lang="nl-BE" smtClean="0"/>
+              <a:t>14</a:t>
+            </a:fld>
+            <a:endParaRPr lang="nl-BE"/>
           </a:p>
         </p:txBody>
       </p:sp>
@@ -5962,11 +6374,7 @@
           <a:p>
             <a:r>
               <a:rPr lang="en-US" dirty="0" err="1" smtClean="0"/>
-              <a:t>comm.b</a:t>
-            </a:r>
-            <a:r>
-              <a:rPr lang="en-US" dirty="0" err="1" smtClean="0"/>
-              <a:t>cast</a:t>
+              <a:t>comm.bcast</a:t>
             </a:r>
             <a:endParaRPr lang="nl-BE" dirty="0"/>
           </a:p>
@@ -6506,21 +6914,7 @@
                 <a:latin typeface="Courier New" panose="02070309020205020404" pitchFamily="49" charset="0"/>
                 <a:cs typeface="Courier New" panose="02070309020205020404" pitchFamily="49" charset="0"/>
               </a:rPr>
-              <a:t>(buffer</a:t>
-            </a:r>
-            <a:r>
-              <a:rPr lang="en-US" sz="1600" dirty="0" smtClean="0">
-                <a:latin typeface="Courier New" panose="02070309020205020404" pitchFamily="49" charset="0"/>
-                <a:cs typeface="Courier New" panose="02070309020205020404" pitchFamily="49" charset="0"/>
-              </a:rPr>
-              <a:t>, </a:t>
-            </a:r>
-            <a:r>
-              <a:rPr lang="en-US" sz="1600" dirty="0" smtClean="0">
-                <a:latin typeface="Courier New" panose="02070309020205020404" pitchFamily="49" charset="0"/>
-                <a:cs typeface="Courier New" panose="02070309020205020404" pitchFamily="49" charset="0"/>
-              </a:rPr>
-              <a:t>root=</a:t>
+              <a:t>(buffer, root=</a:t>
             </a:r>
             <a:r>
               <a:rPr lang="en-US" sz="1600" dirty="0" err="1" smtClean="0">
@@ -6540,6 +6934,29 @@
               <a:latin typeface="Courier New" panose="02070309020205020404" pitchFamily="49" charset="0"/>
               <a:cs typeface="Courier New" panose="02070309020205020404" pitchFamily="49" charset="0"/>
             </a:endParaRPr>
+          </a:p>
+        </p:txBody>
+      </p:sp>
+      <p:sp>
+        <p:nvSpPr>
+          <p:cNvPr id="8" name="Slide Number Placeholder 7"/>
+          <p:cNvSpPr>
+            <a:spLocks noGrp="1"/>
+          </p:cNvSpPr>
+          <p:nvPr>
+            <p:ph type="sldNum" sz="quarter" idx="12"/>
+          </p:nvPr>
+        </p:nvSpPr>
+        <p:spPr/>
+        <p:txBody>
+          <a:bodyPr/>
+          <a:lstStyle/>
+          <a:p>
+            <a:fld id="{D1918C2E-FE36-451E-B80E-1968976550A5}" type="slidenum">
+              <a:rPr lang="nl-BE" smtClean="0"/>
+              <a:t>15</a:t>
+            </a:fld>
+            <a:endParaRPr lang="nl-BE"/>
           </a:p>
         </p:txBody>
       </p:sp>
@@ -6665,11 +7082,7 @@
           <a:p>
             <a:r>
               <a:rPr lang="en-US" dirty="0" err="1" smtClean="0"/>
-              <a:t>comm.s</a:t>
-            </a:r>
-            <a:r>
-              <a:rPr lang="en-US" dirty="0" err="1" smtClean="0"/>
-              <a:t>catter</a:t>
+              <a:t>comm.scatter</a:t>
             </a:r>
             <a:endParaRPr lang="nl-BE" dirty="0"/>
           </a:p>
@@ -7173,14 +7586,7 @@
                 <a:latin typeface="Courier New" panose="02070309020205020404" pitchFamily="49" charset="0"/>
                 <a:cs typeface="Courier New" panose="02070309020205020404" pitchFamily="49" charset="0"/>
               </a:rPr>
-              <a:t>comm.s</a:t>
-            </a:r>
-            <a:r>
-              <a:rPr lang="en-US" sz="1600" dirty="0" err="1" smtClean="0">
-                <a:latin typeface="Courier New" panose="02070309020205020404" pitchFamily="49" charset="0"/>
-                <a:cs typeface="Courier New" panose="02070309020205020404" pitchFamily="49" charset="0"/>
-              </a:rPr>
-              <a:t>catter</a:t>
+              <a:t>comm.scatter</a:t>
             </a:r>
             <a:r>
               <a:rPr lang="en-US" sz="1600" dirty="0" smtClean="0">
@@ -7574,6 +7980,29 @@
           </p:style>
         </p:cxnSp>
       </p:grpSp>
+      <p:sp>
+        <p:nvSpPr>
+          <p:cNvPr id="12" name="Slide Number Placeholder 11"/>
+          <p:cNvSpPr>
+            <a:spLocks noGrp="1"/>
+          </p:cNvSpPr>
+          <p:nvPr>
+            <p:ph type="sldNum" sz="quarter" idx="12"/>
+          </p:nvPr>
+        </p:nvSpPr>
+        <p:spPr/>
+        <p:txBody>
+          <a:bodyPr/>
+          <a:lstStyle/>
+          <a:p>
+            <a:fld id="{D1918C2E-FE36-451E-B80E-1968976550A5}" type="slidenum">
+              <a:rPr lang="nl-BE" smtClean="0"/>
+              <a:t>16</a:t>
+            </a:fld>
+            <a:endParaRPr lang="nl-BE"/>
+          </a:p>
+        </p:txBody>
+      </p:sp>
     </p:spTree>
     <p:extLst>
       <p:ext uri="{BB962C8B-B14F-4D97-AF65-F5344CB8AC3E}">
@@ -7786,11 +8215,7 @@
           <a:p>
             <a:r>
               <a:rPr lang="en-US" dirty="0" err="1" smtClean="0"/>
-              <a:t>comm.g</a:t>
-            </a:r>
-            <a:r>
-              <a:rPr lang="en-US" dirty="0" err="1" smtClean="0"/>
-              <a:t>ather</a:t>
+              <a:t>comm.gather</a:t>
             </a:r>
             <a:endParaRPr lang="nl-BE" dirty="0"/>
           </a:p>
@@ -8297,14 +8722,7 @@
                 <a:latin typeface="Courier New" panose="02070309020205020404" pitchFamily="49" charset="0"/>
                 <a:cs typeface="Courier New" panose="02070309020205020404" pitchFamily="49" charset="0"/>
               </a:rPr>
-              <a:t>comm.g</a:t>
-            </a:r>
-            <a:r>
-              <a:rPr lang="en-US" sz="1600" dirty="0" err="1" smtClean="0">
-                <a:latin typeface="Courier New" panose="02070309020205020404" pitchFamily="49" charset="0"/>
-                <a:cs typeface="Courier New" panose="02070309020205020404" pitchFamily="49" charset="0"/>
-              </a:rPr>
-              <a:t>ather</a:t>
+              <a:t>comm.gather</a:t>
             </a:r>
             <a:r>
               <a:rPr lang="en-US" sz="1600" dirty="0" smtClean="0">
@@ -8325,14 +8743,7 @@
                 <a:latin typeface="Courier New" panose="02070309020205020404" pitchFamily="49" charset="0"/>
                 <a:cs typeface="Courier New" panose="02070309020205020404" pitchFamily="49" charset="0"/>
               </a:rPr>
-              <a:t>, </a:t>
-            </a:r>
-            <a:r>
-              <a:rPr lang="en-US" sz="1600" dirty="0" smtClean="0">
-                <a:latin typeface="Courier New" panose="02070309020205020404" pitchFamily="49" charset="0"/>
-                <a:cs typeface="Courier New" panose="02070309020205020404" pitchFamily="49" charset="0"/>
-              </a:rPr>
-              <a:t>root=</a:t>
+              <a:t>, root=</a:t>
             </a:r>
             <a:r>
               <a:rPr lang="en-US" sz="1600" dirty="0" err="1" smtClean="0">
@@ -8705,6 +9116,29 @@
           </p:style>
         </p:cxnSp>
       </p:grpSp>
+      <p:sp>
+        <p:nvSpPr>
+          <p:cNvPr id="12" name="Slide Number Placeholder 11"/>
+          <p:cNvSpPr>
+            <a:spLocks noGrp="1"/>
+          </p:cNvSpPr>
+          <p:nvPr>
+            <p:ph type="sldNum" sz="quarter" idx="12"/>
+          </p:nvPr>
+        </p:nvSpPr>
+        <p:spPr/>
+        <p:txBody>
+          <a:bodyPr/>
+          <a:lstStyle/>
+          <a:p>
+            <a:fld id="{D1918C2E-FE36-451E-B80E-1968976550A5}" type="slidenum">
+              <a:rPr lang="nl-BE" smtClean="0"/>
+              <a:t>17</a:t>
+            </a:fld>
+            <a:endParaRPr lang="nl-BE"/>
+          </a:p>
+        </p:txBody>
+      </p:sp>
     </p:spTree>
     <p:extLst>
       <p:ext uri="{BB962C8B-B14F-4D97-AF65-F5344CB8AC3E}">
@@ -8965,11 +9399,7 @@
           <a:p>
             <a:r>
               <a:rPr lang="en-US" dirty="0" err="1" smtClean="0"/>
-              <a:t>comm.r</a:t>
-            </a:r>
-            <a:r>
-              <a:rPr lang="en-US" dirty="0" err="1" smtClean="0"/>
-              <a:t>educe</a:t>
+              <a:t>comm.reduce</a:t>
             </a:r>
             <a:endParaRPr lang="nl-BE" dirty="0"/>
           </a:p>
@@ -9497,14 +9927,7 @@
                 <a:latin typeface="Courier New" panose="02070309020205020404" pitchFamily="49" charset="0"/>
                 <a:cs typeface="Courier New" panose="02070309020205020404" pitchFamily="49" charset="0"/>
               </a:rPr>
-              <a:t>, </a:t>
-            </a:r>
-            <a:r>
-              <a:rPr lang="en-US" sz="1600" dirty="0" smtClean="0">
-                <a:latin typeface="Courier New" panose="02070309020205020404" pitchFamily="49" charset="0"/>
-                <a:cs typeface="Courier New" panose="02070309020205020404" pitchFamily="49" charset="0"/>
-              </a:rPr>
-              <a:t>op=MPI.SUM, root=</a:t>
+              <a:t>, op=MPI.SUM, root=</a:t>
             </a:r>
             <a:r>
               <a:rPr lang="en-US" sz="1600" dirty="0" err="1" smtClean="0">
@@ -9937,6 +10360,29 @@
           </p:style>
         </p:cxnSp>
       </p:grpSp>
+      <p:sp>
+        <p:nvSpPr>
+          <p:cNvPr id="8" name="Slide Number Placeholder 7"/>
+          <p:cNvSpPr>
+            <a:spLocks noGrp="1"/>
+          </p:cNvSpPr>
+          <p:nvPr>
+            <p:ph type="sldNum" sz="quarter" idx="12"/>
+          </p:nvPr>
+        </p:nvSpPr>
+        <p:spPr/>
+        <p:txBody>
+          <a:bodyPr/>
+          <a:lstStyle/>
+          <a:p>
+            <a:fld id="{D1918C2E-FE36-451E-B80E-1968976550A5}" type="slidenum">
+              <a:rPr lang="nl-BE" smtClean="0"/>
+              <a:t>18</a:t>
+            </a:fld>
+            <a:endParaRPr lang="nl-BE"/>
+          </a:p>
+        </p:txBody>
+      </p:sp>
     </p:spTree>
     <p:extLst>
       <p:ext uri="{BB962C8B-B14F-4D97-AF65-F5344CB8AC3E}">
@@ -10197,19 +10643,11 @@
           <a:p>
             <a:r>
               <a:rPr lang="en-US" dirty="0" err="1" smtClean="0"/>
-              <a:t>comm.r</a:t>
-            </a:r>
-            <a:r>
-              <a:rPr lang="en-US" dirty="0" err="1" smtClean="0"/>
-              <a:t>educe</a:t>
-            </a:r>
-            <a:r>
-              <a:rPr lang="en-US" dirty="0" smtClean="0"/>
-              <a:t> </a:t>
-            </a:r>
-            <a:r>
-              <a:rPr lang="en-US" dirty="0" smtClean="0"/>
-              <a:t>operators</a:t>
+              <a:t>comm.reduce</a:t>
+            </a:r>
+            <a:r>
+              <a:rPr lang="en-US" dirty="0" smtClean="0"/>
+              <a:t> operators</a:t>
             </a:r>
             <a:endParaRPr lang="nl-BE" dirty="0"/>
           </a:p>
@@ -10255,10 +10693,6 @@
               </a:rPr>
               <a:t>MPI.PROD</a:t>
             </a:r>
-            <a:endParaRPr lang="en-US" dirty="0" smtClean="0">
-              <a:latin typeface="Courier New" panose="02070309020205020404" pitchFamily="49" charset="0"/>
-              <a:cs typeface="Courier New" panose="02070309020205020404" pitchFamily="49" charset="0"/>
-            </a:endParaRPr>
           </a:p>
           <a:p>
             <a:pPr lvl="1"/>
@@ -10344,10 +10778,6 @@
               </a:rPr>
               <a:t>MPI.LXOR</a:t>
             </a:r>
-            <a:endParaRPr lang="en-US" dirty="0" smtClean="0">
-              <a:latin typeface="Courier New" panose="02070309020205020404" pitchFamily="49" charset="0"/>
-              <a:cs typeface="Courier New" panose="02070309020205020404" pitchFamily="49" charset="0"/>
-            </a:endParaRPr>
           </a:p>
           <a:p>
             <a:r>
@@ -10386,10 +10816,29 @@
               </a:rPr>
               <a:t>MPI.BXOR</a:t>
             </a:r>
-            <a:endParaRPr lang="en-US" dirty="0" smtClean="0">
-              <a:latin typeface="Courier New" panose="02070309020205020404" pitchFamily="49" charset="0"/>
-              <a:cs typeface="Courier New" panose="02070309020205020404" pitchFamily="49" charset="0"/>
-            </a:endParaRPr>
+          </a:p>
+        </p:txBody>
+      </p:sp>
+      <p:sp>
+        <p:nvSpPr>
+          <p:cNvPr id="4" name="Slide Number Placeholder 3"/>
+          <p:cNvSpPr>
+            <a:spLocks noGrp="1"/>
+          </p:cNvSpPr>
+          <p:nvPr>
+            <p:ph type="sldNum" sz="quarter" idx="12"/>
+          </p:nvPr>
+        </p:nvSpPr>
+        <p:spPr/>
+        <p:txBody>
+          <a:bodyPr/>
+          <a:lstStyle/>
+          <a:p>
+            <a:fld id="{D1918C2E-FE36-451E-B80E-1968976550A5}" type="slidenum">
+              <a:rPr lang="nl-BE" smtClean="0"/>
+              <a:t>19</a:t>
+            </a:fld>
+            <a:endParaRPr lang="nl-BE"/>
           </a:p>
         </p:txBody>
       </p:sp>
@@ -10815,6 +11264,29 @@
               <a:rPr lang="en-US" dirty="0" smtClean="0"/>
               <a:t> Passing Interface (MPI)</a:t>
             </a:r>
+          </a:p>
+        </p:txBody>
+      </p:sp>
+      <p:sp>
+        <p:nvSpPr>
+          <p:cNvPr id="4" name="Slide Number Placeholder 3"/>
+          <p:cNvSpPr>
+            <a:spLocks noGrp="1"/>
+          </p:cNvSpPr>
+          <p:nvPr>
+            <p:ph type="sldNum" sz="quarter" idx="12"/>
+          </p:nvPr>
+        </p:nvSpPr>
+        <p:spPr/>
+        <p:txBody>
+          <a:bodyPr/>
+          <a:lstStyle/>
+          <a:p>
+            <a:fld id="{D1918C2E-FE36-451E-B80E-1968976550A5}" type="slidenum">
+              <a:rPr lang="nl-BE" smtClean="0"/>
+              <a:t>2</a:t>
+            </a:fld>
+            <a:endParaRPr lang="nl-BE"/>
           </a:p>
         </p:txBody>
       </p:sp>
@@ -13312,6 +13784,29 @@
           </a:p>
         </p:txBody>
       </p:sp>
+      <p:sp>
+        <p:nvSpPr>
+          <p:cNvPr id="6" name="Slide Number Placeholder 5"/>
+          <p:cNvSpPr>
+            <a:spLocks noGrp="1"/>
+          </p:cNvSpPr>
+          <p:nvPr>
+            <p:ph type="sldNum" sz="quarter" idx="12"/>
+          </p:nvPr>
+        </p:nvSpPr>
+        <p:spPr/>
+        <p:txBody>
+          <a:bodyPr/>
+          <a:lstStyle/>
+          <a:p>
+            <a:fld id="{D1918C2E-FE36-451E-B80E-1968976550A5}" type="slidenum">
+              <a:rPr lang="nl-BE" smtClean="0"/>
+              <a:t>20</a:t>
+            </a:fld>
+            <a:endParaRPr lang="nl-BE"/>
+          </a:p>
+        </p:txBody>
+      </p:sp>
     </p:spTree>
     <p:extLst>
       <p:ext uri="{BB962C8B-B14F-4D97-AF65-F5344CB8AC3E}">
@@ -13527,7 +14022,11 @@
           <a:p>
             <a:r>
               <a:rPr lang="en-US" dirty="0" smtClean="0"/>
-              <a:t>Example: calculate </a:t>
+              <a:t>Example: </a:t>
+            </a:r>
+            <a:r>
+              <a:rPr lang="en-US" dirty="0" smtClean="0"/>
+              <a:t>calculate</a:t>
             </a:r>
             <a:r>
               <a:rPr lang="en-US" dirty="0" smtClean="0">
@@ -13564,16 +14063,27 @@
           <a:p>
             <a:pPr lvl="1"/>
             <a:r>
-              <a:rPr lang="en-US" dirty="0" smtClean="0"/>
-              <a:t>n (from </a:t>
-            </a:r>
-            <a:r>
-              <a:rPr lang="en-US" dirty="0" err="1" smtClean="0"/>
-              <a:t>argv</a:t>
-            </a:r>
-            <a:r>
-              <a:rPr lang="en-US" dirty="0" smtClean="0"/>
-              <a:t> if applicable)</a:t>
+              <a:rPr lang="en-US" i="1" dirty="0" smtClean="0"/>
+              <a:t>n</a:t>
+            </a:r>
+            <a:r>
+              <a:rPr lang="en-US" dirty="0" smtClean="0"/>
+              <a:t> (from </a:t>
+            </a:r>
+            <a:r>
+              <a:rPr lang="en-US" dirty="0" err="1" smtClean="0">
+                <a:latin typeface="Courier New" panose="02070309020205020404" pitchFamily="49" charset="0"/>
+                <a:cs typeface="Courier New" panose="02070309020205020404" pitchFamily="49" charset="0"/>
+              </a:rPr>
+              <a:t>sys.argv</a:t>
+            </a:r>
+            <a:r>
+              <a:rPr lang="en-US" dirty="0" smtClean="0"/>
+              <a:t> </a:t>
+            </a:r>
+            <a:r>
+              <a:rPr lang="en-US" dirty="0" smtClean="0"/>
+              <a:t>if applicable)</a:t>
             </a:r>
           </a:p>
           <a:p>
@@ -13593,7 +14103,11 @@
             <a:pPr lvl="1"/>
             <a:r>
               <a:rPr lang="en-US" dirty="0" smtClean="0"/>
-              <a:t>broadcasts n</a:t>
+              <a:t>broadcasts </a:t>
+            </a:r>
+            <a:r>
+              <a:rPr lang="en-US" i="1" dirty="0" smtClean="0"/>
+              <a:t>n</a:t>
             </a:r>
           </a:p>
           <a:p>
@@ -13764,6 +14278,29 @@
           </p:style>
         </p:cxnSp>
       </p:grpSp>
+      <p:sp>
+        <p:nvSpPr>
+          <p:cNvPr id="7" name="Slide Number Placeholder 6"/>
+          <p:cNvSpPr>
+            <a:spLocks noGrp="1"/>
+          </p:cNvSpPr>
+          <p:nvPr>
+            <p:ph type="sldNum" sz="quarter" idx="12"/>
+          </p:nvPr>
+        </p:nvSpPr>
+        <p:spPr/>
+        <p:txBody>
+          <a:bodyPr/>
+          <a:lstStyle/>
+          <a:p>
+            <a:fld id="{D1918C2E-FE36-451E-B80E-1968976550A5}" type="slidenum">
+              <a:rPr lang="nl-BE" smtClean="0"/>
+              <a:t>21</a:t>
+            </a:fld>
+            <a:endParaRPr lang="nl-BE"/>
+          </a:p>
+        </p:txBody>
+      </p:sp>
     </p:spTree>
     <p:extLst>
       <p:ext uri="{BB962C8B-B14F-4D97-AF65-F5344CB8AC3E}">
@@ -13886,6 +14423,848 @@
           <a:p>
             <a:r>
               <a:rPr lang="en-US" dirty="0" smtClean="0"/>
+              <a:t>Implementation for</a:t>
+            </a:r>
+            <a:r>
+              <a:rPr lang="en-US" dirty="0" smtClean="0">
+                <a:sym typeface="Symbol"/>
+              </a:rPr>
+              <a:t></a:t>
+            </a:r>
+            <a:endParaRPr lang="nl-BE" dirty="0"/>
+          </a:p>
+        </p:txBody>
+      </p:sp>
+      <p:sp>
+        <p:nvSpPr>
+          <p:cNvPr id="4" name="TextBox 3"/>
+          <p:cNvSpPr txBox="1"/>
+          <p:nvPr/>
+        </p:nvSpPr>
+        <p:spPr>
+          <a:xfrm>
+            <a:off x="395536" y="1340768"/>
+            <a:ext cx="7837402" cy="5262979"/>
+          </a:xfrm>
+          <a:prstGeom prst="rect">
+            <a:avLst/>
+          </a:prstGeom>
+          <a:noFill/>
+          <a:ln>
+            <a:solidFill>
+              <a:schemeClr val="tx1"/>
+            </a:solidFill>
+          </a:ln>
+        </p:spPr>
+        <p:txBody>
+          <a:bodyPr wrap="none" rtlCol="0">
+            <a:spAutoFit/>
+          </a:bodyPr>
+          <a:lstStyle/>
+          <a:p>
+            <a:r>
+              <a:rPr lang="en-US" sz="1600" dirty="0" smtClean="0">
+                <a:latin typeface="Courier New" panose="02070309020205020404" pitchFamily="49" charset="0"/>
+                <a:cs typeface="Courier New" panose="02070309020205020404" pitchFamily="49" charset="0"/>
+              </a:rPr>
+              <a:t>…</a:t>
+            </a:r>
+          </a:p>
+          <a:p>
+            <a:r>
+              <a:rPr lang="en-US" sz="1600" dirty="0" smtClean="0">
+                <a:latin typeface="Courier New" panose="02070309020205020404" pitchFamily="49" charset="0"/>
+                <a:cs typeface="Courier New" panose="02070309020205020404" pitchFamily="49" charset="0"/>
+              </a:rPr>
+              <a:t>root = 0</a:t>
+            </a:r>
+          </a:p>
+          <a:p>
+            <a:r>
+              <a:rPr lang="en-US" sz="1600" dirty="0" err="1" smtClean="0">
+                <a:latin typeface="Courier New" panose="02070309020205020404" pitchFamily="49" charset="0"/>
+                <a:cs typeface="Courier New" panose="02070309020205020404" pitchFamily="49" charset="0"/>
+              </a:rPr>
+              <a:t>comm</a:t>
+            </a:r>
+            <a:r>
+              <a:rPr lang="en-US" sz="1600" dirty="0" smtClean="0">
+                <a:latin typeface="Courier New" panose="02070309020205020404" pitchFamily="49" charset="0"/>
+                <a:cs typeface="Courier New" panose="02070309020205020404" pitchFamily="49" charset="0"/>
+              </a:rPr>
+              <a:t> = MPI.COMM_WORLD</a:t>
+            </a:r>
+          </a:p>
+          <a:p>
+            <a:r>
+              <a:rPr lang="en-US" sz="1600" dirty="0" smtClean="0">
+                <a:latin typeface="Courier New" panose="02070309020205020404" pitchFamily="49" charset="0"/>
+                <a:cs typeface="Courier New" panose="02070309020205020404" pitchFamily="49" charset="0"/>
+              </a:rPr>
+              <a:t>rank = </a:t>
+            </a:r>
+            <a:r>
+              <a:rPr lang="en-US" sz="1600" dirty="0" err="1" smtClean="0">
+                <a:latin typeface="Courier New" panose="02070309020205020404" pitchFamily="49" charset="0"/>
+                <a:cs typeface="Courier New" panose="02070309020205020404" pitchFamily="49" charset="0"/>
+              </a:rPr>
+              <a:t>comm.Get_rank</a:t>
+            </a:r>
+            <a:r>
+              <a:rPr lang="en-US" sz="1600" dirty="0" smtClean="0">
+                <a:latin typeface="Courier New" panose="02070309020205020404" pitchFamily="49" charset="0"/>
+                <a:cs typeface="Courier New" panose="02070309020205020404" pitchFamily="49" charset="0"/>
+              </a:rPr>
+              <a:t>()</a:t>
+            </a:r>
+          </a:p>
+          <a:p>
+            <a:r>
+              <a:rPr lang="en-US" sz="1600" dirty="0" smtClean="0">
+                <a:latin typeface="Courier New" panose="02070309020205020404" pitchFamily="49" charset="0"/>
+                <a:cs typeface="Courier New" panose="02070309020205020404" pitchFamily="49" charset="0"/>
+              </a:rPr>
+              <a:t>size = </a:t>
+            </a:r>
+            <a:r>
+              <a:rPr lang="en-US" sz="1600" dirty="0" err="1" smtClean="0">
+                <a:latin typeface="Courier New" panose="02070309020205020404" pitchFamily="49" charset="0"/>
+                <a:cs typeface="Courier New" panose="02070309020205020404" pitchFamily="49" charset="0"/>
+              </a:rPr>
+              <a:t>comm.Get_size</a:t>
+            </a:r>
+            <a:r>
+              <a:rPr lang="en-US" sz="1600" dirty="0" smtClean="0">
+                <a:latin typeface="Courier New" panose="02070309020205020404" pitchFamily="49" charset="0"/>
+                <a:cs typeface="Courier New" panose="02070309020205020404" pitchFamily="49" charset="0"/>
+              </a:rPr>
+              <a:t>()</a:t>
+            </a:r>
+          </a:p>
+          <a:p>
+            <a:r>
+              <a:rPr lang="en-US" sz="1600" dirty="0" smtClean="0">
+                <a:latin typeface="Courier New" panose="02070309020205020404" pitchFamily="49" charset="0"/>
+                <a:cs typeface="Courier New" panose="02070309020205020404" pitchFamily="49" charset="0"/>
+              </a:rPr>
+              <a:t>options = </a:t>
+            </a:r>
+            <a:r>
+              <a:rPr lang="en-US" sz="1600" dirty="0" err="1" smtClean="0">
+                <a:latin typeface="Courier New" panose="02070309020205020404" pitchFamily="49" charset="0"/>
+                <a:cs typeface="Courier New" panose="02070309020205020404" pitchFamily="49" charset="0"/>
+              </a:rPr>
+              <a:t>arg_parser.parse_args</a:t>
+            </a:r>
+            <a:r>
+              <a:rPr lang="en-US" sz="1600" dirty="0" smtClean="0">
+                <a:latin typeface="Courier New" panose="02070309020205020404" pitchFamily="49" charset="0"/>
+                <a:cs typeface="Courier New" panose="02070309020205020404" pitchFamily="49" charset="0"/>
+              </a:rPr>
+              <a:t>()</a:t>
+            </a:r>
+            <a:endParaRPr lang="nl-BE" sz="1600" dirty="0" smtClean="0">
+              <a:latin typeface="Courier New" panose="02070309020205020404" pitchFamily="49" charset="0"/>
+              <a:cs typeface="Courier New" panose="02070309020205020404" pitchFamily="49" charset="0"/>
+            </a:endParaRPr>
+          </a:p>
+          <a:p>
+            <a:r>
+              <a:rPr lang="nl-BE" sz="1600" dirty="0" err="1" smtClean="0">
+                <a:latin typeface="Courier New" panose="02070309020205020404" pitchFamily="49" charset="0"/>
+                <a:cs typeface="Courier New" panose="02070309020205020404" pitchFamily="49" charset="0"/>
+              </a:rPr>
+              <a:t>lbounds</a:t>
+            </a:r>
+            <a:r>
+              <a:rPr lang="nl-BE" sz="1600" dirty="0" smtClean="0">
+                <a:latin typeface="Courier New" panose="02070309020205020404" pitchFamily="49" charset="0"/>
+                <a:cs typeface="Courier New" panose="02070309020205020404" pitchFamily="49" charset="0"/>
+              </a:rPr>
+              <a:t> </a:t>
+            </a:r>
+            <a:r>
+              <a:rPr lang="nl-BE" sz="1600" dirty="0">
+                <a:latin typeface="Courier New" panose="02070309020205020404" pitchFamily="49" charset="0"/>
+                <a:cs typeface="Courier New" panose="02070309020205020404" pitchFamily="49" charset="0"/>
+              </a:rPr>
+              <a:t>= []</a:t>
+            </a:r>
+          </a:p>
+          <a:p>
+            <a:r>
+              <a:rPr lang="nl-BE" sz="1600" dirty="0" err="1" smtClean="0">
+                <a:latin typeface="Courier New" panose="02070309020205020404" pitchFamily="49" charset="0"/>
+                <a:cs typeface="Courier New" panose="02070309020205020404" pitchFamily="49" charset="0"/>
+              </a:rPr>
+              <a:t>ubounds</a:t>
+            </a:r>
+            <a:r>
+              <a:rPr lang="nl-BE" sz="1600" dirty="0" smtClean="0">
+                <a:latin typeface="Courier New" panose="02070309020205020404" pitchFamily="49" charset="0"/>
+                <a:cs typeface="Courier New" panose="02070309020205020404" pitchFamily="49" charset="0"/>
+              </a:rPr>
+              <a:t> </a:t>
+            </a:r>
+            <a:r>
+              <a:rPr lang="nl-BE" sz="1600" dirty="0">
+                <a:latin typeface="Courier New" panose="02070309020205020404" pitchFamily="49" charset="0"/>
+                <a:cs typeface="Courier New" panose="02070309020205020404" pitchFamily="49" charset="0"/>
+              </a:rPr>
+              <a:t>= []</a:t>
+            </a:r>
+          </a:p>
+          <a:p>
+            <a:r>
+              <a:rPr lang="nl-BE" sz="1600" dirty="0" err="1" smtClean="0">
+                <a:latin typeface="Courier New" panose="02070309020205020404" pitchFamily="49" charset="0"/>
+                <a:cs typeface="Courier New" panose="02070309020205020404" pitchFamily="49" charset="0"/>
+              </a:rPr>
+              <a:t>if</a:t>
+            </a:r>
+            <a:r>
+              <a:rPr lang="nl-BE" sz="1600" dirty="0" smtClean="0">
+                <a:latin typeface="Courier New" panose="02070309020205020404" pitchFamily="49" charset="0"/>
+                <a:cs typeface="Courier New" panose="02070309020205020404" pitchFamily="49" charset="0"/>
+              </a:rPr>
+              <a:t> </a:t>
+            </a:r>
+            <a:r>
+              <a:rPr lang="nl-BE" sz="1600" dirty="0">
+                <a:latin typeface="Courier New" panose="02070309020205020404" pitchFamily="49" charset="0"/>
+                <a:cs typeface="Courier New" panose="02070309020205020404" pitchFamily="49" charset="0"/>
+              </a:rPr>
+              <a:t>rank == root:</a:t>
+            </a:r>
+          </a:p>
+          <a:p>
+            <a:r>
+              <a:rPr lang="nl-BE" sz="1600" dirty="0" smtClean="0">
+                <a:latin typeface="Courier New" panose="02070309020205020404" pitchFamily="49" charset="0"/>
+                <a:cs typeface="Courier New" panose="02070309020205020404" pitchFamily="49" charset="0"/>
+              </a:rPr>
+              <a:t>    </a:t>
+            </a:r>
+            <a:r>
+              <a:rPr lang="nl-BE" sz="1600" dirty="0" err="1">
+                <a:latin typeface="Courier New" panose="02070309020205020404" pitchFamily="49" charset="0"/>
+                <a:cs typeface="Courier New" panose="02070309020205020404" pitchFamily="49" charset="0"/>
+              </a:rPr>
+              <a:t>for</a:t>
+            </a:r>
+            <a:r>
+              <a:rPr lang="nl-BE" sz="1600" dirty="0">
+                <a:latin typeface="Courier New" panose="02070309020205020404" pitchFamily="49" charset="0"/>
+                <a:cs typeface="Courier New" panose="02070309020205020404" pitchFamily="49" charset="0"/>
+              </a:rPr>
+              <a:t> r in range(</a:t>
+            </a:r>
+            <a:r>
+              <a:rPr lang="nl-BE" sz="1600" dirty="0" err="1">
+                <a:latin typeface="Courier New" panose="02070309020205020404" pitchFamily="49" charset="0"/>
+                <a:cs typeface="Courier New" panose="02070309020205020404" pitchFamily="49" charset="0"/>
+              </a:rPr>
+              <a:t>size</a:t>
+            </a:r>
+            <a:r>
+              <a:rPr lang="nl-BE" sz="1600" dirty="0">
+                <a:latin typeface="Courier New" panose="02070309020205020404" pitchFamily="49" charset="0"/>
+                <a:cs typeface="Courier New" panose="02070309020205020404" pitchFamily="49" charset="0"/>
+              </a:rPr>
+              <a:t>):</a:t>
+            </a:r>
+          </a:p>
+          <a:p>
+            <a:r>
+              <a:rPr lang="nl-BE" sz="1600" dirty="0" smtClean="0">
+                <a:latin typeface="Courier New" panose="02070309020205020404" pitchFamily="49" charset="0"/>
+                <a:cs typeface="Courier New" panose="02070309020205020404" pitchFamily="49" charset="0"/>
+              </a:rPr>
+              <a:t>        </a:t>
+            </a:r>
+            <a:r>
+              <a:rPr lang="nl-BE" sz="1600" dirty="0" err="1">
+                <a:latin typeface="Courier New" panose="02070309020205020404" pitchFamily="49" charset="0"/>
+                <a:cs typeface="Courier New" panose="02070309020205020404" pitchFamily="49" charset="0"/>
+              </a:rPr>
+              <a:t>lbound</a:t>
+            </a:r>
+            <a:r>
+              <a:rPr lang="nl-BE" sz="1600" dirty="0">
+                <a:latin typeface="Courier New" panose="02070309020205020404" pitchFamily="49" charset="0"/>
+                <a:cs typeface="Courier New" panose="02070309020205020404" pitchFamily="49" charset="0"/>
+              </a:rPr>
+              <a:t>, </a:t>
+            </a:r>
+            <a:r>
+              <a:rPr lang="nl-BE" sz="1600" dirty="0" err="1">
+                <a:latin typeface="Courier New" panose="02070309020205020404" pitchFamily="49" charset="0"/>
+                <a:cs typeface="Courier New" panose="02070309020205020404" pitchFamily="49" charset="0"/>
+              </a:rPr>
+              <a:t>ubound</a:t>
+            </a:r>
+            <a:r>
+              <a:rPr lang="nl-BE" sz="1600" dirty="0">
+                <a:latin typeface="Courier New" panose="02070309020205020404" pitchFamily="49" charset="0"/>
+                <a:cs typeface="Courier New" panose="02070309020205020404" pitchFamily="49" charset="0"/>
+              </a:rPr>
+              <a:t> = </a:t>
+            </a:r>
+            <a:r>
+              <a:rPr lang="nl-BE" sz="1600" dirty="0" err="1">
+                <a:latin typeface="Courier New" panose="02070309020205020404" pitchFamily="49" charset="0"/>
+                <a:cs typeface="Courier New" panose="02070309020205020404" pitchFamily="49" charset="0"/>
+              </a:rPr>
+              <a:t>compute_bounds</a:t>
+            </a:r>
+            <a:r>
+              <a:rPr lang="nl-BE" sz="1600" dirty="0">
+                <a:latin typeface="Courier New" panose="02070309020205020404" pitchFamily="49" charset="0"/>
+                <a:cs typeface="Courier New" panose="02070309020205020404" pitchFamily="49" charset="0"/>
+              </a:rPr>
+              <a:t>(</a:t>
+            </a:r>
+            <a:r>
+              <a:rPr lang="nl-BE" sz="1600" dirty="0" err="1">
+                <a:latin typeface="Courier New" panose="02070309020205020404" pitchFamily="49" charset="0"/>
+                <a:cs typeface="Courier New" panose="02070309020205020404" pitchFamily="49" charset="0"/>
+              </a:rPr>
+              <a:t>size</a:t>
+            </a:r>
+            <a:r>
+              <a:rPr lang="nl-BE" sz="1600" dirty="0">
+                <a:latin typeface="Courier New" panose="02070309020205020404" pitchFamily="49" charset="0"/>
+                <a:cs typeface="Courier New" panose="02070309020205020404" pitchFamily="49" charset="0"/>
+              </a:rPr>
+              <a:t>, r, </a:t>
+            </a:r>
+            <a:r>
+              <a:rPr lang="nl-BE" sz="1600" dirty="0" err="1">
+                <a:latin typeface="Courier New" panose="02070309020205020404" pitchFamily="49" charset="0"/>
+                <a:cs typeface="Courier New" panose="02070309020205020404" pitchFamily="49" charset="0"/>
+              </a:rPr>
+              <a:t>options.n</a:t>
+            </a:r>
+            <a:r>
+              <a:rPr lang="nl-BE" sz="1600" dirty="0">
+                <a:latin typeface="Courier New" panose="02070309020205020404" pitchFamily="49" charset="0"/>
+                <a:cs typeface="Courier New" panose="02070309020205020404" pitchFamily="49" charset="0"/>
+              </a:rPr>
+              <a:t>, 0)</a:t>
+            </a:r>
+          </a:p>
+          <a:p>
+            <a:r>
+              <a:rPr lang="nl-BE" sz="1600" dirty="0" smtClean="0">
+                <a:latin typeface="Courier New" panose="02070309020205020404" pitchFamily="49" charset="0"/>
+                <a:cs typeface="Courier New" panose="02070309020205020404" pitchFamily="49" charset="0"/>
+              </a:rPr>
+              <a:t>        </a:t>
+            </a:r>
+            <a:r>
+              <a:rPr lang="nl-BE" sz="1600" dirty="0" err="1">
+                <a:latin typeface="Courier New" panose="02070309020205020404" pitchFamily="49" charset="0"/>
+                <a:cs typeface="Courier New" panose="02070309020205020404" pitchFamily="49" charset="0"/>
+              </a:rPr>
+              <a:t>lbounds.append</a:t>
+            </a:r>
+            <a:r>
+              <a:rPr lang="nl-BE" sz="1600" dirty="0">
+                <a:latin typeface="Courier New" panose="02070309020205020404" pitchFamily="49" charset="0"/>
+                <a:cs typeface="Courier New" panose="02070309020205020404" pitchFamily="49" charset="0"/>
+              </a:rPr>
+              <a:t>(</a:t>
+            </a:r>
+            <a:r>
+              <a:rPr lang="nl-BE" sz="1600" dirty="0" err="1">
+                <a:latin typeface="Courier New" panose="02070309020205020404" pitchFamily="49" charset="0"/>
+                <a:cs typeface="Courier New" panose="02070309020205020404" pitchFamily="49" charset="0"/>
+              </a:rPr>
+              <a:t>lbound</a:t>
+            </a:r>
+            <a:r>
+              <a:rPr lang="nl-BE" sz="1600" dirty="0">
+                <a:latin typeface="Courier New" panose="02070309020205020404" pitchFamily="49" charset="0"/>
+                <a:cs typeface="Courier New" panose="02070309020205020404" pitchFamily="49" charset="0"/>
+              </a:rPr>
+              <a:t>)</a:t>
+            </a:r>
+          </a:p>
+          <a:p>
+            <a:r>
+              <a:rPr lang="nl-BE" sz="1600" dirty="0" smtClean="0">
+                <a:latin typeface="Courier New" panose="02070309020205020404" pitchFamily="49" charset="0"/>
+                <a:cs typeface="Courier New" panose="02070309020205020404" pitchFamily="49" charset="0"/>
+              </a:rPr>
+              <a:t>        </a:t>
+            </a:r>
+            <a:r>
+              <a:rPr lang="nl-BE" sz="1600" dirty="0" err="1">
+                <a:latin typeface="Courier New" panose="02070309020205020404" pitchFamily="49" charset="0"/>
+                <a:cs typeface="Courier New" panose="02070309020205020404" pitchFamily="49" charset="0"/>
+              </a:rPr>
+              <a:t>ubounds.append</a:t>
+            </a:r>
+            <a:r>
+              <a:rPr lang="nl-BE" sz="1600" dirty="0">
+                <a:latin typeface="Courier New" panose="02070309020205020404" pitchFamily="49" charset="0"/>
+                <a:cs typeface="Courier New" panose="02070309020205020404" pitchFamily="49" charset="0"/>
+              </a:rPr>
+              <a:t>(</a:t>
+            </a:r>
+            <a:r>
+              <a:rPr lang="nl-BE" sz="1600" dirty="0" err="1">
+                <a:latin typeface="Courier New" panose="02070309020205020404" pitchFamily="49" charset="0"/>
+                <a:cs typeface="Courier New" panose="02070309020205020404" pitchFamily="49" charset="0"/>
+              </a:rPr>
+              <a:t>ubound</a:t>
+            </a:r>
+            <a:r>
+              <a:rPr lang="nl-BE" sz="1600" dirty="0">
+                <a:latin typeface="Courier New" panose="02070309020205020404" pitchFamily="49" charset="0"/>
+                <a:cs typeface="Courier New" panose="02070309020205020404" pitchFamily="49" charset="0"/>
+              </a:rPr>
+              <a:t>)</a:t>
+            </a:r>
+          </a:p>
+          <a:p>
+            <a:r>
+              <a:rPr lang="nl-BE" sz="1600" dirty="0" smtClean="0">
+                <a:latin typeface="Courier New" panose="02070309020205020404" pitchFamily="49" charset="0"/>
+                <a:cs typeface="Courier New" panose="02070309020205020404" pitchFamily="49" charset="0"/>
+              </a:rPr>
+              <a:t>n </a:t>
+            </a:r>
+            <a:r>
+              <a:rPr lang="nl-BE" sz="1600" dirty="0">
+                <a:latin typeface="Courier New" panose="02070309020205020404" pitchFamily="49" charset="0"/>
+                <a:cs typeface="Courier New" panose="02070309020205020404" pitchFamily="49" charset="0"/>
+              </a:rPr>
+              <a:t>= </a:t>
+            </a:r>
+            <a:r>
+              <a:rPr lang="nl-BE" sz="1600" dirty="0" err="1">
+                <a:latin typeface="Courier New" panose="02070309020205020404" pitchFamily="49" charset="0"/>
+                <a:cs typeface="Courier New" panose="02070309020205020404" pitchFamily="49" charset="0"/>
+              </a:rPr>
+              <a:t>comm.bcast</a:t>
+            </a:r>
+            <a:r>
+              <a:rPr lang="nl-BE" sz="1600" dirty="0">
+                <a:latin typeface="Courier New" panose="02070309020205020404" pitchFamily="49" charset="0"/>
+                <a:cs typeface="Courier New" panose="02070309020205020404" pitchFamily="49" charset="0"/>
+              </a:rPr>
+              <a:t>(</a:t>
+            </a:r>
+            <a:r>
+              <a:rPr lang="nl-BE" sz="1600" dirty="0" err="1">
+                <a:latin typeface="Courier New" panose="02070309020205020404" pitchFamily="49" charset="0"/>
+                <a:cs typeface="Courier New" panose="02070309020205020404" pitchFamily="49" charset="0"/>
+              </a:rPr>
+              <a:t>options.n</a:t>
+            </a:r>
+            <a:r>
+              <a:rPr lang="nl-BE" sz="1600" dirty="0">
+                <a:latin typeface="Courier New" panose="02070309020205020404" pitchFamily="49" charset="0"/>
+                <a:cs typeface="Courier New" panose="02070309020205020404" pitchFamily="49" charset="0"/>
+              </a:rPr>
+              <a:t>, root=root)</a:t>
+            </a:r>
+          </a:p>
+          <a:p>
+            <a:r>
+              <a:rPr lang="nl-BE" sz="1600" dirty="0" err="1" smtClean="0">
+                <a:latin typeface="Courier New" panose="02070309020205020404" pitchFamily="49" charset="0"/>
+                <a:cs typeface="Courier New" panose="02070309020205020404" pitchFamily="49" charset="0"/>
+              </a:rPr>
+              <a:t>verbose</a:t>
+            </a:r>
+            <a:r>
+              <a:rPr lang="nl-BE" sz="1600" dirty="0" smtClean="0">
+                <a:latin typeface="Courier New" panose="02070309020205020404" pitchFamily="49" charset="0"/>
+                <a:cs typeface="Courier New" panose="02070309020205020404" pitchFamily="49" charset="0"/>
+              </a:rPr>
+              <a:t> </a:t>
+            </a:r>
+            <a:r>
+              <a:rPr lang="nl-BE" sz="1600" dirty="0">
+                <a:latin typeface="Courier New" panose="02070309020205020404" pitchFamily="49" charset="0"/>
+                <a:cs typeface="Courier New" panose="02070309020205020404" pitchFamily="49" charset="0"/>
+              </a:rPr>
+              <a:t>= </a:t>
+            </a:r>
+            <a:r>
+              <a:rPr lang="nl-BE" sz="1600" dirty="0" err="1">
+                <a:latin typeface="Courier New" panose="02070309020205020404" pitchFamily="49" charset="0"/>
+                <a:cs typeface="Courier New" panose="02070309020205020404" pitchFamily="49" charset="0"/>
+              </a:rPr>
+              <a:t>comm.bcast</a:t>
+            </a:r>
+            <a:r>
+              <a:rPr lang="nl-BE" sz="1600" dirty="0">
+                <a:latin typeface="Courier New" panose="02070309020205020404" pitchFamily="49" charset="0"/>
+                <a:cs typeface="Courier New" panose="02070309020205020404" pitchFamily="49" charset="0"/>
+              </a:rPr>
+              <a:t>(</a:t>
+            </a:r>
+            <a:r>
+              <a:rPr lang="nl-BE" sz="1600" dirty="0" err="1">
+                <a:latin typeface="Courier New" panose="02070309020205020404" pitchFamily="49" charset="0"/>
+                <a:cs typeface="Courier New" panose="02070309020205020404" pitchFamily="49" charset="0"/>
+              </a:rPr>
+              <a:t>options.verbose</a:t>
+            </a:r>
+            <a:r>
+              <a:rPr lang="nl-BE" sz="1600" dirty="0">
+                <a:latin typeface="Courier New" panose="02070309020205020404" pitchFamily="49" charset="0"/>
+                <a:cs typeface="Courier New" panose="02070309020205020404" pitchFamily="49" charset="0"/>
+              </a:rPr>
+              <a:t>, root=root)</a:t>
+            </a:r>
+          </a:p>
+          <a:p>
+            <a:r>
+              <a:rPr lang="nl-BE" sz="1600" dirty="0" err="1" smtClean="0">
+                <a:latin typeface="Courier New" panose="02070309020205020404" pitchFamily="49" charset="0"/>
+                <a:cs typeface="Courier New" panose="02070309020205020404" pitchFamily="49" charset="0"/>
+              </a:rPr>
+              <a:t>lbound</a:t>
+            </a:r>
+            <a:r>
+              <a:rPr lang="nl-BE" sz="1600" dirty="0" smtClean="0">
+                <a:latin typeface="Courier New" panose="02070309020205020404" pitchFamily="49" charset="0"/>
+                <a:cs typeface="Courier New" panose="02070309020205020404" pitchFamily="49" charset="0"/>
+              </a:rPr>
+              <a:t> </a:t>
+            </a:r>
+            <a:r>
+              <a:rPr lang="nl-BE" sz="1600" dirty="0">
+                <a:latin typeface="Courier New" panose="02070309020205020404" pitchFamily="49" charset="0"/>
+                <a:cs typeface="Courier New" panose="02070309020205020404" pitchFamily="49" charset="0"/>
+              </a:rPr>
+              <a:t>= </a:t>
+            </a:r>
+            <a:r>
+              <a:rPr lang="nl-BE" sz="1600" dirty="0" err="1">
+                <a:latin typeface="Courier New" panose="02070309020205020404" pitchFamily="49" charset="0"/>
+                <a:cs typeface="Courier New" panose="02070309020205020404" pitchFamily="49" charset="0"/>
+              </a:rPr>
+              <a:t>comm.scatter</a:t>
+            </a:r>
+            <a:r>
+              <a:rPr lang="nl-BE" sz="1600" dirty="0">
+                <a:latin typeface="Courier New" panose="02070309020205020404" pitchFamily="49" charset="0"/>
+                <a:cs typeface="Courier New" panose="02070309020205020404" pitchFamily="49" charset="0"/>
+              </a:rPr>
+              <a:t>(</a:t>
+            </a:r>
+            <a:r>
+              <a:rPr lang="nl-BE" sz="1600" dirty="0" err="1">
+                <a:latin typeface="Courier New" panose="02070309020205020404" pitchFamily="49" charset="0"/>
+                <a:cs typeface="Courier New" panose="02070309020205020404" pitchFamily="49" charset="0"/>
+              </a:rPr>
+              <a:t>lbounds</a:t>
+            </a:r>
+            <a:r>
+              <a:rPr lang="nl-BE" sz="1600" dirty="0">
+                <a:latin typeface="Courier New" panose="02070309020205020404" pitchFamily="49" charset="0"/>
+                <a:cs typeface="Courier New" panose="02070309020205020404" pitchFamily="49" charset="0"/>
+              </a:rPr>
+              <a:t>, root=root)</a:t>
+            </a:r>
+          </a:p>
+          <a:p>
+            <a:r>
+              <a:rPr lang="nl-BE" sz="1600" dirty="0" err="1" smtClean="0">
+                <a:latin typeface="Courier New" panose="02070309020205020404" pitchFamily="49" charset="0"/>
+                <a:cs typeface="Courier New" panose="02070309020205020404" pitchFamily="49" charset="0"/>
+              </a:rPr>
+              <a:t>ubound</a:t>
+            </a:r>
+            <a:r>
+              <a:rPr lang="nl-BE" sz="1600" dirty="0" smtClean="0">
+                <a:latin typeface="Courier New" panose="02070309020205020404" pitchFamily="49" charset="0"/>
+                <a:cs typeface="Courier New" panose="02070309020205020404" pitchFamily="49" charset="0"/>
+              </a:rPr>
+              <a:t> </a:t>
+            </a:r>
+            <a:r>
+              <a:rPr lang="nl-BE" sz="1600" dirty="0">
+                <a:latin typeface="Courier New" panose="02070309020205020404" pitchFamily="49" charset="0"/>
+                <a:cs typeface="Courier New" panose="02070309020205020404" pitchFamily="49" charset="0"/>
+              </a:rPr>
+              <a:t>= </a:t>
+            </a:r>
+            <a:r>
+              <a:rPr lang="nl-BE" sz="1600" dirty="0" err="1">
+                <a:latin typeface="Courier New" panose="02070309020205020404" pitchFamily="49" charset="0"/>
+                <a:cs typeface="Courier New" panose="02070309020205020404" pitchFamily="49" charset="0"/>
+              </a:rPr>
+              <a:t>comm.scatter</a:t>
+            </a:r>
+            <a:r>
+              <a:rPr lang="nl-BE" sz="1600" dirty="0">
+                <a:latin typeface="Courier New" panose="02070309020205020404" pitchFamily="49" charset="0"/>
+                <a:cs typeface="Courier New" panose="02070309020205020404" pitchFamily="49" charset="0"/>
+              </a:rPr>
+              <a:t>(</a:t>
+            </a:r>
+            <a:r>
+              <a:rPr lang="nl-BE" sz="1600" dirty="0" err="1">
+                <a:latin typeface="Courier New" panose="02070309020205020404" pitchFamily="49" charset="0"/>
+                <a:cs typeface="Courier New" panose="02070309020205020404" pitchFamily="49" charset="0"/>
+              </a:rPr>
+              <a:t>ubounds</a:t>
+            </a:r>
+            <a:r>
+              <a:rPr lang="nl-BE" sz="1600" dirty="0">
+                <a:latin typeface="Courier New" panose="02070309020205020404" pitchFamily="49" charset="0"/>
+                <a:cs typeface="Courier New" panose="02070309020205020404" pitchFamily="49" charset="0"/>
+              </a:rPr>
+              <a:t>, root=root)</a:t>
+            </a:r>
+          </a:p>
+          <a:p>
+            <a:r>
+              <a:rPr lang="nl-BE" sz="1600" dirty="0" err="1" smtClean="0">
+                <a:latin typeface="Courier New" panose="02070309020205020404" pitchFamily="49" charset="0"/>
+                <a:cs typeface="Courier New" panose="02070309020205020404" pitchFamily="49" charset="0"/>
+              </a:rPr>
+              <a:t>partial_sum</a:t>
+            </a:r>
+            <a:r>
+              <a:rPr lang="nl-BE" sz="1600" dirty="0" smtClean="0">
+                <a:latin typeface="Courier New" panose="02070309020205020404" pitchFamily="49" charset="0"/>
+                <a:cs typeface="Courier New" panose="02070309020205020404" pitchFamily="49" charset="0"/>
+              </a:rPr>
+              <a:t> </a:t>
+            </a:r>
+            <a:r>
+              <a:rPr lang="nl-BE" sz="1600" dirty="0">
+                <a:latin typeface="Courier New" panose="02070309020205020404" pitchFamily="49" charset="0"/>
+                <a:cs typeface="Courier New" panose="02070309020205020404" pitchFamily="49" charset="0"/>
+              </a:rPr>
+              <a:t>= </a:t>
+            </a:r>
+            <a:r>
+              <a:rPr lang="nl-BE" sz="1600" dirty="0" err="1">
+                <a:latin typeface="Courier New" panose="02070309020205020404" pitchFamily="49" charset="0"/>
+                <a:cs typeface="Courier New" panose="02070309020205020404" pitchFamily="49" charset="0"/>
+              </a:rPr>
+              <a:t>partial_pi</a:t>
+            </a:r>
+            <a:r>
+              <a:rPr lang="nl-BE" sz="1600" dirty="0">
+                <a:latin typeface="Courier New" panose="02070309020205020404" pitchFamily="49" charset="0"/>
+                <a:cs typeface="Courier New" panose="02070309020205020404" pitchFamily="49" charset="0"/>
+              </a:rPr>
+              <a:t>(</a:t>
+            </a:r>
+            <a:r>
+              <a:rPr lang="nl-BE" sz="1600" dirty="0" err="1">
+                <a:latin typeface="Courier New" panose="02070309020205020404" pitchFamily="49" charset="0"/>
+                <a:cs typeface="Courier New" panose="02070309020205020404" pitchFamily="49" charset="0"/>
+              </a:rPr>
+              <a:t>lbound</a:t>
+            </a:r>
+            <a:r>
+              <a:rPr lang="nl-BE" sz="1600" dirty="0">
+                <a:latin typeface="Courier New" panose="02070309020205020404" pitchFamily="49" charset="0"/>
+                <a:cs typeface="Courier New" panose="02070309020205020404" pitchFamily="49" charset="0"/>
+              </a:rPr>
+              <a:t>, </a:t>
+            </a:r>
+            <a:r>
+              <a:rPr lang="nl-BE" sz="1600" dirty="0" err="1">
+                <a:latin typeface="Courier New" panose="02070309020205020404" pitchFamily="49" charset="0"/>
+                <a:cs typeface="Courier New" panose="02070309020205020404" pitchFamily="49" charset="0"/>
+              </a:rPr>
+              <a:t>ubound</a:t>
+            </a:r>
+            <a:r>
+              <a:rPr lang="nl-BE" sz="1600" dirty="0">
+                <a:latin typeface="Courier New" panose="02070309020205020404" pitchFamily="49" charset="0"/>
+                <a:cs typeface="Courier New" panose="02070309020205020404" pitchFamily="49" charset="0"/>
+              </a:rPr>
+              <a:t>, n)</a:t>
+            </a:r>
+          </a:p>
+          <a:p>
+            <a:r>
+              <a:rPr lang="nl-BE" sz="1600" dirty="0" err="1" smtClean="0">
+                <a:latin typeface="Courier New" panose="02070309020205020404" pitchFamily="49" charset="0"/>
+                <a:cs typeface="Courier New" panose="02070309020205020404" pitchFamily="49" charset="0"/>
+              </a:rPr>
+              <a:t>total_sum</a:t>
+            </a:r>
+            <a:r>
+              <a:rPr lang="nl-BE" sz="1600" dirty="0" smtClean="0">
+                <a:latin typeface="Courier New" panose="02070309020205020404" pitchFamily="49" charset="0"/>
+                <a:cs typeface="Courier New" panose="02070309020205020404" pitchFamily="49" charset="0"/>
+              </a:rPr>
+              <a:t> </a:t>
+            </a:r>
+            <a:r>
+              <a:rPr lang="nl-BE" sz="1600" dirty="0">
+                <a:latin typeface="Courier New" panose="02070309020205020404" pitchFamily="49" charset="0"/>
+                <a:cs typeface="Courier New" panose="02070309020205020404" pitchFamily="49" charset="0"/>
+              </a:rPr>
+              <a:t>= </a:t>
+            </a:r>
+            <a:r>
+              <a:rPr lang="nl-BE" sz="1600" dirty="0" err="1">
+                <a:latin typeface="Courier New" panose="02070309020205020404" pitchFamily="49" charset="0"/>
+                <a:cs typeface="Courier New" panose="02070309020205020404" pitchFamily="49" charset="0"/>
+              </a:rPr>
+              <a:t>comm.reduce</a:t>
+            </a:r>
+            <a:r>
+              <a:rPr lang="nl-BE" sz="1600" dirty="0">
+                <a:latin typeface="Courier New" panose="02070309020205020404" pitchFamily="49" charset="0"/>
+                <a:cs typeface="Courier New" panose="02070309020205020404" pitchFamily="49" charset="0"/>
+              </a:rPr>
+              <a:t>(</a:t>
+            </a:r>
+            <a:r>
+              <a:rPr lang="nl-BE" sz="1600" dirty="0" err="1">
+                <a:latin typeface="Courier New" panose="02070309020205020404" pitchFamily="49" charset="0"/>
+                <a:cs typeface="Courier New" panose="02070309020205020404" pitchFamily="49" charset="0"/>
+              </a:rPr>
+              <a:t>partial_sum</a:t>
+            </a:r>
+            <a:r>
+              <a:rPr lang="nl-BE" sz="1600" dirty="0">
+                <a:latin typeface="Courier New" panose="02070309020205020404" pitchFamily="49" charset="0"/>
+                <a:cs typeface="Courier New" panose="02070309020205020404" pitchFamily="49" charset="0"/>
+              </a:rPr>
+              <a:t>, op=MPI.SUM, root=root)</a:t>
+            </a:r>
+          </a:p>
+          <a:p>
+            <a:r>
+              <a:rPr lang="nl-BE" sz="1600" dirty="0" err="1" smtClean="0">
+                <a:latin typeface="Courier New" panose="02070309020205020404" pitchFamily="49" charset="0"/>
+                <a:cs typeface="Courier New" panose="02070309020205020404" pitchFamily="49" charset="0"/>
+              </a:rPr>
+              <a:t>if</a:t>
+            </a:r>
+            <a:r>
+              <a:rPr lang="nl-BE" sz="1600" dirty="0" smtClean="0">
+                <a:latin typeface="Courier New" panose="02070309020205020404" pitchFamily="49" charset="0"/>
+                <a:cs typeface="Courier New" panose="02070309020205020404" pitchFamily="49" charset="0"/>
+              </a:rPr>
+              <a:t> </a:t>
+            </a:r>
+            <a:r>
+              <a:rPr lang="nl-BE" sz="1600" dirty="0">
+                <a:latin typeface="Courier New" panose="02070309020205020404" pitchFamily="49" charset="0"/>
+                <a:cs typeface="Courier New" panose="02070309020205020404" pitchFamily="49" charset="0"/>
+              </a:rPr>
+              <a:t>rank == root:</a:t>
+            </a:r>
+          </a:p>
+          <a:p>
+            <a:r>
+              <a:rPr lang="nl-BE" sz="1600" dirty="0" smtClean="0">
+                <a:latin typeface="Courier New" panose="02070309020205020404" pitchFamily="49" charset="0"/>
+                <a:cs typeface="Courier New" panose="02070309020205020404" pitchFamily="49" charset="0"/>
+              </a:rPr>
+              <a:t>    </a:t>
+            </a:r>
+            <a:r>
+              <a:rPr lang="nl-BE" sz="1600" dirty="0">
+                <a:latin typeface="Courier New" panose="02070309020205020404" pitchFamily="49" charset="0"/>
+                <a:cs typeface="Courier New" panose="02070309020205020404" pitchFamily="49" charset="0"/>
+              </a:rPr>
+              <a:t>print('pi = {0:.12f}'.format(</a:t>
+            </a:r>
+            <a:r>
+              <a:rPr lang="nl-BE" sz="1600" dirty="0" err="1">
+                <a:latin typeface="Courier New" panose="02070309020205020404" pitchFamily="49" charset="0"/>
+                <a:cs typeface="Courier New" panose="02070309020205020404" pitchFamily="49" charset="0"/>
+              </a:rPr>
+              <a:t>total_sum</a:t>
+            </a:r>
+            <a:r>
+              <a:rPr lang="nl-BE" sz="1600" dirty="0">
+                <a:latin typeface="Courier New" panose="02070309020205020404" pitchFamily="49" charset="0"/>
+                <a:cs typeface="Courier New" panose="02070309020205020404" pitchFamily="49" charset="0"/>
+              </a:rPr>
+              <a:t>/n))</a:t>
+            </a:r>
+          </a:p>
+        </p:txBody>
+      </p:sp>
+      <p:sp>
+        <p:nvSpPr>
+          <p:cNvPr id="5" name="Slide Number Placeholder 4"/>
+          <p:cNvSpPr>
+            <a:spLocks noGrp="1"/>
+          </p:cNvSpPr>
+          <p:nvPr>
+            <p:ph type="sldNum" sz="quarter" idx="12"/>
+          </p:nvPr>
+        </p:nvSpPr>
+        <p:spPr/>
+        <p:txBody>
+          <a:bodyPr/>
+          <a:lstStyle/>
+          <a:p>
+            <a:fld id="{D1918C2E-FE36-451E-B80E-1968976550A5}" type="slidenum">
+              <a:rPr lang="nl-BE" smtClean="0"/>
+              <a:t>22</a:t>
+            </a:fld>
+            <a:endParaRPr lang="nl-BE"/>
+          </a:p>
+        </p:txBody>
+      </p:sp>
+    </p:spTree>
+    <p:extLst>
+      <p:ext uri="{BB962C8B-B14F-4D97-AF65-F5344CB8AC3E}">
+        <p14:creationId xmlns:p14="http://schemas.microsoft.com/office/powerpoint/2010/main" val="2119041623"/>
+      </p:ext>
+    </p:extLst>
+  </p:cSld>
+  <p:clrMapOvr>
+    <a:masterClrMapping/>
+  </p:clrMapOvr>
+</p:sld>
+</file>
+
+<file path=ppt/slides/slide23.xml><?xml version="1.0" encoding="utf-8"?>
+<p:sld xmlns:a="http://schemas.openxmlformats.org/drawingml/2006/main" xmlns:r="http://schemas.openxmlformats.org/officeDocument/2006/relationships" xmlns:p="http://schemas.openxmlformats.org/presentationml/2006/main">
+  <p:cSld>
+    <p:spTree>
+      <p:nvGrpSpPr>
+        <p:cNvPr id="1" name=""/>
+        <p:cNvGrpSpPr/>
+        <p:nvPr/>
+      </p:nvGrpSpPr>
+      <p:grpSpPr>
+        <a:xfrm>
+          <a:off x="0" y="0"/>
+          <a:ext cx="0" cy="0"/>
+          <a:chOff x="0" y="0"/>
+          <a:chExt cx="0" cy="0"/>
+        </a:xfrm>
+      </p:grpSpPr>
+      <p:sp>
+        <p:nvSpPr>
+          <p:cNvPr id="2" name="Title 1"/>
+          <p:cNvSpPr>
+            <a:spLocks noGrp="1"/>
+          </p:cNvSpPr>
+          <p:nvPr>
+            <p:ph type="title"/>
+          </p:nvPr>
+        </p:nvSpPr>
+        <p:spPr/>
+        <p:txBody>
+          <a:bodyPr/>
+          <a:lstStyle/>
+          <a:p>
+            <a:r>
+              <a:rPr lang="en-US" dirty="0" smtClean="0"/>
               <a:t>Data types</a:t>
             </a:r>
             <a:endParaRPr lang="nl-BE" dirty="0"/>
@@ -13927,7 +15306,6 @@
               <a:rPr lang="en-US" dirty="0" smtClean="0"/>
               <a:t>cons: slow, memory overhead</a:t>
             </a:r>
-            <a:endParaRPr lang="en-US" dirty="0" smtClean="0"/>
           </a:p>
           <a:p>
             <a:r>
@@ -13965,6 +15343,29 @@
               <a:t>cons: somewhat more involved API</a:t>
             </a:r>
             <a:endParaRPr lang="nl-BE" dirty="0"/>
+          </a:p>
+        </p:txBody>
+      </p:sp>
+      <p:sp>
+        <p:nvSpPr>
+          <p:cNvPr id="4" name="Slide Number Placeholder 3"/>
+          <p:cNvSpPr>
+            <a:spLocks noGrp="1"/>
+          </p:cNvSpPr>
+          <p:nvPr>
+            <p:ph type="sldNum" sz="quarter" idx="12"/>
+          </p:nvPr>
+        </p:nvSpPr>
+        <p:spPr/>
+        <p:txBody>
+          <a:bodyPr/>
+          <a:lstStyle/>
+          <a:p>
+            <a:fld id="{D1918C2E-FE36-451E-B80E-1968976550A5}" type="slidenum">
+              <a:rPr lang="nl-BE" smtClean="0"/>
+              <a:t>23</a:t>
+            </a:fld>
+            <a:endParaRPr lang="nl-BE"/>
           </a:p>
         </p:txBody>
       </p:sp>
@@ -14239,7 +15640,7 @@
 </p:sld>
 </file>
 
-<file path=ppt/slides/slide23.xml><?xml version="1.0" encoding="utf-8"?>
+<file path=ppt/slides/slide24.xml><?xml version="1.0" encoding="utf-8"?>
 <p:sld xmlns:a="http://schemas.openxmlformats.org/drawingml/2006/main" xmlns:r="http://schemas.openxmlformats.org/officeDocument/2006/relationships" xmlns:p="http://schemas.openxmlformats.org/presentationml/2006/main">
   <p:cSld>
     <p:spTree>
@@ -14340,11 +15741,7 @@
             </a:r>
             <a:r>
               <a:rPr lang="en-US" dirty="0" smtClean="0"/>
-              <a:t> </a:t>
-            </a:r>
-            <a:r>
-              <a:rPr lang="en-US" dirty="0" smtClean="0"/>
-              <a:t>topology</a:t>
+              <a:t> topology</a:t>
             </a:r>
           </a:p>
           <a:p>
@@ -14491,6 +15888,29 @@
           </p:style>
         </p:cxnSp>
       </p:grpSp>
+      <p:sp>
+        <p:nvSpPr>
+          <p:cNvPr id="4" name="Slide Number Placeholder 3"/>
+          <p:cNvSpPr>
+            <a:spLocks noGrp="1"/>
+          </p:cNvSpPr>
+          <p:nvPr>
+            <p:ph type="sldNum" sz="quarter" idx="12"/>
+          </p:nvPr>
+        </p:nvSpPr>
+        <p:spPr/>
+        <p:txBody>
+          <a:bodyPr/>
+          <a:lstStyle/>
+          <a:p>
+            <a:fld id="{D1918C2E-FE36-451E-B80E-1968976550A5}" type="slidenum">
+              <a:rPr lang="nl-BE" smtClean="0"/>
+              <a:t>24</a:t>
+            </a:fld>
+            <a:endParaRPr lang="nl-BE"/>
+          </a:p>
+        </p:txBody>
+      </p:sp>
     </p:spTree>
     <p:extLst>
       <p:ext uri="{BB962C8B-B14F-4D97-AF65-F5344CB8AC3E}">
@@ -14834,7 +16254,7 @@
 </p:sld>
 </file>
 
-<file path=ppt/slides/slide24.xml><?xml version="1.0" encoding="utf-8"?>
+<file path=ppt/slides/slide25.xml><?xml version="1.0" encoding="utf-8"?>
 <p:sld xmlns:a="http://schemas.openxmlformats.org/drawingml/2006/main" xmlns:r="http://schemas.openxmlformats.org/officeDocument/2006/relationships" xmlns:p="http://schemas.openxmlformats.org/presentationml/2006/main">
   <p:cSld>
     <p:spTree>
@@ -14985,6 +16405,29 @@
               <a:rPr lang="en-US" dirty="0" smtClean="0"/>
               <a:t> write data</a:t>
             </a:r>
+          </a:p>
+        </p:txBody>
+      </p:sp>
+      <p:sp>
+        <p:nvSpPr>
+          <p:cNvPr id="4" name="Slide Number Placeholder 3"/>
+          <p:cNvSpPr>
+            <a:spLocks noGrp="1"/>
+          </p:cNvSpPr>
+          <p:nvPr>
+            <p:ph type="sldNum" sz="quarter" idx="12"/>
+          </p:nvPr>
+        </p:nvSpPr>
+        <p:spPr/>
+        <p:txBody>
+          <a:bodyPr/>
+          <a:lstStyle/>
+          <a:p>
+            <a:fld id="{D1918C2E-FE36-451E-B80E-1968976550A5}" type="slidenum">
+              <a:rPr lang="nl-BE" smtClean="0"/>
+              <a:t>25</a:t>
+            </a:fld>
+            <a:endParaRPr lang="nl-BE"/>
           </a:p>
         </p:txBody>
       </p:sp>
@@ -15344,7 +16787,7 @@
 </p:sld>
 </file>
 
-<file path=ppt/slides/slide25.xml><?xml version="1.0" encoding="utf-8"?>
+<file path=ppt/slides/slide26.xml><?xml version="1.0" encoding="utf-8"?>
 <p:sld xmlns:a="http://schemas.openxmlformats.org/drawingml/2006/main" xmlns:r="http://schemas.openxmlformats.org/officeDocument/2006/relationships" xmlns:p="http://schemas.openxmlformats.org/presentationml/2006/main">
   <p:cSld>
     <p:spTree>
@@ -15455,6 +16898,29 @@
           </a:p>
           <a:p>
             <a:endParaRPr lang="nl-BE" dirty="0"/>
+          </a:p>
+        </p:txBody>
+      </p:sp>
+      <p:sp>
+        <p:nvSpPr>
+          <p:cNvPr id="4" name="Slide Number Placeholder 3"/>
+          <p:cNvSpPr>
+            <a:spLocks noGrp="1"/>
+          </p:cNvSpPr>
+          <p:nvPr>
+            <p:ph type="sldNum" sz="quarter" idx="12"/>
+          </p:nvPr>
+        </p:nvSpPr>
+        <p:spPr/>
+        <p:txBody>
+          <a:bodyPr/>
+          <a:lstStyle/>
+          <a:p>
+            <a:fld id="{D1918C2E-FE36-451E-B80E-1968976550A5}" type="slidenum">
+              <a:rPr lang="nl-BE" smtClean="0"/>
+              <a:t>26</a:t>
+            </a:fld>
+            <a:endParaRPr lang="nl-BE"/>
           </a:p>
         </p:txBody>
       </p:sp>
@@ -15850,7 +17316,7 @@
 </p:sld>
 </file>
 
-<file path=ppt/slides/slide26.xml><?xml version="1.0" encoding="utf-8"?>
+<file path=ppt/slides/slide27.xml><?xml version="1.0" encoding="utf-8"?>
 <p:sld xmlns:a="http://schemas.openxmlformats.org/drawingml/2006/main" xmlns:r="http://schemas.openxmlformats.org/officeDocument/2006/relationships" xmlns:p="http://schemas.openxmlformats.org/presentationml/2006/main">
   <p:cSld>
     <p:spTree>
@@ -16010,6 +17476,29 @@
               <a:t>or die!</a:t>
             </a:r>
             <a:endParaRPr lang="nl-BE" sz="2800" dirty="0"/>
+          </a:p>
+        </p:txBody>
+      </p:sp>
+      <p:sp>
+        <p:nvSpPr>
+          <p:cNvPr id="5" name="Slide Number Placeholder 4"/>
+          <p:cNvSpPr>
+            <a:spLocks noGrp="1"/>
+          </p:cNvSpPr>
+          <p:nvPr>
+            <p:ph type="sldNum" sz="quarter" idx="12"/>
+          </p:nvPr>
+        </p:nvSpPr>
+        <p:spPr/>
+        <p:txBody>
+          <a:bodyPr/>
+          <a:lstStyle/>
+          <a:p>
+            <a:fld id="{D1918C2E-FE36-451E-B80E-1968976550A5}" type="slidenum">
+              <a:rPr lang="nl-BE" smtClean="0"/>
+              <a:t>27</a:t>
+            </a:fld>
+            <a:endParaRPr lang="nl-BE"/>
           </a:p>
         </p:txBody>
       </p:sp>
@@ -16441,7 +17930,7 @@
 </p:sld>
 </file>
 
-<file path=ppt/slides/slide27.xml><?xml version="1.0" encoding="utf-8"?>
+<file path=ppt/slides/slide28.xml><?xml version="1.0" encoding="utf-8"?>
 <p:sld xmlns:a="http://schemas.openxmlformats.org/drawingml/2006/main" xmlns:r="http://schemas.openxmlformats.org/officeDocument/2006/relationships" xmlns:p="http://schemas.openxmlformats.org/presentationml/2006/main">
   <p:cSld>
     <p:spTree>
@@ -16534,6 +18023,29 @@
               <a:rPr lang="en-US" dirty="0" smtClean="0"/>
               <a:t>Important for efficiency</a:t>
             </a:r>
+          </a:p>
+        </p:txBody>
+      </p:sp>
+      <p:sp>
+        <p:nvSpPr>
+          <p:cNvPr id="4" name="Slide Number Placeholder 3"/>
+          <p:cNvSpPr>
+            <a:spLocks noGrp="1"/>
+          </p:cNvSpPr>
+          <p:nvPr>
+            <p:ph type="sldNum" sz="quarter" idx="12"/>
+          </p:nvPr>
+        </p:nvSpPr>
+        <p:spPr/>
+        <p:txBody>
+          <a:bodyPr/>
+          <a:lstStyle/>
+          <a:p>
+            <a:fld id="{D1918C2E-FE36-451E-B80E-1968976550A5}" type="slidenum">
+              <a:rPr lang="nl-BE" smtClean="0"/>
+              <a:t>28</a:t>
+            </a:fld>
+            <a:endParaRPr lang="nl-BE"/>
           </a:p>
         </p:txBody>
       </p:sp>
@@ -16826,7 +18338,7 @@
 </p:sld>
 </file>
 
-<file path=ppt/slides/slide28.xml><?xml version="1.0" encoding="utf-8"?>
+<file path=ppt/slides/slide29.xml><?xml version="1.0" encoding="utf-8"?>
 <p:sld xmlns:a="http://schemas.openxmlformats.org/drawingml/2006/main" xmlns:r="http://schemas.openxmlformats.org/officeDocument/2006/relationships" xmlns:p="http://schemas.openxmlformats.org/presentationml/2006/main">
   <p:cSld>
     <p:spTree>
@@ -17279,6 +18791,29 @@
           </a:graphicData>
         </a:graphic>
       </p:graphicFrame>
+      <p:sp>
+        <p:nvSpPr>
+          <p:cNvPr id="4" name="Slide Number Placeholder 3"/>
+          <p:cNvSpPr>
+            <a:spLocks noGrp="1"/>
+          </p:cNvSpPr>
+          <p:nvPr>
+            <p:ph type="sldNum" sz="quarter" idx="12"/>
+          </p:nvPr>
+        </p:nvSpPr>
+        <p:spPr/>
+        <p:txBody>
+          <a:bodyPr/>
+          <a:lstStyle/>
+          <a:p>
+            <a:fld id="{D1918C2E-FE36-451E-B80E-1968976550A5}" type="slidenum">
+              <a:rPr lang="nl-BE" smtClean="0"/>
+              <a:t>29</a:t>
+            </a:fld>
+            <a:endParaRPr lang="nl-BE"/>
+          </a:p>
+        </p:txBody>
+      </p:sp>
     </p:spTree>
     <p:extLst>
       <p:ext uri="{BB962C8B-B14F-4D97-AF65-F5344CB8AC3E}">
@@ -17481,6 +19016,29 @@
               <a:t> </a:t>
             </a:r>
             <a:endParaRPr lang="nl-BE" dirty="0"/>
+          </a:p>
+        </p:txBody>
+      </p:sp>
+      <p:sp>
+        <p:nvSpPr>
+          <p:cNvPr id="5" name="Slide Number Placeholder 4"/>
+          <p:cNvSpPr>
+            <a:spLocks noGrp="1"/>
+          </p:cNvSpPr>
+          <p:nvPr>
+            <p:ph type="sldNum" sz="quarter" idx="12"/>
+          </p:nvPr>
+        </p:nvSpPr>
+        <p:spPr/>
+        <p:txBody>
+          <a:bodyPr/>
+          <a:lstStyle/>
+          <a:p>
+            <a:fld id="{D1918C2E-FE36-451E-B80E-1968976550A5}" type="slidenum">
+              <a:rPr lang="nl-BE" smtClean="0"/>
+              <a:t>3</a:t>
+            </a:fld>
+            <a:endParaRPr lang="nl-BE"/>
           </a:p>
         </p:txBody>
       </p:sp>
@@ -18198,6 +19756,29 @@
               <a:t>computing</a:t>
             </a:r>
             <a:endParaRPr lang="nl-BE" sz="2800" dirty="0"/>
+          </a:p>
+        </p:txBody>
+      </p:sp>
+      <p:sp>
+        <p:nvSpPr>
+          <p:cNvPr id="5" name="Slide Number Placeholder 4"/>
+          <p:cNvSpPr>
+            <a:spLocks noGrp="1"/>
+          </p:cNvSpPr>
+          <p:nvPr>
+            <p:ph type="sldNum" sz="quarter" idx="12"/>
+          </p:nvPr>
+        </p:nvSpPr>
+        <p:spPr/>
+        <p:txBody>
+          <a:bodyPr/>
+          <a:lstStyle/>
+          <a:p>
+            <a:fld id="{D1918C2E-FE36-451E-B80E-1968976550A5}" type="slidenum">
+              <a:rPr lang="nl-BE" smtClean="0"/>
+              <a:t>4</a:t>
+            </a:fld>
+            <a:endParaRPr lang="nl-BE"/>
           </a:p>
         </p:txBody>
       </p:sp>
@@ -18943,6 +20524,29 @@
           </a:p>
         </p:txBody>
       </p:sp>
+      <p:sp>
+        <p:nvSpPr>
+          <p:cNvPr id="5" name="Slide Number Placeholder 4"/>
+          <p:cNvSpPr>
+            <a:spLocks noGrp="1"/>
+          </p:cNvSpPr>
+          <p:nvPr>
+            <p:ph type="sldNum" sz="quarter" idx="12"/>
+          </p:nvPr>
+        </p:nvSpPr>
+        <p:spPr/>
+        <p:txBody>
+          <a:bodyPr/>
+          <a:lstStyle/>
+          <a:p>
+            <a:fld id="{D1918C2E-FE36-451E-B80E-1968976550A5}" type="slidenum">
+              <a:rPr lang="nl-BE" smtClean="0"/>
+              <a:t>5</a:t>
+            </a:fld>
+            <a:endParaRPr lang="nl-BE"/>
+          </a:p>
+        </p:txBody>
+      </p:sp>
     </p:spTree>
     <p:extLst>
       <p:ext uri="{BB962C8B-B14F-4D97-AF65-F5344CB8AC3E}">
@@ -19086,7 +20690,7 @@
         </p:nvSpPr>
         <p:spPr>
           <a:xfrm>
-            <a:off x="457200" y="4653136"/>
+            <a:off x="457200" y="4149080"/>
             <a:ext cx="8229600" cy="1656184"/>
           </a:xfrm>
         </p:spPr>
@@ -19259,10 +20863,6 @@
               </a:rPr>
               <a:t>()</a:t>
             </a:r>
-            <a:endParaRPr lang="en-US" dirty="0" smtClean="0">
-              <a:latin typeface="Courier New" panose="02070309020205020404" pitchFamily="49" charset="0"/>
-              <a:cs typeface="Courier New" panose="02070309020205020404" pitchFamily="49" charset="0"/>
-            </a:endParaRPr>
           </a:p>
           <a:p>
             <a:r>
@@ -19286,10 +20886,6 @@
               </a:rPr>
               <a:t>()</a:t>
             </a:r>
-            <a:endParaRPr lang="en-US" dirty="0" smtClean="0">
-              <a:latin typeface="Courier New" panose="02070309020205020404" pitchFamily="49" charset="0"/>
-              <a:cs typeface="Courier New" panose="02070309020205020404" pitchFamily="49" charset="0"/>
-            </a:endParaRPr>
           </a:p>
           <a:p>
             <a:r>
@@ -19314,7 +20910,7 @@
         </p:nvSpPr>
         <p:spPr>
           <a:xfrm>
-            <a:off x="7214963" y="5301208"/>
+            <a:off x="6876256" y="5013176"/>
             <a:ext cx="1838965" cy="1200329"/>
           </a:xfrm>
           <a:prstGeom prst="rect">
@@ -19379,6 +20975,29 @@
               <a:latin typeface="Courier New" panose="02070309020205020404" pitchFamily="49" charset="0"/>
               <a:cs typeface="Courier New" panose="02070309020205020404" pitchFamily="49" charset="0"/>
             </a:endParaRPr>
+          </a:p>
+        </p:txBody>
+      </p:sp>
+      <p:sp>
+        <p:nvSpPr>
+          <p:cNvPr id="6" name="Slide Number Placeholder 5"/>
+          <p:cNvSpPr>
+            <a:spLocks noGrp="1"/>
+          </p:cNvSpPr>
+          <p:nvPr>
+            <p:ph type="sldNum" sz="quarter" idx="12"/>
+          </p:nvPr>
+        </p:nvSpPr>
+        <p:spPr/>
+        <p:txBody>
+          <a:bodyPr/>
+          <a:lstStyle/>
+          <a:p>
+            <a:fld id="{D1918C2E-FE36-451E-B80E-1968976550A5}" type="slidenum">
+              <a:rPr lang="nl-BE" smtClean="0"/>
+              <a:t>6</a:t>
+            </a:fld>
+            <a:endParaRPr lang="nl-BE"/>
           </a:p>
         </p:txBody>
       </p:sp>
@@ -19654,10 +21273,6 @@
               </a:rPr>
               <a:t>()</a:t>
             </a:r>
-            <a:endParaRPr lang="en-US" sz="2400" dirty="0" smtClean="0">
-              <a:latin typeface="Courier New" panose="02070309020205020404" pitchFamily="49" charset="0"/>
-              <a:cs typeface="Courier New" panose="02070309020205020404" pitchFamily="49" charset="0"/>
-            </a:endParaRPr>
           </a:p>
           <a:p>
             <a:r>
@@ -19680,19 +21295,7 @@
             </a:r>
             <a:r>
               <a:rPr lang="en-US" dirty="0" smtClean="0"/>
-              <a:t> </a:t>
-            </a:r>
-            <a:r>
-              <a:rPr lang="en-US" dirty="0" smtClean="0"/>
-              <a:t>- </a:t>
-            </a:r>
-            <a:r>
-              <a:rPr lang="en-US" dirty="0" smtClean="0"/>
-              <a:t>1, inclusive</a:t>
-            </a:r>
-            <a:r>
-              <a:rPr lang="en-US" dirty="0" smtClean="0"/>
-              <a:t/>
+              <a:t> - 1, inclusive</a:t>
             </a:r>
             <a:br>
               <a:rPr lang="en-US" dirty="0" smtClean="0"/>
@@ -19711,10 +21314,6 @@
               </a:rPr>
               <a:t>()</a:t>
             </a:r>
-            <a:endParaRPr lang="en-US" sz="2400" dirty="0" smtClean="0">
-              <a:latin typeface="Courier New" panose="02070309020205020404" pitchFamily="49" charset="0"/>
-              <a:cs typeface="Courier New" panose="02070309020205020404" pitchFamily="49" charset="0"/>
-            </a:endParaRPr>
           </a:p>
           <a:p>
             <a:r>
@@ -19724,6 +21323,29 @@
               <a:t>Rank used as "address" within communicator, and to differentiate "roles" of processes</a:t>
             </a:r>
             <a:endParaRPr lang="nl-BE" dirty="0"/>
+          </a:p>
+        </p:txBody>
+      </p:sp>
+      <p:sp>
+        <p:nvSpPr>
+          <p:cNvPr id="4" name="Slide Number Placeholder 3"/>
+          <p:cNvSpPr>
+            <a:spLocks noGrp="1"/>
+          </p:cNvSpPr>
+          <p:nvPr>
+            <p:ph type="sldNum" sz="quarter" idx="12"/>
+          </p:nvPr>
+        </p:nvSpPr>
+        <p:spPr/>
+        <p:txBody>
+          <a:bodyPr/>
+          <a:lstStyle/>
+          <a:p>
+            <a:fld id="{D1918C2E-FE36-451E-B80E-1968976550A5}" type="slidenum">
+              <a:rPr lang="nl-BE" smtClean="0"/>
+              <a:t>7</a:t>
+            </a:fld>
+            <a:endParaRPr lang="nl-BE"/>
           </a:p>
         </p:txBody>
       </p:sp>
@@ -20436,6 +22058,29 @@
           </a:p>
         </p:txBody>
       </p:sp>
+      <p:sp>
+        <p:nvSpPr>
+          <p:cNvPr id="7" name="Slide Number Placeholder 6"/>
+          <p:cNvSpPr>
+            <a:spLocks noGrp="1"/>
+          </p:cNvSpPr>
+          <p:nvPr>
+            <p:ph type="sldNum" sz="quarter" idx="12"/>
+          </p:nvPr>
+        </p:nvSpPr>
+        <p:spPr/>
+        <p:txBody>
+          <a:bodyPr/>
+          <a:lstStyle/>
+          <a:p>
+            <a:fld id="{D1918C2E-FE36-451E-B80E-1968976550A5}" type="slidenum">
+              <a:rPr lang="nl-BE" smtClean="0"/>
+              <a:t>8</a:t>
+            </a:fld>
+            <a:endParaRPr lang="nl-BE"/>
+          </a:p>
+        </p:txBody>
+      </p:sp>
     </p:spTree>
     <p:extLst>
       <p:ext uri="{BB962C8B-B14F-4D97-AF65-F5344CB8AC3E}">
@@ -20672,6 +22317,29 @@
               <a:rPr lang="en-US" dirty="0" smtClean="0"/>
               <a:t>Processes communicate to exchange information, data, state</a:t>
             </a:r>
+          </a:p>
+        </p:txBody>
+      </p:sp>
+      <p:sp>
+        <p:nvSpPr>
+          <p:cNvPr id="2" name="Slide Number Placeholder 1"/>
+          <p:cNvSpPr>
+            <a:spLocks noGrp="1"/>
+          </p:cNvSpPr>
+          <p:nvPr>
+            <p:ph type="sldNum" sz="quarter" idx="12"/>
+          </p:nvPr>
+        </p:nvSpPr>
+        <p:spPr/>
+        <p:txBody>
+          <a:bodyPr/>
+          <a:lstStyle/>
+          <a:p>
+            <a:fld id="{D1918C2E-FE36-451E-B80E-1968976550A5}" type="slidenum">
+              <a:rPr lang="nl-BE" smtClean="0"/>
+              <a:t>9</a:t>
+            </a:fld>
+            <a:endParaRPr lang="nl-BE"/>
           </a:p>
         </p:txBody>
       </p:sp>
@@ -21154,4 +22822,289 @@
   <a:objectDefaults/>
   <a:extraClrSchemeLst/>
 </a:theme>
+</file>
+
+<file path=ppt/theme/theme2.xml><?xml version="1.0" encoding="utf-8"?>
+<a:theme xmlns:a="http://schemas.openxmlformats.org/drawingml/2006/main" name="Office Theme">
+  <a:themeElements>
+    <a:clrScheme name="Office">
+      <a:dk1>
+        <a:sysClr val="windowText" lastClr="000000"/>
+      </a:dk1>
+      <a:lt1>
+        <a:sysClr val="window" lastClr="FFFFFF"/>
+      </a:lt1>
+      <a:dk2>
+        <a:srgbClr val="1F497D"/>
+      </a:dk2>
+      <a:lt2>
+        <a:srgbClr val="EEECE1"/>
+      </a:lt2>
+      <a:accent1>
+        <a:srgbClr val="4F81BD"/>
+      </a:accent1>
+      <a:accent2>
+        <a:srgbClr val="C0504D"/>
+      </a:accent2>
+      <a:accent3>
+        <a:srgbClr val="9BBB59"/>
+      </a:accent3>
+      <a:accent4>
+        <a:srgbClr val="8064A2"/>
+      </a:accent4>
+      <a:accent5>
+        <a:srgbClr val="4BACC6"/>
+      </a:accent5>
+      <a:accent6>
+        <a:srgbClr val="F79646"/>
+      </a:accent6>
+      <a:hlink>
+        <a:srgbClr val="0000FF"/>
+      </a:hlink>
+      <a:folHlink>
+        <a:srgbClr val="800080"/>
+      </a:folHlink>
+    </a:clrScheme>
+    <a:fontScheme name="Office">
+      <a:majorFont>
+        <a:latin typeface="Calibri"/>
+        <a:ea typeface=""/>
+        <a:cs typeface=""/>
+        <a:font script="Jpan" typeface="ＭＳ Ｐゴシック"/>
+        <a:font script="Hang" typeface="맑은 고딕"/>
+        <a:font script="Hans" typeface="宋体"/>
+        <a:font script="Hant" typeface="新細明體"/>
+        <a:font script="Arab" typeface="Times New Roman"/>
+        <a:font script="Hebr" typeface="Times New Roman"/>
+        <a:font script="Thai" typeface="Angsana New"/>
+        <a:font script="Ethi" typeface="Nyala"/>
+        <a:font script="Beng" typeface="Vrinda"/>
+        <a:font script="Gujr" typeface="Shruti"/>
+        <a:font script="Khmr" typeface="MoolBoran"/>
+        <a:font script="Knda" typeface="Tunga"/>
+        <a:font script="Guru" typeface="Raavi"/>
+        <a:font script="Cans" typeface="Euphemia"/>
+        <a:font script="Cher" typeface="Plantagenet Cherokee"/>
+        <a:font script="Yiii" typeface="Microsoft Yi Baiti"/>
+        <a:font script="Tibt" typeface="Microsoft Himalaya"/>
+        <a:font script="Thaa" typeface="MV Boli"/>
+        <a:font script="Deva" typeface="Mangal"/>
+        <a:font script="Telu" typeface="Gautami"/>
+        <a:font script="Taml" typeface="Latha"/>
+        <a:font script="Syrc" typeface="Estrangelo Edessa"/>
+        <a:font script="Orya" typeface="Kalinga"/>
+        <a:font script="Mlym" typeface="Kartika"/>
+        <a:font script="Laoo" typeface="DokChampa"/>
+        <a:font script="Sinh" typeface="Iskoola Pota"/>
+        <a:font script="Mong" typeface="Mongolian Baiti"/>
+        <a:font script="Viet" typeface="Times New Roman"/>
+        <a:font script="Uigh" typeface="Microsoft Uighur"/>
+        <a:font script="Geor" typeface="Sylfaen"/>
+      </a:majorFont>
+      <a:minorFont>
+        <a:latin typeface="Calibri"/>
+        <a:ea typeface=""/>
+        <a:cs typeface=""/>
+        <a:font script="Jpan" typeface="ＭＳ Ｐゴシック"/>
+        <a:font script="Hang" typeface="맑은 고딕"/>
+        <a:font script="Hans" typeface="宋体"/>
+        <a:font script="Hant" typeface="新細明體"/>
+        <a:font script="Arab" typeface="Arial"/>
+        <a:font script="Hebr" typeface="Arial"/>
+        <a:font script="Thai" typeface="Cordia New"/>
+        <a:font script="Ethi" typeface="Nyala"/>
+        <a:font script="Beng" typeface="Vrinda"/>
+        <a:font script="Gujr" typeface="Shruti"/>
+        <a:font script="Khmr" typeface="DaunPenh"/>
+        <a:font script="Knda" typeface="Tunga"/>
+        <a:font script="Guru" typeface="Raavi"/>
+        <a:font script="Cans" typeface="Euphemia"/>
+        <a:font script="Cher" typeface="Plantagenet Cherokee"/>
+        <a:font script="Yiii" typeface="Microsoft Yi Baiti"/>
+        <a:font script="Tibt" typeface="Microsoft Himalaya"/>
+        <a:font script="Thaa" typeface="MV Boli"/>
+        <a:font script="Deva" typeface="Mangal"/>
+        <a:font script="Telu" typeface="Gautami"/>
+        <a:font script="Taml" typeface="Latha"/>
+        <a:font script="Syrc" typeface="Estrangelo Edessa"/>
+        <a:font script="Orya" typeface="Kalinga"/>
+        <a:font script="Mlym" typeface="Kartika"/>
+        <a:font script="Laoo" typeface="DokChampa"/>
+        <a:font script="Sinh" typeface="Iskoola Pota"/>
+        <a:font script="Mong" typeface="Mongolian Baiti"/>
+        <a:font script="Viet" typeface="Arial"/>
+        <a:font script="Uigh" typeface="Microsoft Uighur"/>
+        <a:font script="Geor" typeface="Sylfaen"/>
+      </a:minorFont>
+    </a:fontScheme>
+    <a:fmtScheme name="Office">
+      <a:fillStyleLst>
+        <a:solidFill>
+          <a:schemeClr val="phClr"/>
+        </a:solidFill>
+        <a:gradFill rotWithShape="1">
+          <a:gsLst>
+            <a:gs pos="0">
+              <a:schemeClr val="phClr">
+                <a:tint val="50000"/>
+                <a:satMod val="300000"/>
+              </a:schemeClr>
+            </a:gs>
+            <a:gs pos="35000">
+              <a:schemeClr val="phClr">
+                <a:tint val="37000"/>
+                <a:satMod val="300000"/>
+              </a:schemeClr>
+            </a:gs>
+            <a:gs pos="100000">
+              <a:schemeClr val="phClr">
+                <a:tint val="15000"/>
+                <a:satMod val="350000"/>
+              </a:schemeClr>
+            </a:gs>
+          </a:gsLst>
+          <a:lin ang="16200000" scaled="1"/>
+        </a:gradFill>
+        <a:gradFill rotWithShape="1">
+          <a:gsLst>
+            <a:gs pos="0">
+              <a:schemeClr val="phClr">
+                <a:shade val="51000"/>
+                <a:satMod val="130000"/>
+              </a:schemeClr>
+            </a:gs>
+            <a:gs pos="80000">
+              <a:schemeClr val="phClr">
+                <a:shade val="93000"/>
+                <a:satMod val="130000"/>
+              </a:schemeClr>
+            </a:gs>
+            <a:gs pos="100000">
+              <a:schemeClr val="phClr">
+                <a:shade val="94000"/>
+                <a:satMod val="135000"/>
+              </a:schemeClr>
+            </a:gs>
+          </a:gsLst>
+          <a:lin ang="16200000" scaled="0"/>
+        </a:gradFill>
+      </a:fillStyleLst>
+      <a:lnStyleLst>
+        <a:ln w="9525" cap="flat" cmpd="sng" algn="ctr">
+          <a:solidFill>
+            <a:schemeClr val="phClr">
+              <a:shade val="95000"/>
+              <a:satMod val="105000"/>
+            </a:schemeClr>
+          </a:solidFill>
+          <a:prstDash val="solid"/>
+        </a:ln>
+        <a:ln w="25400" cap="flat" cmpd="sng" algn="ctr">
+          <a:solidFill>
+            <a:schemeClr val="phClr"/>
+          </a:solidFill>
+          <a:prstDash val="solid"/>
+        </a:ln>
+        <a:ln w="38100" cap="flat" cmpd="sng" algn="ctr">
+          <a:solidFill>
+            <a:schemeClr val="phClr"/>
+          </a:solidFill>
+          <a:prstDash val="solid"/>
+        </a:ln>
+      </a:lnStyleLst>
+      <a:effectStyleLst>
+        <a:effectStyle>
+          <a:effectLst>
+            <a:outerShdw blurRad="40000" dist="20000" dir="5400000" rotWithShape="0">
+              <a:srgbClr val="000000">
+                <a:alpha val="38000"/>
+              </a:srgbClr>
+            </a:outerShdw>
+          </a:effectLst>
+        </a:effectStyle>
+        <a:effectStyle>
+          <a:effectLst>
+            <a:outerShdw blurRad="40000" dist="23000" dir="5400000" rotWithShape="0">
+              <a:srgbClr val="000000">
+                <a:alpha val="35000"/>
+              </a:srgbClr>
+            </a:outerShdw>
+          </a:effectLst>
+        </a:effectStyle>
+        <a:effectStyle>
+          <a:effectLst>
+            <a:outerShdw blurRad="40000" dist="23000" dir="5400000" rotWithShape="0">
+              <a:srgbClr val="000000">
+                <a:alpha val="35000"/>
+              </a:srgbClr>
+            </a:outerShdw>
+          </a:effectLst>
+          <a:scene3d>
+            <a:camera prst="orthographicFront">
+              <a:rot lat="0" lon="0" rev="0"/>
+            </a:camera>
+            <a:lightRig rig="threePt" dir="t">
+              <a:rot lat="0" lon="0" rev="1200000"/>
+            </a:lightRig>
+          </a:scene3d>
+          <a:sp3d>
+            <a:bevelT w="63500" h="25400"/>
+          </a:sp3d>
+        </a:effectStyle>
+      </a:effectStyleLst>
+      <a:bgFillStyleLst>
+        <a:solidFill>
+          <a:schemeClr val="phClr"/>
+        </a:solidFill>
+        <a:gradFill rotWithShape="1">
+          <a:gsLst>
+            <a:gs pos="0">
+              <a:schemeClr val="phClr">
+                <a:tint val="40000"/>
+                <a:satMod val="350000"/>
+              </a:schemeClr>
+            </a:gs>
+            <a:gs pos="40000">
+              <a:schemeClr val="phClr">
+                <a:tint val="45000"/>
+                <a:shade val="99000"/>
+                <a:satMod val="350000"/>
+              </a:schemeClr>
+            </a:gs>
+            <a:gs pos="100000">
+              <a:schemeClr val="phClr">
+                <a:shade val="20000"/>
+                <a:satMod val="255000"/>
+              </a:schemeClr>
+            </a:gs>
+          </a:gsLst>
+          <a:path path="circle">
+            <a:fillToRect l="50000" t="-80000" r="50000" b="180000"/>
+          </a:path>
+        </a:gradFill>
+        <a:gradFill rotWithShape="1">
+          <a:gsLst>
+            <a:gs pos="0">
+              <a:schemeClr val="phClr">
+                <a:tint val="80000"/>
+                <a:satMod val="300000"/>
+              </a:schemeClr>
+            </a:gs>
+            <a:gs pos="100000">
+              <a:schemeClr val="phClr">
+                <a:shade val="30000"/>
+                <a:satMod val="200000"/>
+              </a:schemeClr>
+            </a:gs>
+          </a:gsLst>
+          <a:path path="circle">
+            <a:fillToRect l="50000" t="50000" r="50000" b="50000"/>
+          </a:path>
+        </a:gradFill>
+      </a:bgFillStyleLst>
+    </a:fmtScheme>
+  </a:themeElements>
+  <a:objectDefaults/>
+  <a:extraClrSchemeLst/>
+</a:theme>
 </file>
</xml_diff>

<commit_message>
Now using ssend, similar to C/Fortran presentation; added first slide on efficient single segment buffer calls
</commit_message>
<xml_diff>
--- a/Python/Mpi4py/mpi4py.pptx
+++ b/Python/Mpi4py/mpi4py.pptx
@@ -5,7 +5,7 @@
     <p:sldMasterId id="2147483648" r:id="rId1"/>
   </p:sldMasterIdLst>
   <p:notesMasterIdLst>
-    <p:notesMasterId r:id="rId31"/>
+    <p:notesMasterId r:id="rId32"/>
   </p:notesMasterIdLst>
   <p:sldIdLst>
     <p:sldId id="256" r:id="rId2"/>
@@ -31,12 +31,13 @@
     <p:sldId id="283" r:id="rId22"/>
     <p:sldId id="287" r:id="rId23"/>
     <p:sldId id="269" r:id="rId24"/>
-    <p:sldId id="279" r:id="rId25"/>
-    <p:sldId id="280" r:id="rId26"/>
-    <p:sldId id="281" r:id="rId27"/>
-    <p:sldId id="285" r:id="rId28"/>
-    <p:sldId id="284" r:id="rId29"/>
-    <p:sldId id="271" r:id="rId30"/>
+    <p:sldId id="288" r:id="rId25"/>
+    <p:sldId id="279" r:id="rId26"/>
+    <p:sldId id="280" r:id="rId27"/>
+    <p:sldId id="281" r:id="rId28"/>
+    <p:sldId id="285" r:id="rId29"/>
+    <p:sldId id="284" r:id="rId30"/>
+    <p:sldId id="271" r:id="rId31"/>
   </p:sldIdLst>
   <p:sldSz cx="9144000" cy="6858000" type="screen4x3"/>
   <p:notesSz cx="6858000" cy="9144000"/>
@@ -137,7 +138,7 @@
   </p:defaultTextStyle>
   <p:extLst>
     <p:ext uri="{EFAFB233-063F-42B5-8137-9DF3F51BA10A}">
-      <p15:sldGuideLst xmlns:p15="http://schemas.microsoft.com/office/powerpoint/2012/main" xmlns="">
+      <p15:sldGuideLst xmlns="" xmlns:p15="http://schemas.microsoft.com/office/powerpoint/2012/main">
         <p15:guide id="1" orient="horz" pos="2160">
           <p15:clr>
             <a:srgbClr val="A4A3A4"/>
@@ -3512,14 +3513,15 @@
           <a:p>
             <a:r>
               <a:rPr lang="en-US" dirty="0" smtClean="0"/>
-              <a:t>Distributed programming</a:t>
-            </a:r>
-            <a:br>
-              <a:rPr lang="en-US" dirty="0" smtClean="0"/>
-            </a:br>
-            <a:r>
-              <a:rPr lang="en-US" dirty="0" smtClean="0"/>
-              <a:t>using mpi4py</a:t>
+              <a:t>Distributed </a:t>
+            </a:r>
+            <a:r>
+              <a:rPr lang="en-US" dirty="0" smtClean="0"/>
+              <a:t>programming with Python using </a:t>
+            </a:r>
+            <a:r>
+              <a:rPr lang="en-US" dirty="0" smtClean="0"/>
+              <a:t>mpi4py</a:t>
             </a:r>
             <a:endParaRPr lang="nl-BE" dirty="0"/>
           </a:p>
@@ -4156,7 +4158,7 @@
         <p:spPr>
           <a:xfrm>
             <a:off x="539552" y="2132856"/>
-            <a:ext cx="4262577" cy="3416320"/>
+            <a:ext cx="5974713" cy="3416320"/>
           </a:xfrm>
           <a:prstGeom prst="rect">
             <a:avLst/>
@@ -4170,159 +4172,286 @@
           <a:lstStyle/>
           <a:p>
             <a:r>
-              <a:rPr lang="nl-BE" dirty="0" smtClean="0"/>
+              <a:rPr lang="nl-BE" dirty="0" smtClean="0">
+                <a:latin typeface="Courier New" panose="02070309020205020404" pitchFamily="49" charset="0"/>
+                <a:cs typeface="Courier New" panose="02070309020205020404" pitchFamily="49" charset="0"/>
+              </a:rPr>
               <a:t>…</a:t>
             </a:r>
           </a:p>
           <a:p>
             <a:r>
-              <a:rPr lang="nl-BE" dirty="0" err="1" smtClean="0"/>
+              <a:rPr lang="nl-BE" dirty="0" err="1" smtClean="0">
+                <a:latin typeface="Courier New" panose="02070309020205020404" pitchFamily="49" charset="0"/>
+                <a:cs typeface="Courier New" panose="02070309020205020404" pitchFamily="49" charset="0"/>
+              </a:rPr>
               <a:t>comm</a:t>
             </a:r>
             <a:r>
-              <a:rPr lang="nl-BE" dirty="0" smtClean="0"/>
+              <a:rPr lang="nl-BE" dirty="0" smtClean="0">
+                <a:latin typeface="Courier New" panose="02070309020205020404" pitchFamily="49" charset="0"/>
+                <a:cs typeface="Courier New" panose="02070309020205020404" pitchFamily="49" charset="0"/>
+              </a:rPr>
               <a:t> = MPI.COMM_WORLD</a:t>
             </a:r>
           </a:p>
           <a:p>
             <a:r>
-              <a:rPr lang="en-US" dirty="0" smtClean="0"/>
+              <a:rPr lang="en-US" dirty="0" smtClean="0">
+                <a:latin typeface="Courier New" panose="02070309020205020404" pitchFamily="49" charset="0"/>
+                <a:cs typeface="Courier New" panose="02070309020205020404" pitchFamily="49" charset="0"/>
+              </a:rPr>
               <a:t>rank = </a:t>
             </a:r>
             <a:r>
-              <a:rPr lang="en-US" dirty="0" err="1" smtClean="0"/>
+              <a:rPr lang="en-US" dirty="0" err="1" smtClean="0">
+                <a:latin typeface="Courier New" panose="02070309020205020404" pitchFamily="49" charset="0"/>
+                <a:cs typeface="Courier New" panose="02070309020205020404" pitchFamily="49" charset="0"/>
+              </a:rPr>
               <a:t>comm.Get_rank</a:t>
             </a:r>
             <a:r>
-              <a:rPr lang="en-US" dirty="0" smtClean="0"/>
+              <a:rPr lang="en-US" dirty="0" smtClean="0">
+                <a:latin typeface="Courier New" panose="02070309020205020404" pitchFamily="49" charset="0"/>
+                <a:cs typeface="Courier New" panose="02070309020205020404" pitchFamily="49" charset="0"/>
+              </a:rPr>
               <a:t>()</a:t>
             </a:r>
           </a:p>
           <a:p>
             <a:r>
-              <a:rPr lang="en-US" dirty="0" smtClean="0"/>
-              <a:t>sender = 1</a:t>
-            </a:r>
-          </a:p>
-          <a:p>
-            <a:r>
-              <a:rPr lang="en-US" dirty="0" smtClean="0"/>
-              <a:t>receiver = 2</a:t>
-            </a:r>
-          </a:p>
-          <a:p>
-            <a:r>
-              <a:rPr lang="en-US" dirty="0" smtClean="0"/>
+              <a:rPr lang="en-US" dirty="0" smtClean="0">
+                <a:latin typeface="Courier New" panose="02070309020205020404" pitchFamily="49" charset="0"/>
+                <a:cs typeface="Courier New" panose="02070309020205020404" pitchFamily="49" charset="0"/>
+              </a:rPr>
+              <a:t>sender = </a:t>
+            </a:r>
+            <a:r>
+              <a:rPr lang="en-US" dirty="0" smtClean="0">
+                <a:latin typeface="Courier New" panose="02070309020205020404" pitchFamily="49" charset="0"/>
+                <a:cs typeface="Courier New" panose="02070309020205020404" pitchFamily="49" charset="0"/>
+              </a:rPr>
+              <a:t>0</a:t>
+            </a:r>
+            <a:endParaRPr lang="en-US" dirty="0" smtClean="0">
+              <a:latin typeface="Courier New" panose="02070309020205020404" pitchFamily="49" charset="0"/>
+              <a:cs typeface="Courier New" panose="02070309020205020404" pitchFamily="49" charset="0"/>
+            </a:endParaRPr>
+          </a:p>
+          <a:p>
+            <a:r>
+              <a:rPr lang="en-US" dirty="0" smtClean="0">
+                <a:latin typeface="Courier New" panose="02070309020205020404" pitchFamily="49" charset="0"/>
+                <a:cs typeface="Courier New" panose="02070309020205020404" pitchFamily="49" charset="0"/>
+              </a:rPr>
+              <a:t>receiver = </a:t>
+            </a:r>
+            <a:r>
+              <a:rPr lang="en-US" dirty="0" smtClean="0">
+                <a:latin typeface="Courier New" panose="02070309020205020404" pitchFamily="49" charset="0"/>
+                <a:cs typeface="Courier New" panose="02070309020205020404" pitchFamily="49" charset="0"/>
+              </a:rPr>
+              <a:t>1</a:t>
+            </a:r>
+            <a:endParaRPr lang="en-US" dirty="0" smtClean="0">
+              <a:latin typeface="Courier New" panose="02070309020205020404" pitchFamily="49" charset="0"/>
+              <a:cs typeface="Courier New" panose="02070309020205020404" pitchFamily="49" charset="0"/>
+            </a:endParaRPr>
+          </a:p>
+          <a:p>
+            <a:r>
+              <a:rPr lang="en-US" dirty="0" smtClean="0">
+                <a:latin typeface="Courier New" panose="02070309020205020404" pitchFamily="49" charset="0"/>
+                <a:cs typeface="Courier New" panose="02070309020205020404" pitchFamily="49" charset="0"/>
+              </a:rPr>
               <a:t>…</a:t>
             </a:r>
-            <a:endParaRPr lang="en-US" dirty="0"/>
-          </a:p>
-          <a:p>
-            <a:r>
-              <a:rPr lang="en-US" dirty="0" smtClean="0"/>
+            <a:endParaRPr lang="en-US" dirty="0">
+              <a:latin typeface="Courier New" panose="02070309020205020404" pitchFamily="49" charset="0"/>
+              <a:cs typeface="Courier New" panose="02070309020205020404" pitchFamily="49" charset="0"/>
+            </a:endParaRPr>
+          </a:p>
+          <a:p>
+            <a:r>
+              <a:rPr lang="en-US" dirty="0" smtClean="0">
+                <a:latin typeface="Courier New" panose="02070309020205020404" pitchFamily="49" charset="0"/>
+                <a:cs typeface="Courier New" panose="02070309020205020404" pitchFamily="49" charset="0"/>
+              </a:rPr>
               <a:t>if rank == sender:</a:t>
             </a:r>
           </a:p>
           <a:p>
             <a:r>
-              <a:rPr lang="en-US" dirty="0"/>
+              <a:rPr lang="en-US" dirty="0">
+                <a:latin typeface="Courier New" panose="02070309020205020404" pitchFamily="49" charset="0"/>
+                <a:cs typeface="Courier New" panose="02070309020205020404" pitchFamily="49" charset="0"/>
+              </a:rPr>
               <a:t> </a:t>
             </a:r>
             <a:r>
-              <a:rPr lang="en-US" dirty="0" smtClean="0"/>
+              <a:rPr lang="en-US" dirty="0" smtClean="0">
+                <a:latin typeface="Courier New" panose="02070309020205020404" pitchFamily="49" charset="0"/>
+                <a:cs typeface="Courier New" panose="02070309020205020404" pitchFamily="49" charset="0"/>
+              </a:rPr>
               <a:t>   </a:t>
             </a:r>
             <a:r>
-              <a:rPr lang="en-US" dirty="0" err="1" smtClean="0"/>
+              <a:rPr lang="en-US" dirty="0" err="1" smtClean="0">
+                <a:latin typeface="Courier New" panose="02070309020205020404" pitchFamily="49" charset="0"/>
+                <a:cs typeface="Courier New" panose="02070309020205020404" pitchFamily="49" charset="0"/>
+              </a:rPr>
               <a:t>send_buffer</a:t>
             </a:r>
             <a:r>
-              <a:rPr lang="en-US" dirty="0" smtClean="0"/>
+              <a:rPr lang="en-US" dirty="0" smtClean="0">
+                <a:latin typeface="Courier New" panose="02070309020205020404" pitchFamily="49" charset="0"/>
+                <a:cs typeface="Courier New" panose="02070309020205020404" pitchFamily="49" charset="0"/>
+              </a:rPr>
               <a:t> = 101</a:t>
             </a:r>
           </a:p>
           <a:p>
             <a:r>
-              <a:rPr lang="en-US" dirty="0"/>
+              <a:rPr lang="en-US" dirty="0">
+                <a:latin typeface="Courier New" panose="02070309020205020404" pitchFamily="49" charset="0"/>
+                <a:cs typeface="Courier New" panose="02070309020205020404" pitchFamily="49" charset="0"/>
+              </a:rPr>
               <a:t> </a:t>
             </a:r>
             <a:r>
-              <a:rPr lang="en-US" dirty="0" smtClean="0"/>
+              <a:rPr lang="en-US" dirty="0" smtClean="0">
+                <a:latin typeface="Courier New" panose="02070309020205020404" pitchFamily="49" charset="0"/>
+                <a:cs typeface="Courier New" panose="02070309020205020404" pitchFamily="49" charset="0"/>
+              </a:rPr>
               <a:t>   </a:t>
             </a:r>
             <a:r>
-              <a:rPr lang="en-US" dirty="0" err="1" smtClean="0"/>
-              <a:t>comm.send</a:t>
-            </a:r>
-            <a:r>
-              <a:rPr lang="en-US" dirty="0" smtClean="0"/>
+              <a:rPr lang="en-US" dirty="0" err="1" smtClean="0">
+                <a:latin typeface="Courier New" panose="02070309020205020404" pitchFamily="49" charset="0"/>
+                <a:cs typeface="Courier New" panose="02070309020205020404" pitchFamily="49" charset="0"/>
+              </a:rPr>
+              <a:t>comm.ssend</a:t>
+            </a:r>
+            <a:r>
+              <a:rPr lang="en-US" dirty="0" smtClean="0">
+                <a:latin typeface="Courier New" panose="02070309020205020404" pitchFamily="49" charset="0"/>
+                <a:cs typeface="Courier New" panose="02070309020205020404" pitchFamily="49" charset="0"/>
+              </a:rPr>
               <a:t>(</a:t>
             </a:r>
             <a:r>
-              <a:rPr lang="en-US" dirty="0" err="1" smtClean="0"/>
+              <a:rPr lang="en-US" dirty="0" err="1" smtClean="0">
+                <a:latin typeface="Courier New" panose="02070309020205020404" pitchFamily="49" charset="0"/>
+                <a:cs typeface="Courier New" panose="02070309020205020404" pitchFamily="49" charset="0"/>
+              </a:rPr>
               <a:t>send_buffer</a:t>
             </a:r>
             <a:r>
-              <a:rPr lang="en-US" dirty="0" smtClean="0"/>
+              <a:rPr lang="en-US" dirty="0" smtClean="0">
+                <a:latin typeface="Courier New" panose="02070309020205020404" pitchFamily="49" charset="0"/>
+                <a:cs typeface="Courier New" panose="02070309020205020404" pitchFamily="49" charset="0"/>
+              </a:rPr>
               <a:t>, </a:t>
             </a:r>
             <a:r>
-              <a:rPr lang="en-US" dirty="0" err="1" smtClean="0"/>
+              <a:rPr lang="en-US" dirty="0" err="1" smtClean="0">
+                <a:latin typeface="Courier New" panose="02070309020205020404" pitchFamily="49" charset="0"/>
+                <a:cs typeface="Courier New" panose="02070309020205020404" pitchFamily="49" charset="0"/>
+              </a:rPr>
               <a:t>dest</a:t>
             </a:r>
             <a:r>
-              <a:rPr lang="en-US" dirty="0" smtClean="0"/>
+              <a:rPr lang="en-US" dirty="0" smtClean="0">
+                <a:latin typeface="Courier New" panose="02070309020205020404" pitchFamily="49" charset="0"/>
+                <a:cs typeface="Courier New" panose="02070309020205020404" pitchFamily="49" charset="0"/>
+              </a:rPr>
               <a:t>=</a:t>
             </a:r>
             <a:r>
-              <a:rPr lang="en-US" dirty="0" err="1" smtClean="0"/>
+              <a:rPr lang="en-US" dirty="0" err="1" smtClean="0">
+                <a:latin typeface="Courier New" panose="02070309020205020404" pitchFamily="49" charset="0"/>
+                <a:cs typeface="Courier New" panose="02070309020205020404" pitchFamily="49" charset="0"/>
+              </a:rPr>
               <a:t>reciever</a:t>
             </a:r>
             <a:r>
-              <a:rPr lang="en-US" dirty="0" smtClean="0"/>
+              <a:rPr lang="en-US" dirty="0" smtClean="0">
+                <a:latin typeface="Courier New" panose="02070309020205020404" pitchFamily="49" charset="0"/>
+                <a:cs typeface="Courier New" panose="02070309020205020404" pitchFamily="49" charset="0"/>
+              </a:rPr>
               <a:t>)</a:t>
             </a:r>
           </a:p>
           <a:p>
             <a:r>
-              <a:rPr lang="en-US" dirty="0" err="1" smtClean="0"/>
+              <a:rPr lang="en-US" dirty="0" err="1" smtClean="0">
+                <a:latin typeface="Courier New" panose="02070309020205020404" pitchFamily="49" charset="0"/>
+                <a:cs typeface="Courier New" panose="02070309020205020404" pitchFamily="49" charset="0"/>
+              </a:rPr>
               <a:t>elif</a:t>
             </a:r>
             <a:r>
-              <a:rPr lang="en-US" dirty="0" smtClean="0"/>
+              <a:rPr lang="en-US" dirty="0" smtClean="0">
+                <a:latin typeface="Courier New" panose="02070309020205020404" pitchFamily="49" charset="0"/>
+                <a:cs typeface="Courier New" panose="02070309020205020404" pitchFamily="49" charset="0"/>
+              </a:rPr>
               <a:t> rank == receiver:</a:t>
             </a:r>
           </a:p>
           <a:p>
             <a:r>
-              <a:rPr lang="en-US" dirty="0"/>
+              <a:rPr lang="en-US" dirty="0">
+                <a:latin typeface="Courier New" panose="02070309020205020404" pitchFamily="49" charset="0"/>
+                <a:cs typeface="Courier New" panose="02070309020205020404" pitchFamily="49" charset="0"/>
+              </a:rPr>
               <a:t> </a:t>
             </a:r>
             <a:r>
-              <a:rPr lang="en-US" dirty="0" smtClean="0"/>
+              <a:rPr lang="en-US" dirty="0" smtClean="0">
+                <a:latin typeface="Courier New" panose="02070309020205020404" pitchFamily="49" charset="0"/>
+                <a:cs typeface="Courier New" panose="02070309020205020404" pitchFamily="49" charset="0"/>
+              </a:rPr>
               <a:t>   </a:t>
             </a:r>
             <a:r>
-              <a:rPr lang="en-US" dirty="0" err="1" smtClean="0"/>
+              <a:rPr lang="en-US" dirty="0" err="1" smtClean="0">
+                <a:latin typeface="Courier New" panose="02070309020205020404" pitchFamily="49" charset="0"/>
+                <a:cs typeface="Courier New" panose="02070309020205020404" pitchFamily="49" charset="0"/>
+              </a:rPr>
               <a:t>recv_buffer</a:t>
             </a:r>
             <a:r>
-              <a:rPr lang="en-US" dirty="0" smtClean="0"/>
+              <a:rPr lang="en-US" dirty="0" smtClean="0">
+                <a:latin typeface="Courier New" panose="02070309020205020404" pitchFamily="49" charset="0"/>
+                <a:cs typeface="Courier New" panose="02070309020205020404" pitchFamily="49" charset="0"/>
+              </a:rPr>
               <a:t> = </a:t>
             </a:r>
             <a:r>
-              <a:rPr lang="en-US" dirty="0" err="1" smtClean="0"/>
+              <a:rPr lang="en-US" dirty="0" err="1" smtClean="0">
+                <a:latin typeface="Courier New" panose="02070309020205020404" pitchFamily="49" charset="0"/>
+                <a:cs typeface="Courier New" panose="02070309020205020404" pitchFamily="49" charset="0"/>
+              </a:rPr>
               <a:t>comm.recv</a:t>
             </a:r>
             <a:r>
-              <a:rPr lang="en-US" dirty="0" smtClean="0"/>
+              <a:rPr lang="en-US" dirty="0" smtClean="0">
+                <a:latin typeface="Courier New" panose="02070309020205020404" pitchFamily="49" charset="0"/>
+                <a:cs typeface="Courier New" panose="02070309020205020404" pitchFamily="49" charset="0"/>
+              </a:rPr>
               <a:t>(source=sender)</a:t>
             </a:r>
-            <a:endParaRPr lang="nl-BE" dirty="0"/>
-          </a:p>
-          <a:p>
-            <a:r>
-              <a:rPr lang="nl-BE" dirty="0" smtClean="0"/>
+            <a:endParaRPr lang="nl-BE" dirty="0">
+              <a:latin typeface="Courier New" panose="02070309020205020404" pitchFamily="49" charset="0"/>
+              <a:cs typeface="Courier New" panose="02070309020205020404" pitchFamily="49" charset="0"/>
+            </a:endParaRPr>
+          </a:p>
+          <a:p>
+            <a:r>
+              <a:rPr lang="nl-BE" dirty="0" smtClean="0">
+                <a:latin typeface="Courier New" panose="02070309020205020404" pitchFamily="49" charset="0"/>
+                <a:cs typeface="Courier New" panose="02070309020205020404" pitchFamily="49" charset="0"/>
+              </a:rPr>
               <a:t>…</a:t>
             </a:r>
           </a:p>
@@ -4690,7 +4819,7 @@
             </a:r>
             <a:r>
               <a:rPr lang="en-US" dirty="0" err="1" smtClean="0"/>
-              <a:t>comm.send</a:t>
+              <a:t>comm.ssend</a:t>
             </a:r>
             <a:r>
               <a:rPr lang="en-US" dirty="0" smtClean="0"/>
@@ -4768,7 +4897,7 @@
         <p:spPr>
           <a:xfrm>
             <a:off x="539552" y="5025950"/>
-            <a:ext cx="6032421" cy="400110"/>
+            <a:ext cx="6186309" cy="400110"/>
           </a:xfrm>
           <a:prstGeom prst="rect">
             <a:avLst/>
@@ -4786,7 +4915,7 @@
                 <a:latin typeface="Courier New" panose="02070309020205020404" pitchFamily="49" charset="0"/>
                 <a:cs typeface="Courier New" panose="02070309020205020404" pitchFamily="49" charset="0"/>
               </a:rPr>
-              <a:t>comm.send</a:t>
+              <a:t>comm.ssend</a:t>
             </a:r>
             <a:r>
               <a:rPr lang="nl-BE" sz="2000" dirty="0" smtClean="0">
@@ -5218,7 +5347,7 @@
             </a:r>
             <a:r>
               <a:rPr lang="en-US" dirty="0" err="1" smtClean="0"/>
-              <a:t>comm.send</a:t>
+              <a:t>comm.ssend</a:t>
             </a:r>
             <a:r>
               <a:rPr lang="en-US" dirty="0" smtClean="0"/>
@@ -14022,11 +14151,7 @@
           <a:p>
             <a:r>
               <a:rPr lang="en-US" dirty="0" smtClean="0"/>
-              <a:t>Example: </a:t>
-            </a:r>
-            <a:r>
-              <a:rPr lang="en-US" dirty="0" smtClean="0"/>
-              <a:t>calculate</a:t>
+              <a:t>Example: calculate</a:t>
             </a:r>
             <a:r>
               <a:rPr lang="en-US" dirty="0" smtClean="0">
@@ -14079,11 +14204,7 @@
             </a:r>
             <a:r>
               <a:rPr lang="en-US" dirty="0" smtClean="0"/>
-              <a:t> </a:t>
-            </a:r>
-            <a:r>
-              <a:rPr lang="en-US" dirty="0" smtClean="0"/>
-              <a:t>if applicable)</a:t>
+              <a:t> if applicable)</a:t>
             </a:r>
           </a:p>
           <a:p>
@@ -14423,7 +14544,11 @@
           <a:p>
             <a:r>
               <a:rPr lang="en-US" dirty="0" smtClean="0"/>
-              <a:t>Implementation for</a:t>
+              <a:t>Implementation </a:t>
+            </a:r>
+            <a:r>
+              <a:rPr lang="en-US" dirty="0" smtClean="0"/>
+              <a:t>for calculating</a:t>
             </a:r>
             <a:r>
               <a:rPr lang="en-US" dirty="0" smtClean="0">
@@ -15284,7 +15409,7 @@
         <p:spPr/>
         <p:txBody>
           <a:bodyPr>
-            <a:normAutofit/>
+            <a:normAutofit lnSpcReduction="10000"/>
           </a:bodyPr>
           <a:lstStyle/>
           <a:p>
@@ -15304,7 +15429,15 @@
             <a:pPr lvl="1"/>
             <a:r>
               <a:rPr lang="en-US" dirty="0" smtClean="0"/>
-              <a:t>cons: slow, memory overhead</a:t>
+              <a:t>cons: slow, </a:t>
+            </a:r>
+            <a:r>
+              <a:rPr lang="en-US" dirty="0" smtClean="0"/>
+              <a:t>memory/bandwidth </a:t>
+            </a:r>
+            <a:r>
+              <a:rPr lang="en-US" dirty="0" smtClean="0"/>
+              <a:t>overhead</a:t>
             </a:r>
           </a:p>
           <a:p>
@@ -15333,8 +15466,13 @@
             <a:pPr lvl="1"/>
             <a:r>
               <a:rPr lang="en-US" dirty="0" smtClean="0"/>
-              <a:t>pros: much faster, more efficient</a:t>
-            </a:r>
+              <a:t>pros: much faster, more </a:t>
+            </a:r>
+            <a:r>
+              <a:rPr lang="en-US" dirty="0" smtClean="0"/>
+              <a:t>memory/bandwidth efficient</a:t>
+            </a:r>
+            <a:endParaRPr lang="en-US" dirty="0" smtClean="0"/>
           </a:p>
           <a:p>
             <a:pPr lvl="1"/>
@@ -15673,6 +15811,501 @@
           <a:lstStyle/>
           <a:p>
             <a:r>
+              <a:rPr lang="en-US" dirty="0" err="1" smtClean="0"/>
+              <a:t>comm.Ssend</a:t>
+            </a:r>
+            <a:r>
+              <a:rPr lang="en-US" dirty="0" smtClean="0"/>
+              <a:t>/</a:t>
+            </a:r>
+            <a:r>
+              <a:rPr lang="en-US" dirty="0" err="1" smtClean="0"/>
+              <a:t>comm.Recv</a:t>
+            </a:r>
+            <a:endParaRPr lang="nl-BE" dirty="0"/>
+          </a:p>
+        </p:txBody>
+      </p:sp>
+      <p:sp>
+        <p:nvSpPr>
+          <p:cNvPr id="3" name="Content Placeholder 2"/>
+          <p:cNvSpPr>
+            <a:spLocks noGrp="1"/>
+          </p:cNvSpPr>
+          <p:nvPr>
+            <p:ph idx="1"/>
+          </p:nvPr>
+        </p:nvSpPr>
+        <p:spPr/>
+        <p:txBody>
+          <a:bodyPr/>
+          <a:lstStyle/>
+          <a:p>
+            <a:r>
+              <a:rPr lang="en-US" dirty="0" smtClean="0"/>
+              <a:t>Sending/receiving </a:t>
+            </a:r>
+            <a:r>
+              <a:rPr lang="en-US" dirty="0" err="1" smtClean="0"/>
+              <a:t>numpy</a:t>
+            </a:r>
+            <a:r>
+              <a:rPr lang="en-US" dirty="0" smtClean="0"/>
+              <a:t> array, hold the pickles</a:t>
+            </a:r>
+            <a:endParaRPr lang="nl-BE" dirty="0"/>
+          </a:p>
+        </p:txBody>
+      </p:sp>
+      <p:sp>
+        <p:nvSpPr>
+          <p:cNvPr id="4" name="Slide Number Placeholder 3"/>
+          <p:cNvSpPr>
+            <a:spLocks noGrp="1"/>
+          </p:cNvSpPr>
+          <p:nvPr>
+            <p:ph type="sldNum" sz="quarter" idx="12"/>
+          </p:nvPr>
+        </p:nvSpPr>
+        <p:spPr/>
+        <p:txBody>
+          <a:bodyPr/>
+          <a:lstStyle/>
+          <a:p>
+            <a:fld id="{D1918C2E-FE36-451E-B80E-1968976550A5}" type="slidenum">
+              <a:rPr lang="nl-BE" smtClean="0"/>
+              <a:t>24</a:t>
+            </a:fld>
+            <a:endParaRPr lang="nl-BE"/>
+          </a:p>
+        </p:txBody>
+      </p:sp>
+      <p:sp>
+        <p:nvSpPr>
+          <p:cNvPr id="5" name="TextBox 4"/>
+          <p:cNvSpPr txBox="1"/>
+          <p:nvPr/>
+        </p:nvSpPr>
+        <p:spPr>
+          <a:xfrm>
+            <a:off x="539552" y="2809959"/>
+            <a:ext cx="7491153" cy="3139321"/>
+          </a:xfrm>
+          <a:prstGeom prst="rect">
+            <a:avLst/>
+          </a:prstGeom>
+          <a:noFill/>
+        </p:spPr>
+        <p:txBody>
+          <a:bodyPr wrap="none" rtlCol="0">
+            <a:spAutoFit/>
+          </a:bodyPr>
+          <a:lstStyle/>
+          <a:p>
+            <a:r>
+              <a:rPr lang="nl-BE" dirty="0" smtClean="0">
+                <a:latin typeface="Courier New" panose="02070309020205020404" pitchFamily="49" charset="0"/>
+                <a:cs typeface="Courier New" panose="02070309020205020404" pitchFamily="49" charset="0"/>
+              </a:rPr>
+              <a:t>…</a:t>
+            </a:r>
+          </a:p>
+          <a:p>
+            <a:r>
+              <a:rPr lang="en-US" dirty="0" smtClean="0">
+                <a:latin typeface="Courier New" panose="02070309020205020404" pitchFamily="49" charset="0"/>
+                <a:cs typeface="Courier New" panose="02070309020205020404" pitchFamily="49" charset="0"/>
+              </a:rPr>
+              <a:t>import </a:t>
+            </a:r>
+            <a:r>
+              <a:rPr lang="en-US" dirty="0" err="1" smtClean="0">
+                <a:latin typeface="Courier New" panose="02070309020205020404" pitchFamily="49" charset="0"/>
+                <a:cs typeface="Courier New" panose="02070309020205020404" pitchFamily="49" charset="0"/>
+              </a:rPr>
+              <a:t>numpy</a:t>
+            </a:r>
+            <a:r>
+              <a:rPr lang="en-US" dirty="0" smtClean="0">
+                <a:latin typeface="Courier New" panose="02070309020205020404" pitchFamily="49" charset="0"/>
+                <a:cs typeface="Courier New" panose="02070309020205020404" pitchFamily="49" charset="0"/>
+              </a:rPr>
+              <a:t> as np</a:t>
+            </a:r>
+          </a:p>
+          <a:p>
+            <a:r>
+              <a:rPr lang="en-US" dirty="0" err="1" smtClean="0">
+                <a:latin typeface="Courier New" panose="02070309020205020404" pitchFamily="49" charset="0"/>
+                <a:cs typeface="Courier New" panose="02070309020205020404" pitchFamily="49" charset="0"/>
+              </a:rPr>
+              <a:t>data_size</a:t>
+            </a:r>
+            <a:r>
+              <a:rPr lang="en-US" dirty="0" smtClean="0">
+                <a:latin typeface="Courier New" panose="02070309020205020404" pitchFamily="49" charset="0"/>
+                <a:cs typeface="Courier New" panose="02070309020205020404" pitchFamily="49" charset="0"/>
+              </a:rPr>
+              <a:t> = 1001</a:t>
+            </a:r>
+            <a:endParaRPr lang="en-US" dirty="0">
+              <a:latin typeface="Courier New" panose="02070309020205020404" pitchFamily="49" charset="0"/>
+              <a:cs typeface="Courier New" panose="02070309020205020404" pitchFamily="49" charset="0"/>
+            </a:endParaRPr>
+          </a:p>
+          <a:p>
+            <a:r>
+              <a:rPr lang="en-US" dirty="0" smtClean="0">
+                <a:latin typeface="Courier New" panose="02070309020205020404" pitchFamily="49" charset="0"/>
+                <a:cs typeface="Courier New" panose="02070309020205020404" pitchFamily="49" charset="0"/>
+              </a:rPr>
+              <a:t>…</a:t>
+            </a:r>
+            <a:endParaRPr lang="en-US" dirty="0">
+              <a:latin typeface="Courier New" panose="02070309020205020404" pitchFamily="49" charset="0"/>
+              <a:cs typeface="Courier New" panose="02070309020205020404" pitchFamily="49" charset="0"/>
+            </a:endParaRPr>
+          </a:p>
+          <a:p>
+            <a:r>
+              <a:rPr lang="en-US" dirty="0" smtClean="0">
+                <a:latin typeface="Courier New" panose="02070309020205020404" pitchFamily="49" charset="0"/>
+                <a:cs typeface="Courier New" panose="02070309020205020404" pitchFamily="49" charset="0"/>
+              </a:rPr>
+              <a:t>if rank == sender:</a:t>
+            </a:r>
+          </a:p>
+          <a:p>
+            <a:r>
+              <a:rPr lang="en-US" dirty="0">
+                <a:latin typeface="Courier New" panose="02070309020205020404" pitchFamily="49" charset="0"/>
+                <a:cs typeface="Courier New" panose="02070309020205020404" pitchFamily="49" charset="0"/>
+              </a:rPr>
+              <a:t> </a:t>
+            </a:r>
+            <a:r>
+              <a:rPr lang="en-US" dirty="0" smtClean="0">
+                <a:latin typeface="Courier New" panose="02070309020205020404" pitchFamily="49" charset="0"/>
+                <a:cs typeface="Courier New" panose="02070309020205020404" pitchFamily="49" charset="0"/>
+              </a:rPr>
+              <a:t>   </a:t>
+            </a:r>
+            <a:r>
+              <a:rPr lang="en-US" dirty="0" err="1" smtClean="0">
+                <a:latin typeface="Courier New" panose="02070309020205020404" pitchFamily="49" charset="0"/>
+                <a:cs typeface="Courier New" panose="02070309020205020404" pitchFamily="49" charset="0"/>
+              </a:rPr>
+              <a:t>send_buffer</a:t>
+            </a:r>
+            <a:r>
+              <a:rPr lang="en-US" dirty="0" smtClean="0">
+                <a:latin typeface="Courier New" panose="02070309020205020404" pitchFamily="49" charset="0"/>
+                <a:cs typeface="Courier New" panose="02070309020205020404" pitchFamily="49" charset="0"/>
+              </a:rPr>
+              <a:t> = </a:t>
+            </a:r>
+            <a:r>
+              <a:rPr lang="en-US" dirty="0" err="1" smtClean="0">
+                <a:latin typeface="Courier New" panose="02070309020205020404" pitchFamily="49" charset="0"/>
+                <a:cs typeface="Courier New" panose="02070309020205020404" pitchFamily="49" charset="0"/>
+              </a:rPr>
+              <a:t>np.linspace</a:t>
+            </a:r>
+            <a:r>
+              <a:rPr lang="en-US" dirty="0" smtClean="0">
+                <a:latin typeface="Courier New" panose="02070309020205020404" pitchFamily="49" charset="0"/>
+                <a:cs typeface="Courier New" panose="02070309020205020404" pitchFamily="49" charset="0"/>
+              </a:rPr>
+              <a:t>(-10.0, 10.0, </a:t>
+            </a:r>
+            <a:r>
+              <a:rPr lang="en-US" dirty="0" err="1" smtClean="0">
+                <a:latin typeface="Courier New" panose="02070309020205020404" pitchFamily="49" charset="0"/>
+                <a:cs typeface="Courier New" panose="02070309020205020404" pitchFamily="49" charset="0"/>
+              </a:rPr>
+              <a:t>data_size</a:t>
+            </a:r>
+            <a:r>
+              <a:rPr lang="en-US" dirty="0" smtClean="0">
+                <a:latin typeface="Courier New" panose="02070309020205020404" pitchFamily="49" charset="0"/>
+                <a:cs typeface="Courier New" panose="02070309020205020404" pitchFamily="49" charset="0"/>
+              </a:rPr>
+              <a:t>)</a:t>
+            </a:r>
+            <a:endParaRPr lang="en-US" dirty="0" smtClean="0">
+              <a:latin typeface="Courier New" panose="02070309020205020404" pitchFamily="49" charset="0"/>
+              <a:cs typeface="Courier New" panose="02070309020205020404" pitchFamily="49" charset="0"/>
+            </a:endParaRPr>
+          </a:p>
+          <a:p>
+            <a:r>
+              <a:rPr lang="en-US" dirty="0">
+                <a:latin typeface="Courier New" panose="02070309020205020404" pitchFamily="49" charset="0"/>
+                <a:cs typeface="Courier New" panose="02070309020205020404" pitchFamily="49" charset="0"/>
+              </a:rPr>
+              <a:t> </a:t>
+            </a:r>
+            <a:r>
+              <a:rPr lang="en-US" dirty="0" smtClean="0">
+                <a:latin typeface="Courier New" panose="02070309020205020404" pitchFamily="49" charset="0"/>
+                <a:cs typeface="Courier New" panose="02070309020205020404" pitchFamily="49" charset="0"/>
+              </a:rPr>
+              <a:t>   </a:t>
+            </a:r>
+            <a:r>
+              <a:rPr lang="en-US" dirty="0" err="1" smtClean="0">
+                <a:latin typeface="Courier New" panose="02070309020205020404" pitchFamily="49" charset="0"/>
+                <a:cs typeface="Courier New" panose="02070309020205020404" pitchFamily="49" charset="0"/>
+              </a:rPr>
+              <a:t>comm.Ssend</a:t>
+            </a:r>
+            <a:r>
+              <a:rPr lang="en-US" dirty="0" smtClean="0">
+                <a:latin typeface="Courier New" panose="02070309020205020404" pitchFamily="49" charset="0"/>
+                <a:cs typeface="Courier New" panose="02070309020205020404" pitchFamily="49" charset="0"/>
+              </a:rPr>
+              <a:t>(</a:t>
+            </a:r>
+            <a:r>
+              <a:rPr lang="en-US" dirty="0" err="1" smtClean="0">
+                <a:latin typeface="Courier New" panose="02070309020205020404" pitchFamily="49" charset="0"/>
+                <a:cs typeface="Courier New" panose="02070309020205020404" pitchFamily="49" charset="0"/>
+              </a:rPr>
+              <a:t>send_buffer</a:t>
+            </a:r>
+            <a:r>
+              <a:rPr lang="en-US" dirty="0" smtClean="0">
+                <a:latin typeface="Courier New" panose="02070309020205020404" pitchFamily="49" charset="0"/>
+                <a:cs typeface="Courier New" panose="02070309020205020404" pitchFamily="49" charset="0"/>
+              </a:rPr>
+              <a:t>, </a:t>
+            </a:r>
+            <a:r>
+              <a:rPr lang="en-US" dirty="0" err="1" smtClean="0">
+                <a:latin typeface="Courier New" panose="02070309020205020404" pitchFamily="49" charset="0"/>
+                <a:cs typeface="Courier New" panose="02070309020205020404" pitchFamily="49" charset="0"/>
+              </a:rPr>
+              <a:t>dest</a:t>
+            </a:r>
+            <a:r>
+              <a:rPr lang="en-US" dirty="0" smtClean="0">
+                <a:latin typeface="Courier New" panose="02070309020205020404" pitchFamily="49" charset="0"/>
+                <a:cs typeface="Courier New" panose="02070309020205020404" pitchFamily="49" charset="0"/>
+              </a:rPr>
+              <a:t>=</a:t>
+            </a:r>
+            <a:r>
+              <a:rPr lang="en-US" dirty="0" err="1" smtClean="0">
+                <a:latin typeface="Courier New" panose="02070309020205020404" pitchFamily="49" charset="0"/>
+                <a:cs typeface="Courier New" panose="02070309020205020404" pitchFamily="49" charset="0"/>
+              </a:rPr>
+              <a:t>reciever</a:t>
+            </a:r>
+            <a:r>
+              <a:rPr lang="en-US" dirty="0" smtClean="0">
+                <a:latin typeface="Courier New" panose="02070309020205020404" pitchFamily="49" charset="0"/>
+                <a:cs typeface="Courier New" panose="02070309020205020404" pitchFamily="49" charset="0"/>
+              </a:rPr>
+              <a:t>)</a:t>
+            </a:r>
+          </a:p>
+          <a:p>
+            <a:r>
+              <a:rPr lang="en-US" dirty="0" err="1" smtClean="0">
+                <a:latin typeface="Courier New" panose="02070309020205020404" pitchFamily="49" charset="0"/>
+                <a:cs typeface="Courier New" panose="02070309020205020404" pitchFamily="49" charset="0"/>
+              </a:rPr>
+              <a:t>elif</a:t>
+            </a:r>
+            <a:r>
+              <a:rPr lang="en-US" dirty="0" smtClean="0">
+                <a:latin typeface="Courier New" panose="02070309020205020404" pitchFamily="49" charset="0"/>
+                <a:cs typeface="Courier New" panose="02070309020205020404" pitchFamily="49" charset="0"/>
+              </a:rPr>
+              <a:t> rank == receiver</a:t>
+            </a:r>
+            <a:r>
+              <a:rPr lang="en-US" dirty="0" smtClean="0">
+                <a:latin typeface="Courier New" panose="02070309020205020404" pitchFamily="49" charset="0"/>
+                <a:cs typeface="Courier New" panose="02070309020205020404" pitchFamily="49" charset="0"/>
+              </a:rPr>
+              <a:t>:</a:t>
+            </a:r>
+          </a:p>
+          <a:p>
+            <a:r>
+              <a:rPr lang="en-US" dirty="0">
+                <a:latin typeface="Courier New" panose="02070309020205020404" pitchFamily="49" charset="0"/>
+                <a:cs typeface="Courier New" panose="02070309020205020404" pitchFamily="49" charset="0"/>
+              </a:rPr>
+              <a:t> </a:t>
+            </a:r>
+            <a:r>
+              <a:rPr lang="en-US" dirty="0" smtClean="0">
+                <a:latin typeface="Courier New" panose="02070309020205020404" pitchFamily="49" charset="0"/>
+                <a:cs typeface="Courier New" panose="02070309020205020404" pitchFamily="49" charset="0"/>
+              </a:rPr>
+              <a:t>   </a:t>
+            </a:r>
+            <a:r>
+              <a:rPr lang="en-US" dirty="0" err="1" smtClean="0">
+                <a:latin typeface="Courier New" panose="02070309020205020404" pitchFamily="49" charset="0"/>
+                <a:cs typeface="Courier New" panose="02070309020205020404" pitchFamily="49" charset="0"/>
+              </a:rPr>
+              <a:t>recv_buffer</a:t>
+            </a:r>
+            <a:r>
+              <a:rPr lang="en-US" dirty="0" smtClean="0">
+                <a:latin typeface="Courier New" panose="02070309020205020404" pitchFamily="49" charset="0"/>
+                <a:cs typeface="Courier New" panose="02070309020205020404" pitchFamily="49" charset="0"/>
+              </a:rPr>
+              <a:t> = </a:t>
+            </a:r>
+            <a:r>
+              <a:rPr lang="en-US" dirty="0" err="1" smtClean="0">
+                <a:latin typeface="Courier New" panose="02070309020205020404" pitchFamily="49" charset="0"/>
+                <a:cs typeface="Courier New" panose="02070309020205020404" pitchFamily="49" charset="0"/>
+              </a:rPr>
+              <a:t>np.empty</a:t>
+            </a:r>
+            <a:r>
+              <a:rPr lang="en-US" dirty="0" smtClean="0">
+                <a:latin typeface="Courier New" panose="02070309020205020404" pitchFamily="49" charset="0"/>
+                <a:cs typeface="Courier New" panose="02070309020205020404" pitchFamily="49" charset="0"/>
+              </a:rPr>
+              <a:t>(</a:t>
+            </a:r>
+            <a:r>
+              <a:rPr lang="en-US" dirty="0" err="1" smtClean="0">
+                <a:latin typeface="Courier New" panose="02070309020205020404" pitchFamily="49" charset="0"/>
+                <a:cs typeface="Courier New" panose="02070309020205020404" pitchFamily="49" charset="0"/>
+              </a:rPr>
+              <a:t>data_size</a:t>
+            </a:r>
+            <a:r>
+              <a:rPr lang="en-US" dirty="0" smtClean="0">
+                <a:latin typeface="Courier New" panose="02070309020205020404" pitchFamily="49" charset="0"/>
+                <a:cs typeface="Courier New" panose="02070309020205020404" pitchFamily="49" charset="0"/>
+              </a:rPr>
+              <a:t>)</a:t>
+            </a:r>
+            <a:endParaRPr lang="en-US" dirty="0" smtClean="0">
+              <a:latin typeface="Courier New" panose="02070309020205020404" pitchFamily="49" charset="0"/>
+              <a:cs typeface="Courier New" panose="02070309020205020404" pitchFamily="49" charset="0"/>
+            </a:endParaRPr>
+          </a:p>
+          <a:p>
+            <a:r>
+              <a:rPr lang="en-US" dirty="0">
+                <a:latin typeface="Courier New" panose="02070309020205020404" pitchFamily="49" charset="0"/>
+                <a:cs typeface="Courier New" panose="02070309020205020404" pitchFamily="49" charset="0"/>
+              </a:rPr>
+              <a:t> </a:t>
+            </a:r>
+            <a:r>
+              <a:rPr lang="en-US" dirty="0" smtClean="0">
+                <a:latin typeface="Courier New" panose="02070309020205020404" pitchFamily="49" charset="0"/>
+                <a:cs typeface="Courier New" panose="02070309020205020404" pitchFamily="49" charset="0"/>
+              </a:rPr>
+              <a:t>   </a:t>
+            </a:r>
+            <a:r>
+              <a:rPr lang="en-US" dirty="0" err="1" smtClean="0">
+                <a:latin typeface="Courier New" panose="02070309020205020404" pitchFamily="49" charset="0"/>
+                <a:cs typeface="Courier New" panose="02070309020205020404" pitchFamily="49" charset="0"/>
+              </a:rPr>
+              <a:t>comm.Recv</a:t>
+            </a:r>
+            <a:r>
+              <a:rPr lang="en-US" dirty="0" smtClean="0">
+                <a:latin typeface="Courier New" panose="02070309020205020404" pitchFamily="49" charset="0"/>
+                <a:cs typeface="Courier New" panose="02070309020205020404" pitchFamily="49" charset="0"/>
+              </a:rPr>
+              <a:t>(</a:t>
+            </a:r>
+            <a:r>
+              <a:rPr lang="en-US" dirty="0" err="1" smtClean="0">
+                <a:latin typeface="Courier New" panose="02070309020205020404" pitchFamily="49" charset="0"/>
+                <a:cs typeface="Courier New" panose="02070309020205020404" pitchFamily="49" charset="0"/>
+              </a:rPr>
+              <a:t>recv_buffer</a:t>
+            </a:r>
+            <a:r>
+              <a:rPr lang="en-US" dirty="0" smtClean="0">
+                <a:latin typeface="Courier New" panose="02070309020205020404" pitchFamily="49" charset="0"/>
+                <a:cs typeface="Courier New" panose="02070309020205020404" pitchFamily="49" charset="0"/>
+              </a:rPr>
+              <a:t>, source=sender</a:t>
+            </a:r>
+            <a:r>
+              <a:rPr lang="en-US" dirty="0" smtClean="0">
+                <a:latin typeface="Courier New" panose="02070309020205020404" pitchFamily="49" charset="0"/>
+                <a:cs typeface="Courier New" panose="02070309020205020404" pitchFamily="49" charset="0"/>
+              </a:rPr>
+              <a:t>)</a:t>
+            </a:r>
+            <a:endParaRPr lang="nl-BE" dirty="0">
+              <a:latin typeface="Courier New" panose="02070309020205020404" pitchFamily="49" charset="0"/>
+              <a:cs typeface="Courier New" panose="02070309020205020404" pitchFamily="49" charset="0"/>
+            </a:endParaRPr>
+          </a:p>
+          <a:p>
+            <a:r>
+              <a:rPr lang="nl-BE" dirty="0" smtClean="0">
+                <a:latin typeface="Courier New" panose="02070309020205020404" pitchFamily="49" charset="0"/>
+                <a:cs typeface="Courier New" panose="02070309020205020404" pitchFamily="49" charset="0"/>
+              </a:rPr>
+              <a:t>…</a:t>
+            </a:r>
+          </a:p>
+        </p:txBody>
+      </p:sp>
+    </p:spTree>
+    <p:extLst>
+      <p:ext uri="{BB962C8B-B14F-4D97-AF65-F5344CB8AC3E}">
+        <p14:creationId xmlns:p14="http://schemas.microsoft.com/office/powerpoint/2010/main" val="2947146517"/>
+      </p:ext>
+    </p:extLst>
+  </p:cSld>
+  <p:clrMapOvr>
+    <a:masterClrMapping/>
+  </p:clrMapOvr>
+</p:sld>
+</file>
+
+<file path=ppt/slides/slide25.xml><?xml version="1.0" encoding="utf-8"?>
+<p:sld xmlns:a="http://schemas.openxmlformats.org/drawingml/2006/main" xmlns:r="http://schemas.openxmlformats.org/officeDocument/2006/relationships" xmlns:p="http://schemas.openxmlformats.org/presentationml/2006/main">
+  <p:cSld>
+    <p:spTree>
+      <p:nvGrpSpPr>
+        <p:cNvPr id="1" name=""/>
+        <p:cNvGrpSpPr/>
+        <p:nvPr/>
+      </p:nvGrpSpPr>
+      <p:grpSpPr>
+        <a:xfrm>
+          <a:off x="0" y="0"/>
+          <a:ext cx="0" cy="0"/>
+          <a:chOff x="0" y="0"/>
+          <a:chExt cx="0" cy="0"/>
+        </a:xfrm>
+      </p:grpSpPr>
+      <p:sp>
+        <p:nvSpPr>
+          <p:cNvPr id="2" name="Title 1"/>
+          <p:cNvSpPr>
+            <a:spLocks noGrp="1"/>
+          </p:cNvSpPr>
+          <p:nvPr>
+            <p:ph type="title"/>
+          </p:nvPr>
+        </p:nvSpPr>
+        <p:spPr/>
+        <p:txBody>
+          <a:bodyPr/>
+          <a:lstStyle/>
+          <a:p>
+            <a:r>
               <a:rPr lang="en-US" dirty="0" smtClean="0"/>
               <a:t>Topology</a:t>
             </a:r>
@@ -15905,7 +16538,7 @@
           <a:p>
             <a:fld id="{D1918C2E-FE36-451E-B80E-1968976550A5}" type="slidenum">
               <a:rPr lang="nl-BE" smtClean="0"/>
-              <a:t>24</a:t>
+              <a:t>25</a:t>
             </a:fld>
             <a:endParaRPr lang="nl-BE"/>
           </a:p>
@@ -16254,7 +16887,7 @@
 </p:sld>
 </file>
 
-<file path=ppt/slides/slide25.xml><?xml version="1.0" encoding="utf-8"?>
+<file path=ppt/slides/slide26.xml><?xml version="1.0" encoding="utf-8"?>
 <p:sld xmlns:a="http://schemas.openxmlformats.org/drawingml/2006/main" xmlns:r="http://schemas.openxmlformats.org/officeDocument/2006/relationships" xmlns:p="http://schemas.openxmlformats.org/presentationml/2006/main">
   <p:cSld>
     <p:spTree>
@@ -16425,7 +17058,7 @@
           <a:p>
             <a:fld id="{D1918C2E-FE36-451E-B80E-1968976550A5}" type="slidenum">
               <a:rPr lang="nl-BE" smtClean="0"/>
-              <a:t>25</a:t>
+              <a:t>26</a:t>
             </a:fld>
             <a:endParaRPr lang="nl-BE"/>
           </a:p>
@@ -16787,7 +17420,7 @@
 </p:sld>
 </file>
 
-<file path=ppt/slides/slide26.xml><?xml version="1.0" encoding="utf-8"?>
+<file path=ppt/slides/slide27.xml><?xml version="1.0" encoding="utf-8"?>
 <p:sld xmlns:a="http://schemas.openxmlformats.org/drawingml/2006/main" xmlns:r="http://schemas.openxmlformats.org/officeDocument/2006/relationships" xmlns:p="http://schemas.openxmlformats.org/presentationml/2006/main">
   <p:cSld>
     <p:spTree>
@@ -16918,7 +17551,7 @@
           <a:p>
             <a:fld id="{D1918C2E-FE36-451E-B80E-1968976550A5}" type="slidenum">
               <a:rPr lang="nl-BE" smtClean="0"/>
-              <a:t>26</a:t>
+              <a:t>27</a:t>
             </a:fld>
             <a:endParaRPr lang="nl-BE"/>
           </a:p>
@@ -17316,7 +17949,7 @@
 </p:sld>
 </file>
 
-<file path=ppt/slides/slide27.xml><?xml version="1.0" encoding="utf-8"?>
+<file path=ppt/slides/slide28.xml><?xml version="1.0" encoding="utf-8"?>
 <p:sld xmlns:a="http://schemas.openxmlformats.org/drawingml/2006/main" xmlns:r="http://schemas.openxmlformats.org/officeDocument/2006/relationships" xmlns:p="http://schemas.openxmlformats.org/presentationml/2006/main">
   <p:cSld>
     <p:spTree>
@@ -17496,7 +18129,7 @@
           <a:p>
             <a:fld id="{D1918C2E-FE36-451E-B80E-1968976550A5}" type="slidenum">
               <a:rPr lang="nl-BE" smtClean="0"/>
-              <a:t>27</a:t>
+              <a:t>28</a:t>
             </a:fld>
             <a:endParaRPr lang="nl-BE"/>
           </a:p>
@@ -17930,7 +18563,7 @@
 </p:sld>
 </file>
 
-<file path=ppt/slides/slide28.xml><?xml version="1.0" encoding="utf-8"?>
+<file path=ppt/slides/slide29.xml><?xml version="1.0" encoding="utf-8"?>
 <p:sld xmlns:a="http://schemas.openxmlformats.org/drawingml/2006/main" xmlns:r="http://schemas.openxmlformats.org/officeDocument/2006/relationships" xmlns:p="http://schemas.openxmlformats.org/presentationml/2006/main">
   <p:cSld>
     <p:spTree>
@@ -18043,7 +18676,7 @@
           <a:p>
             <a:fld id="{D1918C2E-FE36-451E-B80E-1968976550A5}" type="slidenum">
               <a:rPr lang="nl-BE" smtClean="0"/>
-              <a:t>28</a:t>
+              <a:t>29</a:t>
             </a:fld>
             <a:endParaRPr lang="nl-BE"/>
           </a:p>
@@ -18334,502 +18967,6 @@
     <p:bldLst>
       <p:bldP spid="3" grpId="0" uiExpand="1" build="p"/>
     </p:bldLst>
-  </p:timing>
-</p:sld>
-</file>
-
-<file path=ppt/slides/slide29.xml><?xml version="1.0" encoding="utf-8"?>
-<p:sld xmlns:a="http://schemas.openxmlformats.org/drawingml/2006/main" xmlns:r="http://schemas.openxmlformats.org/officeDocument/2006/relationships" xmlns:p="http://schemas.openxmlformats.org/presentationml/2006/main">
-  <p:cSld>
-    <p:spTree>
-      <p:nvGrpSpPr>
-        <p:cNvPr id="1" name=""/>
-        <p:cNvGrpSpPr/>
-        <p:nvPr/>
-      </p:nvGrpSpPr>
-      <p:grpSpPr>
-        <a:xfrm>
-          <a:off x="0" y="0"/>
-          <a:ext cx="0" cy="0"/>
-          <a:chOff x="0" y="0"/>
-          <a:chExt cx="0" cy="0"/>
-        </a:xfrm>
-      </p:grpSpPr>
-      <p:sp>
-        <p:nvSpPr>
-          <p:cNvPr id="2" name="Title 1"/>
-          <p:cNvSpPr>
-            <a:spLocks noGrp="1"/>
-          </p:cNvSpPr>
-          <p:nvPr>
-            <p:ph type="title"/>
-          </p:nvPr>
-        </p:nvSpPr>
-        <p:spPr/>
-        <p:txBody>
-          <a:bodyPr/>
-          <a:lstStyle/>
-          <a:p>
-            <a:r>
-              <a:rPr lang="en-US" dirty="0" smtClean="0"/>
-              <a:t>Latencies</a:t>
-            </a:r>
-            <a:endParaRPr lang="nl-BE" dirty="0"/>
-          </a:p>
-        </p:txBody>
-      </p:sp>
-      <p:graphicFrame>
-        <p:nvGraphicFramePr>
-          <p:cNvPr id="3" name="Table 2"/>
-          <p:cNvGraphicFramePr>
-            <a:graphicFrameLocks noGrp="1"/>
-          </p:cNvGraphicFramePr>
-          <p:nvPr>
-            <p:extLst>
-              <p:ext uri="{D42A27DB-BD31-4B8C-83A1-F6EECF244321}">
-                <p14:modId xmlns:p14="http://schemas.microsoft.com/office/powerpoint/2010/main" val="102294448"/>
-              </p:ext>
-            </p:extLst>
-          </p:nvPr>
-        </p:nvGraphicFramePr>
-        <p:xfrm>
-          <a:off x="1524000" y="1397000"/>
-          <a:ext cx="6096000" cy="4450080"/>
-        </p:xfrm>
-        <a:graphic>
-          <a:graphicData uri="http://schemas.openxmlformats.org/drawingml/2006/table">
-            <a:tbl>
-              <a:tblPr firstRow="1" bandRow="1">
-                <a:tableStyleId>{5C22544A-7EE6-4342-B048-85BDC9FD1C3A}</a:tableStyleId>
-              </a:tblPr>
-              <a:tblGrid>
-                <a:gridCol w="3048000"/>
-                <a:gridCol w="3048000"/>
-              </a:tblGrid>
-              <a:tr h="370840">
-                <a:tc>
-                  <a:txBody>
-                    <a:bodyPr/>
-                    <a:lstStyle/>
-                    <a:p>
-                      <a:r>
-                        <a:rPr lang="en-US" dirty="0" smtClean="0"/>
-                        <a:t>Operation</a:t>
-                      </a:r>
-                      <a:endParaRPr lang="nl-BE" dirty="0"/>
-                    </a:p>
-                  </a:txBody>
-                  <a:tcPr/>
-                </a:tc>
-                <a:tc>
-                  <a:txBody>
-                    <a:bodyPr/>
-                    <a:lstStyle/>
-                    <a:p>
-                      <a:r>
-                        <a:rPr lang="en-US" dirty="0" smtClean="0"/>
-                        <a:t>Latency (cycles)</a:t>
-                      </a:r>
-                      <a:endParaRPr lang="nl-BE" dirty="0"/>
-                    </a:p>
-                  </a:txBody>
-                  <a:tcPr/>
-                </a:tc>
-              </a:tr>
-              <a:tr h="370840">
-                <a:tc>
-                  <a:txBody>
-                    <a:bodyPr/>
-                    <a:lstStyle/>
-                    <a:p>
-                      <a:r>
-                        <a:rPr lang="en-US" dirty="0" smtClean="0"/>
-                        <a:t>Pipelined</a:t>
-                      </a:r>
-                      <a:r>
-                        <a:rPr lang="en-US" baseline="0" dirty="0" smtClean="0"/>
-                        <a:t> </a:t>
-                      </a:r>
-                      <a:r>
-                        <a:rPr lang="en-US" dirty="0" smtClean="0"/>
-                        <a:t>arithmetic</a:t>
-                      </a:r>
-                      <a:endParaRPr lang="nl-BE" dirty="0"/>
-                    </a:p>
-                  </a:txBody>
-                  <a:tcPr/>
-                </a:tc>
-                <a:tc>
-                  <a:txBody>
-                    <a:bodyPr/>
-                    <a:lstStyle/>
-                    <a:p>
-                      <a:r>
-                        <a:rPr lang="en-US" dirty="0" smtClean="0"/>
-                        <a:t>1</a:t>
-                      </a:r>
-                      <a:endParaRPr lang="nl-BE" dirty="0"/>
-                    </a:p>
-                  </a:txBody>
-                  <a:tcPr/>
-                </a:tc>
-              </a:tr>
-              <a:tr h="370840">
-                <a:tc>
-                  <a:txBody>
-                    <a:bodyPr/>
-                    <a:lstStyle/>
-                    <a:p>
-                      <a:r>
-                        <a:rPr lang="en-US" dirty="0" smtClean="0"/>
-                        <a:t>L1 cache hit</a:t>
-                      </a:r>
-                      <a:endParaRPr lang="nl-BE" dirty="0"/>
-                    </a:p>
-                  </a:txBody>
-                  <a:tcPr/>
-                </a:tc>
-                <a:tc>
-                  <a:txBody>
-                    <a:bodyPr/>
-                    <a:lstStyle/>
-                    <a:p>
-                      <a:r>
-                        <a:rPr lang="en-US" dirty="0" smtClean="0"/>
-                        <a:t>4</a:t>
-                      </a:r>
-                      <a:endParaRPr lang="nl-BE" dirty="0"/>
-                    </a:p>
-                  </a:txBody>
-                  <a:tcPr/>
-                </a:tc>
-              </a:tr>
-              <a:tr h="370840">
-                <a:tc>
-                  <a:txBody>
-                    <a:bodyPr/>
-                    <a:lstStyle/>
-                    <a:p>
-                      <a:r>
-                        <a:rPr lang="en-US" dirty="0" smtClean="0"/>
-                        <a:t>L2 cache hit</a:t>
-                      </a:r>
-                      <a:endParaRPr lang="nl-BE" dirty="0"/>
-                    </a:p>
-                  </a:txBody>
-                  <a:tcPr/>
-                </a:tc>
-                <a:tc>
-                  <a:txBody>
-                    <a:bodyPr/>
-                    <a:lstStyle/>
-                    <a:p>
-                      <a:r>
-                        <a:rPr lang="en-US" dirty="0" smtClean="0"/>
-                        <a:t>10</a:t>
-                      </a:r>
-                      <a:endParaRPr lang="nl-BE" dirty="0"/>
-                    </a:p>
-                  </a:txBody>
-                  <a:tcPr/>
-                </a:tc>
-              </a:tr>
-              <a:tr h="370840">
-                <a:tc>
-                  <a:txBody>
-                    <a:bodyPr/>
-                    <a:lstStyle/>
-                    <a:p>
-                      <a:r>
-                        <a:rPr lang="en-US" dirty="0" smtClean="0"/>
-                        <a:t>64-bit </a:t>
-                      </a:r>
-                      <a:r>
-                        <a:rPr lang="en-US" dirty="0" err="1" smtClean="0"/>
-                        <a:t>sqrt</a:t>
-                      </a:r>
-                      <a:r>
-                        <a:rPr lang="en-US" dirty="0" smtClean="0"/>
-                        <a:t>, division</a:t>
-                      </a:r>
-                      <a:endParaRPr lang="nl-BE" dirty="0"/>
-                    </a:p>
-                  </a:txBody>
-                  <a:tcPr/>
-                </a:tc>
-                <a:tc>
-                  <a:txBody>
-                    <a:bodyPr/>
-                    <a:lstStyle/>
-                    <a:p>
-                      <a:r>
-                        <a:rPr lang="en-US" dirty="0" smtClean="0"/>
-                        <a:t>~ 20</a:t>
-                      </a:r>
-                      <a:endParaRPr lang="nl-BE" dirty="0"/>
-                    </a:p>
-                  </a:txBody>
-                  <a:tcPr/>
-                </a:tc>
-              </a:tr>
-              <a:tr h="370840">
-                <a:tc>
-                  <a:txBody>
-                    <a:bodyPr/>
-                    <a:lstStyle/>
-                    <a:p>
-                      <a:r>
-                        <a:rPr lang="en-US" dirty="0" smtClean="0"/>
-                        <a:t>L3 cache hit</a:t>
-                      </a:r>
-                      <a:endParaRPr lang="nl-BE" dirty="0"/>
-                    </a:p>
-                  </a:txBody>
-                  <a:tcPr/>
-                </a:tc>
-                <a:tc>
-                  <a:txBody>
-                    <a:bodyPr/>
-                    <a:lstStyle/>
-                    <a:p>
-                      <a:r>
-                        <a:rPr lang="en-US" dirty="0" smtClean="0"/>
-                        <a:t>40</a:t>
-                      </a:r>
-                      <a:endParaRPr lang="nl-BE" dirty="0"/>
-                    </a:p>
-                  </a:txBody>
-                  <a:tcPr/>
-                </a:tc>
-              </a:tr>
-              <a:tr h="370840">
-                <a:tc>
-                  <a:txBody>
-                    <a:bodyPr/>
-                    <a:lstStyle/>
-                    <a:p>
-                      <a:r>
-                        <a:rPr lang="en-US" dirty="0" smtClean="0"/>
-                        <a:t>cache miss</a:t>
-                      </a:r>
-                      <a:endParaRPr lang="nl-BE" dirty="0"/>
-                    </a:p>
-                  </a:txBody>
-                  <a:tcPr/>
-                </a:tc>
-                <a:tc>
-                  <a:txBody>
-                    <a:bodyPr/>
-                    <a:lstStyle/>
-                    <a:p>
-                      <a:r>
-                        <a:rPr lang="en-US" dirty="0" smtClean="0"/>
-                        <a:t>100-300</a:t>
-                      </a:r>
-                      <a:endParaRPr lang="nl-BE" dirty="0"/>
-                    </a:p>
-                  </a:txBody>
-                  <a:tcPr/>
-                </a:tc>
-              </a:tr>
-              <a:tr h="370840">
-                <a:tc>
-                  <a:txBody>
-                    <a:bodyPr/>
-                    <a:lstStyle/>
-                    <a:p>
-                      <a:r>
-                        <a:rPr lang="en-US" dirty="0" err="1" smtClean="0"/>
-                        <a:t>OpenMP</a:t>
-                      </a:r>
-                      <a:r>
-                        <a:rPr lang="en-US" dirty="0" smtClean="0"/>
-                        <a:t> barrier</a:t>
-                      </a:r>
-                      <a:endParaRPr lang="nl-BE" dirty="0"/>
-                    </a:p>
-                  </a:txBody>
-                  <a:tcPr/>
-                </a:tc>
-                <a:tc>
-                  <a:txBody>
-                    <a:bodyPr/>
-                    <a:lstStyle/>
-                    <a:p>
-                      <a:r>
-                        <a:rPr lang="en-US" dirty="0" smtClean="0"/>
-                        <a:t>300-30,000</a:t>
-                      </a:r>
-                      <a:endParaRPr lang="nl-BE" dirty="0"/>
-                    </a:p>
-                  </a:txBody>
-                  <a:tcPr/>
-                </a:tc>
-              </a:tr>
-              <a:tr h="370840">
-                <a:tc>
-                  <a:txBody>
-                    <a:bodyPr/>
-                    <a:lstStyle/>
-                    <a:p>
-                      <a:r>
-                        <a:rPr lang="en-US" dirty="0" err="1" smtClean="0"/>
-                        <a:t>infiniband</a:t>
-                      </a:r>
-                      <a:r>
-                        <a:rPr lang="en-US" baseline="0" dirty="0" smtClean="0"/>
-                        <a:t> </a:t>
-                      </a:r>
-                      <a:endParaRPr lang="nl-BE" dirty="0"/>
-                    </a:p>
-                  </a:txBody>
-                  <a:tcPr/>
-                </a:tc>
-                <a:tc>
-                  <a:txBody>
-                    <a:bodyPr/>
-                    <a:lstStyle/>
-                    <a:p>
-                      <a:r>
-                        <a:rPr lang="en-US" dirty="0" smtClean="0"/>
-                        <a:t>2,500-5,000</a:t>
-                      </a:r>
-                      <a:endParaRPr lang="nl-BE" dirty="0"/>
-                    </a:p>
-                  </a:txBody>
-                  <a:tcPr/>
-                </a:tc>
-              </a:tr>
-              <a:tr h="370840">
-                <a:tc>
-                  <a:txBody>
-                    <a:bodyPr/>
-                    <a:lstStyle/>
-                    <a:p>
-                      <a:r>
-                        <a:rPr lang="en-US" dirty="0" smtClean="0"/>
-                        <a:t>SSD read</a:t>
-                      </a:r>
-                    </a:p>
-                  </a:txBody>
-                  <a:tcPr/>
-                </a:tc>
-                <a:tc>
-                  <a:txBody>
-                    <a:bodyPr/>
-                    <a:lstStyle/>
-                    <a:p>
-                      <a:r>
-                        <a:rPr lang="en-US" dirty="0" smtClean="0"/>
-                        <a:t>60,000</a:t>
-                      </a:r>
-                      <a:endParaRPr lang="nl-BE" dirty="0"/>
-                    </a:p>
-                  </a:txBody>
-                  <a:tcPr/>
-                </a:tc>
-              </a:tr>
-              <a:tr h="370840">
-                <a:tc>
-                  <a:txBody>
-                    <a:bodyPr/>
-                    <a:lstStyle/>
-                    <a:p>
-                      <a:r>
-                        <a:rPr lang="en-US" dirty="0" smtClean="0"/>
-                        <a:t>SSD write</a:t>
-                      </a:r>
-                    </a:p>
-                  </a:txBody>
-                  <a:tcPr/>
-                </a:tc>
-                <a:tc>
-                  <a:txBody>
-                    <a:bodyPr/>
-                    <a:lstStyle/>
-                    <a:p>
-                      <a:r>
-                        <a:rPr lang="en-US" dirty="0" smtClean="0"/>
-                        <a:t>600,000</a:t>
-                      </a:r>
-                      <a:endParaRPr lang="nl-BE" dirty="0"/>
-                    </a:p>
-                  </a:txBody>
-                  <a:tcPr/>
-                </a:tc>
-              </a:tr>
-              <a:tr h="370840">
-                <a:tc>
-                  <a:txBody>
-                    <a:bodyPr/>
-                    <a:lstStyle/>
-                    <a:p>
-                      <a:r>
-                        <a:rPr lang="en-US" dirty="0" smtClean="0"/>
-                        <a:t>HDD I/O</a:t>
-                      </a:r>
-                    </a:p>
-                  </a:txBody>
-                  <a:tcPr/>
-                </a:tc>
-                <a:tc>
-                  <a:txBody>
-                    <a:bodyPr/>
-                    <a:lstStyle/>
-                    <a:p>
-                      <a:r>
-                        <a:rPr lang="en-US" dirty="0" smtClean="0"/>
-                        <a:t>10,000,000</a:t>
-                      </a:r>
-                      <a:endParaRPr lang="nl-BE" dirty="0"/>
-                    </a:p>
-                  </a:txBody>
-                  <a:tcPr/>
-                </a:tc>
-              </a:tr>
-            </a:tbl>
-          </a:graphicData>
-        </a:graphic>
-      </p:graphicFrame>
-      <p:sp>
-        <p:nvSpPr>
-          <p:cNvPr id="4" name="Slide Number Placeholder 3"/>
-          <p:cNvSpPr>
-            <a:spLocks noGrp="1"/>
-          </p:cNvSpPr>
-          <p:nvPr>
-            <p:ph type="sldNum" sz="quarter" idx="12"/>
-          </p:nvPr>
-        </p:nvSpPr>
-        <p:spPr/>
-        <p:txBody>
-          <a:bodyPr/>
-          <a:lstStyle/>
-          <a:p>
-            <a:fld id="{D1918C2E-FE36-451E-B80E-1968976550A5}" type="slidenum">
-              <a:rPr lang="nl-BE" smtClean="0"/>
-              <a:t>29</a:t>
-            </a:fld>
-            <a:endParaRPr lang="nl-BE"/>
-          </a:p>
-        </p:txBody>
-      </p:sp>
-    </p:spTree>
-    <p:extLst>
-      <p:ext uri="{BB962C8B-B14F-4D97-AF65-F5344CB8AC3E}">
-        <p14:creationId xmlns:p14="http://schemas.microsoft.com/office/powerpoint/2010/main" val="4115479166"/>
-      </p:ext>
-    </p:extLst>
-  </p:cSld>
-  <p:clrMapOvr>
-    <a:masterClrMapping/>
-  </p:clrMapOvr>
-  <p:timing>
-    <p:tnLst>
-      <p:par>
-        <p:cTn id="1" dur="indefinite" restart="never" nodeType="tmRoot"/>
-      </p:par>
-    </p:tnLst>
   </p:timing>
 </p:sld>
 </file>
@@ -19515,6 +19652,502 @@
       <p:bldP spid="3" grpId="0" uiExpand="1" build="p" bldLvl="2"/>
       <p:bldP spid="4" grpId="0" animBg="1"/>
     </p:bldLst>
+  </p:timing>
+</p:sld>
+</file>
+
+<file path=ppt/slides/slide30.xml><?xml version="1.0" encoding="utf-8"?>
+<p:sld xmlns:a="http://schemas.openxmlformats.org/drawingml/2006/main" xmlns:r="http://schemas.openxmlformats.org/officeDocument/2006/relationships" xmlns:p="http://schemas.openxmlformats.org/presentationml/2006/main">
+  <p:cSld>
+    <p:spTree>
+      <p:nvGrpSpPr>
+        <p:cNvPr id="1" name=""/>
+        <p:cNvGrpSpPr/>
+        <p:nvPr/>
+      </p:nvGrpSpPr>
+      <p:grpSpPr>
+        <a:xfrm>
+          <a:off x="0" y="0"/>
+          <a:ext cx="0" cy="0"/>
+          <a:chOff x="0" y="0"/>
+          <a:chExt cx="0" cy="0"/>
+        </a:xfrm>
+      </p:grpSpPr>
+      <p:sp>
+        <p:nvSpPr>
+          <p:cNvPr id="2" name="Title 1"/>
+          <p:cNvSpPr>
+            <a:spLocks noGrp="1"/>
+          </p:cNvSpPr>
+          <p:nvPr>
+            <p:ph type="title"/>
+          </p:nvPr>
+        </p:nvSpPr>
+        <p:spPr/>
+        <p:txBody>
+          <a:bodyPr/>
+          <a:lstStyle/>
+          <a:p>
+            <a:r>
+              <a:rPr lang="en-US" dirty="0" smtClean="0"/>
+              <a:t>Latencies</a:t>
+            </a:r>
+            <a:endParaRPr lang="nl-BE" dirty="0"/>
+          </a:p>
+        </p:txBody>
+      </p:sp>
+      <p:graphicFrame>
+        <p:nvGraphicFramePr>
+          <p:cNvPr id="3" name="Table 2"/>
+          <p:cNvGraphicFramePr>
+            <a:graphicFrameLocks noGrp="1"/>
+          </p:cNvGraphicFramePr>
+          <p:nvPr>
+            <p:extLst>
+              <p:ext uri="{D42A27DB-BD31-4B8C-83A1-F6EECF244321}">
+                <p14:modId xmlns:p14="http://schemas.microsoft.com/office/powerpoint/2010/main" val="102294448"/>
+              </p:ext>
+            </p:extLst>
+          </p:nvPr>
+        </p:nvGraphicFramePr>
+        <p:xfrm>
+          <a:off x="1524000" y="1397000"/>
+          <a:ext cx="6096000" cy="4450080"/>
+        </p:xfrm>
+        <a:graphic>
+          <a:graphicData uri="http://schemas.openxmlformats.org/drawingml/2006/table">
+            <a:tbl>
+              <a:tblPr firstRow="1" bandRow="1">
+                <a:tableStyleId>{5C22544A-7EE6-4342-B048-85BDC9FD1C3A}</a:tableStyleId>
+              </a:tblPr>
+              <a:tblGrid>
+                <a:gridCol w="3048000"/>
+                <a:gridCol w="3048000"/>
+              </a:tblGrid>
+              <a:tr h="370840">
+                <a:tc>
+                  <a:txBody>
+                    <a:bodyPr/>
+                    <a:lstStyle/>
+                    <a:p>
+                      <a:r>
+                        <a:rPr lang="en-US" dirty="0" smtClean="0"/>
+                        <a:t>Operation</a:t>
+                      </a:r>
+                      <a:endParaRPr lang="nl-BE" dirty="0"/>
+                    </a:p>
+                  </a:txBody>
+                  <a:tcPr/>
+                </a:tc>
+                <a:tc>
+                  <a:txBody>
+                    <a:bodyPr/>
+                    <a:lstStyle/>
+                    <a:p>
+                      <a:r>
+                        <a:rPr lang="en-US" dirty="0" smtClean="0"/>
+                        <a:t>Latency (cycles)</a:t>
+                      </a:r>
+                      <a:endParaRPr lang="nl-BE" dirty="0"/>
+                    </a:p>
+                  </a:txBody>
+                  <a:tcPr/>
+                </a:tc>
+              </a:tr>
+              <a:tr h="370840">
+                <a:tc>
+                  <a:txBody>
+                    <a:bodyPr/>
+                    <a:lstStyle/>
+                    <a:p>
+                      <a:r>
+                        <a:rPr lang="en-US" dirty="0" smtClean="0"/>
+                        <a:t>Pipelined</a:t>
+                      </a:r>
+                      <a:r>
+                        <a:rPr lang="en-US" baseline="0" dirty="0" smtClean="0"/>
+                        <a:t> </a:t>
+                      </a:r>
+                      <a:r>
+                        <a:rPr lang="en-US" dirty="0" smtClean="0"/>
+                        <a:t>arithmetic</a:t>
+                      </a:r>
+                      <a:endParaRPr lang="nl-BE" dirty="0"/>
+                    </a:p>
+                  </a:txBody>
+                  <a:tcPr/>
+                </a:tc>
+                <a:tc>
+                  <a:txBody>
+                    <a:bodyPr/>
+                    <a:lstStyle/>
+                    <a:p>
+                      <a:r>
+                        <a:rPr lang="en-US" dirty="0" smtClean="0"/>
+                        <a:t>1</a:t>
+                      </a:r>
+                      <a:endParaRPr lang="nl-BE" dirty="0"/>
+                    </a:p>
+                  </a:txBody>
+                  <a:tcPr/>
+                </a:tc>
+              </a:tr>
+              <a:tr h="370840">
+                <a:tc>
+                  <a:txBody>
+                    <a:bodyPr/>
+                    <a:lstStyle/>
+                    <a:p>
+                      <a:r>
+                        <a:rPr lang="en-US" dirty="0" smtClean="0"/>
+                        <a:t>L1 cache hit</a:t>
+                      </a:r>
+                      <a:endParaRPr lang="nl-BE" dirty="0"/>
+                    </a:p>
+                  </a:txBody>
+                  <a:tcPr/>
+                </a:tc>
+                <a:tc>
+                  <a:txBody>
+                    <a:bodyPr/>
+                    <a:lstStyle/>
+                    <a:p>
+                      <a:r>
+                        <a:rPr lang="en-US" dirty="0" smtClean="0"/>
+                        <a:t>4</a:t>
+                      </a:r>
+                      <a:endParaRPr lang="nl-BE" dirty="0"/>
+                    </a:p>
+                  </a:txBody>
+                  <a:tcPr/>
+                </a:tc>
+              </a:tr>
+              <a:tr h="370840">
+                <a:tc>
+                  <a:txBody>
+                    <a:bodyPr/>
+                    <a:lstStyle/>
+                    <a:p>
+                      <a:r>
+                        <a:rPr lang="en-US" dirty="0" smtClean="0"/>
+                        <a:t>L2 cache hit</a:t>
+                      </a:r>
+                      <a:endParaRPr lang="nl-BE" dirty="0"/>
+                    </a:p>
+                  </a:txBody>
+                  <a:tcPr/>
+                </a:tc>
+                <a:tc>
+                  <a:txBody>
+                    <a:bodyPr/>
+                    <a:lstStyle/>
+                    <a:p>
+                      <a:r>
+                        <a:rPr lang="en-US" dirty="0" smtClean="0"/>
+                        <a:t>10</a:t>
+                      </a:r>
+                      <a:endParaRPr lang="nl-BE" dirty="0"/>
+                    </a:p>
+                  </a:txBody>
+                  <a:tcPr/>
+                </a:tc>
+              </a:tr>
+              <a:tr h="370840">
+                <a:tc>
+                  <a:txBody>
+                    <a:bodyPr/>
+                    <a:lstStyle/>
+                    <a:p>
+                      <a:r>
+                        <a:rPr lang="en-US" dirty="0" smtClean="0"/>
+                        <a:t>64-bit </a:t>
+                      </a:r>
+                      <a:r>
+                        <a:rPr lang="en-US" dirty="0" err="1" smtClean="0"/>
+                        <a:t>sqrt</a:t>
+                      </a:r>
+                      <a:r>
+                        <a:rPr lang="en-US" dirty="0" smtClean="0"/>
+                        <a:t>, division</a:t>
+                      </a:r>
+                      <a:endParaRPr lang="nl-BE" dirty="0"/>
+                    </a:p>
+                  </a:txBody>
+                  <a:tcPr/>
+                </a:tc>
+                <a:tc>
+                  <a:txBody>
+                    <a:bodyPr/>
+                    <a:lstStyle/>
+                    <a:p>
+                      <a:r>
+                        <a:rPr lang="en-US" dirty="0" smtClean="0"/>
+                        <a:t>~ 20</a:t>
+                      </a:r>
+                      <a:endParaRPr lang="nl-BE" dirty="0"/>
+                    </a:p>
+                  </a:txBody>
+                  <a:tcPr/>
+                </a:tc>
+              </a:tr>
+              <a:tr h="370840">
+                <a:tc>
+                  <a:txBody>
+                    <a:bodyPr/>
+                    <a:lstStyle/>
+                    <a:p>
+                      <a:r>
+                        <a:rPr lang="en-US" dirty="0" smtClean="0"/>
+                        <a:t>L3 cache hit</a:t>
+                      </a:r>
+                      <a:endParaRPr lang="nl-BE" dirty="0"/>
+                    </a:p>
+                  </a:txBody>
+                  <a:tcPr/>
+                </a:tc>
+                <a:tc>
+                  <a:txBody>
+                    <a:bodyPr/>
+                    <a:lstStyle/>
+                    <a:p>
+                      <a:r>
+                        <a:rPr lang="en-US" dirty="0" smtClean="0"/>
+                        <a:t>40</a:t>
+                      </a:r>
+                      <a:endParaRPr lang="nl-BE" dirty="0"/>
+                    </a:p>
+                  </a:txBody>
+                  <a:tcPr/>
+                </a:tc>
+              </a:tr>
+              <a:tr h="370840">
+                <a:tc>
+                  <a:txBody>
+                    <a:bodyPr/>
+                    <a:lstStyle/>
+                    <a:p>
+                      <a:r>
+                        <a:rPr lang="en-US" dirty="0" smtClean="0"/>
+                        <a:t>cache miss</a:t>
+                      </a:r>
+                      <a:endParaRPr lang="nl-BE" dirty="0"/>
+                    </a:p>
+                  </a:txBody>
+                  <a:tcPr/>
+                </a:tc>
+                <a:tc>
+                  <a:txBody>
+                    <a:bodyPr/>
+                    <a:lstStyle/>
+                    <a:p>
+                      <a:r>
+                        <a:rPr lang="en-US" dirty="0" smtClean="0"/>
+                        <a:t>100-300</a:t>
+                      </a:r>
+                      <a:endParaRPr lang="nl-BE" dirty="0"/>
+                    </a:p>
+                  </a:txBody>
+                  <a:tcPr/>
+                </a:tc>
+              </a:tr>
+              <a:tr h="370840">
+                <a:tc>
+                  <a:txBody>
+                    <a:bodyPr/>
+                    <a:lstStyle/>
+                    <a:p>
+                      <a:r>
+                        <a:rPr lang="en-US" dirty="0" err="1" smtClean="0"/>
+                        <a:t>OpenMP</a:t>
+                      </a:r>
+                      <a:r>
+                        <a:rPr lang="en-US" dirty="0" smtClean="0"/>
+                        <a:t> barrier</a:t>
+                      </a:r>
+                      <a:endParaRPr lang="nl-BE" dirty="0"/>
+                    </a:p>
+                  </a:txBody>
+                  <a:tcPr/>
+                </a:tc>
+                <a:tc>
+                  <a:txBody>
+                    <a:bodyPr/>
+                    <a:lstStyle/>
+                    <a:p>
+                      <a:r>
+                        <a:rPr lang="en-US" dirty="0" smtClean="0"/>
+                        <a:t>300-30,000</a:t>
+                      </a:r>
+                      <a:endParaRPr lang="nl-BE" dirty="0"/>
+                    </a:p>
+                  </a:txBody>
+                  <a:tcPr/>
+                </a:tc>
+              </a:tr>
+              <a:tr h="370840">
+                <a:tc>
+                  <a:txBody>
+                    <a:bodyPr/>
+                    <a:lstStyle/>
+                    <a:p>
+                      <a:r>
+                        <a:rPr lang="en-US" dirty="0" err="1" smtClean="0"/>
+                        <a:t>infiniband</a:t>
+                      </a:r>
+                      <a:r>
+                        <a:rPr lang="en-US" baseline="0" dirty="0" smtClean="0"/>
+                        <a:t> </a:t>
+                      </a:r>
+                      <a:endParaRPr lang="nl-BE" dirty="0"/>
+                    </a:p>
+                  </a:txBody>
+                  <a:tcPr/>
+                </a:tc>
+                <a:tc>
+                  <a:txBody>
+                    <a:bodyPr/>
+                    <a:lstStyle/>
+                    <a:p>
+                      <a:r>
+                        <a:rPr lang="en-US" dirty="0" smtClean="0"/>
+                        <a:t>2,500-5,000</a:t>
+                      </a:r>
+                      <a:endParaRPr lang="nl-BE" dirty="0"/>
+                    </a:p>
+                  </a:txBody>
+                  <a:tcPr/>
+                </a:tc>
+              </a:tr>
+              <a:tr h="370840">
+                <a:tc>
+                  <a:txBody>
+                    <a:bodyPr/>
+                    <a:lstStyle/>
+                    <a:p>
+                      <a:r>
+                        <a:rPr lang="en-US" dirty="0" smtClean="0"/>
+                        <a:t>SSD read</a:t>
+                      </a:r>
+                    </a:p>
+                  </a:txBody>
+                  <a:tcPr/>
+                </a:tc>
+                <a:tc>
+                  <a:txBody>
+                    <a:bodyPr/>
+                    <a:lstStyle/>
+                    <a:p>
+                      <a:r>
+                        <a:rPr lang="en-US" dirty="0" smtClean="0"/>
+                        <a:t>60,000</a:t>
+                      </a:r>
+                      <a:endParaRPr lang="nl-BE" dirty="0"/>
+                    </a:p>
+                  </a:txBody>
+                  <a:tcPr/>
+                </a:tc>
+              </a:tr>
+              <a:tr h="370840">
+                <a:tc>
+                  <a:txBody>
+                    <a:bodyPr/>
+                    <a:lstStyle/>
+                    <a:p>
+                      <a:r>
+                        <a:rPr lang="en-US" dirty="0" smtClean="0"/>
+                        <a:t>SSD write</a:t>
+                      </a:r>
+                    </a:p>
+                  </a:txBody>
+                  <a:tcPr/>
+                </a:tc>
+                <a:tc>
+                  <a:txBody>
+                    <a:bodyPr/>
+                    <a:lstStyle/>
+                    <a:p>
+                      <a:r>
+                        <a:rPr lang="en-US" dirty="0" smtClean="0"/>
+                        <a:t>600,000</a:t>
+                      </a:r>
+                      <a:endParaRPr lang="nl-BE" dirty="0"/>
+                    </a:p>
+                  </a:txBody>
+                  <a:tcPr/>
+                </a:tc>
+              </a:tr>
+              <a:tr h="370840">
+                <a:tc>
+                  <a:txBody>
+                    <a:bodyPr/>
+                    <a:lstStyle/>
+                    <a:p>
+                      <a:r>
+                        <a:rPr lang="en-US" dirty="0" smtClean="0"/>
+                        <a:t>HDD I/O</a:t>
+                      </a:r>
+                    </a:p>
+                  </a:txBody>
+                  <a:tcPr/>
+                </a:tc>
+                <a:tc>
+                  <a:txBody>
+                    <a:bodyPr/>
+                    <a:lstStyle/>
+                    <a:p>
+                      <a:r>
+                        <a:rPr lang="en-US" dirty="0" smtClean="0"/>
+                        <a:t>10,000,000</a:t>
+                      </a:r>
+                      <a:endParaRPr lang="nl-BE" dirty="0"/>
+                    </a:p>
+                  </a:txBody>
+                  <a:tcPr/>
+                </a:tc>
+              </a:tr>
+            </a:tbl>
+          </a:graphicData>
+        </a:graphic>
+      </p:graphicFrame>
+      <p:sp>
+        <p:nvSpPr>
+          <p:cNvPr id="4" name="Slide Number Placeholder 3"/>
+          <p:cNvSpPr>
+            <a:spLocks noGrp="1"/>
+          </p:cNvSpPr>
+          <p:nvPr>
+            <p:ph type="sldNum" sz="quarter" idx="12"/>
+          </p:nvPr>
+        </p:nvSpPr>
+        <p:spPr/>
+        <p:txBody>
+          <a:bodyPr/>
+          <a:lstStyle/>
+          <a:p>
+            <a:fld id="{D1918C2E-FE36-451E-B80E-1968976550A5}" type="slidenum">
+              <a:rPr lang="nl-BE" smtClean="0"/>
+              <a:t>30</a:t>
+            </a:fld>
+            <a:endParaRPr lang="nl-BE"/>
+          </a:p>
+        </p:txBody>
+      </p:sp>
+    </p:spTree>
+    <p:extLst>
+      <p:ext uri="{BB962C8B-B14F-4D97-AF65-F5344CB8AC3E}">
+        <p14:creationId xmlns:p14="http://schemas.microsoft.com/office/powerpoint/2010/main" val="4115479166"/>
+      </p:ext>
+    </p:extLst>
+  </p:cSld>
+  <p:clrMapOvr>
+    <a:masterClrMapping/>
+  </p:clrMapOvr>
+  <p:timing>
+    <p:tnLst>
+      <p:par>
+        <p:cTn id="1" dur="indefinite" restart="never" nodeType="tmRoot"/>
+      </p:par>
+    </p:tnLst>
   </p:timing>
 </p:sld>
 </file>
@@ -22315,8 +22948,13 @@
           <a:p>
             <a:r>
               <a:rPr lang="en-US" dirty="0" smtClean="0"/>
-              <a:t>Processes communicate to exchange information, data, state</a:t>
-            </a:r>
+              <a:t>Processes communicate to exchange information, data, </a:t>
+            </a:r>
+            <a:r>
+              <a:rPr lang="en-US" dirty="0" smtClean="0"/>
+              <a:t>state by sending messages</a:t>
+            </a:r>
+            <a:endParaRPr lang="en-US" dirty="0" smtClean="0"/>
           </a:p>
         </p:txBody>
       </p:sp>

</xml_diff>